<commit_message>
corrected foreign key relation in db schema
</commit_message>
<xml_diff>
--- a/Metanome_DbSchema.pptx
+++ b/Metanome_DbSchema.pptx
@@ -288,7 +288,7 @@
           <a:p>
             <a:fld id="{115771A5-7D48-B749-BB03-920CA0774638}" type="datetimeFigureOut">
               <a:rPr lang="de-DE" smtClean="0"/>
-              <a:t>09.01.14</a:t>
+              <a:t>12.01.14</a:t>
             </a:fld>
             <a:endParaRPr lang="de-DE"/>
           </a:p>
@@ -458,7 +458,7 @@
           <a:p>
             <a:fld id="{115771A5-7D48-B749-BB03-920CA0774638}" type="datetimeFigureOut">
               <a:rPr lang="de-DE" smtClean="0"/>
-              <a:t>09.01.14</a:t>
+              <a:t>12.01.14</a:t>
             </a:fld>
             <a:endParaRPr lang="de-DE"/>
           </a:p>
@@ -638,7 +638,7 @@
           <a:p>
             <a:fld id="{115771A5-7D48-B749-BB03-920CA0774638}" type="datetimeFigureOut">
               <a:rPr lang="de-DE" smtClean="0"/>
-              <a:t>09.01.14</a:t>
+              <a:t>12.01.14</a:t>
             </a:fld>
             <a:endParaRPr lang="de-DE"/>
           </a:p>
@@ -808,7 +808,7 @@
           <a:p>
             <a:fld id="{115771A5-7D48-B749-BB03-920CA0774638}" type="datetimeFigureOut">
               <a:rPr lang="de-DE" smtClean="0"/>
-              <a:t>09.01.14</a:t>
+              <a:t>12.01.14</a:t>
             </a:fld>
             <a:endParaRPr lang="de-DE"/>
           </a:p>
@@ -1054,7 +1054,7 @@
           <a:p>
             <a:fld id="{115771A5-7D48-B749-BB03-920CA0774638}" type="datetimeFigureOut">
               <a:rPr lang="de-DE" smtClean="0"/>
-              <a:t>09.01.14</a:t>
+              <a:t>12.01.14</a:t>
             </a:fld>
             <a:endParaRPr lang="de-DE"/>
           </a:p>
@@ -1342,7 +1342,7 @@
           <a:p>
             <a:fld id="{115771A5-7D48-B749-BB03-920CA0774638}" type="datetimeFigureOut">
               <a:rPr lang="de-DE" smtClean="0"/>
-              <a:t>09.01.14</a:t>
+              <a:t>12.01.14</a:t>
             </a:fld>
             <a:endParaRPr lang="de-DE"/>
           </a:p>
@@ -1764,7 +1764,7 @@
           <a:p>
             <a:fld id="{115771A5-7D48-B749-BB03-920CA0774638}" type="datetimeFigureOut">
               <a:rPr lang="de-DE" smtClean="0"/>
-              <a:t>09.01.14</a:t>
+              <a:t>12.01.14</a:t>
             </a:fld>
             <a:endParaRPr lang="de-DE"/>
           </a:p>
@@ -1882,7 +1882,7 @@
           <a:p>
             <a:fld id="{115771A5-7D48-B749-BB03-920CA0774638}" type="datetimeFigureOut">
               <a:rPr lang="de-DE" smtClean="0"/>
-              <a:t>09.01.14</a:t>
+              <a:t>12.01.14</a:t>
             </a:fld>
             <a:endParaRPr lang="de-DE"/>
           </a:p>
@@ -1977,7 +1977,7 @@
           <a:p>
             <a:fld id="{115771A5-7D48-B749-BB03-920CA0774638}" type="datetimeFigureOut">
               <a:rPr lang="de-DE" smtClean="0"/>
-              <a:t>09.01.14</a:t>
+              <a:t>12.01.14</a:t>
             </a:fld>
             <a:endParaRPr lang="de-DE"/>
           </a:p>
@@ -2254,7 +2254,7 @@
           <a:p>
             <a:fld id="{115771A5-7D48-B749-BB03-920CA0774638}" type="datetimeFigureOut">
               <a:rPr lang="de-DE" smtClean="0"/>
-              <a:t>09.01.14</a:t>
+              <a:t>12.01.14</a:t>
             </a:fld>
             <a:endParaRPr lang="de-DE"/>
           </a:p>
@@ -2507,7 +2507,7 @@
           <a:p>
             <a:fld id="{115771A5-7D48-B749-BB03-920CA0774638}" type="datetimeFigureOut">
               <a:rPr lang="de-DE" smtClean="0"/>
-              <a:t>09.01.14</a:t>
+              <a:t>12.01.14</a:t>
             </a:fld>
             <a:endParaRPr lang="de-DE"/>
           </a:p>
@@ -2720,7 +2720,7 @@
           <a:p>
             <a:fld id="{115771A5-7D48-B749-BB03-920CA0774638}" type="datetimeFigureOut">
               <a:rPr lang="de-DE" smtClean="0"/>
-              <a:t>09.01.14</a:t>
+              <a:t>12.01.14</a:t>
             </a:fld>
             <a:endParaRPr lang="de-DE"/>
           </a:p>
@@ -3551,7 +3551,6 @@
               <a:rPr lang="de-DE" sz="1600" noProof="1" smtClean="0"/>
               <a:t>...</a:t>
             </a:r>
-            <a:endParaRPr lang="de-DE" sz="1600" noProof="1" smtClean="0"/>
           </a:p>
         </p:txBody>
       </p:sp>
@@ -4139,7 +4138,6 @@
               <a:rPr lang="de-DE" b="1" noProof="1" smtClean="0"/>
               <a:t>Result</a:t>
             </a:r>
-            <a:endParaRPr lang="de-DE" b="1" noProof="1" smtClean="0"/>
           </a:p>
           <a:p>
             <a:r>
@@ -4152,7 +4150,6 @@
               <a:rPr lang="de-DE" sz="1600" noProof="1" smtClean="0"/>
               <a:t>algorithm</a:t>
             </a:r>
-            <a:endParaRPr lang="de-DE" sz="1600" noProof="1" smtClean="0"/>
           </a:p>
           <a:p>
             <a:r>
@@ -4171,7 +4168,7 @@
         </p:nvCxnSpPr>
         <p:spPr>
           <a:xfrm>
-            <a:off x="2646895" y="3725326"/>
+            <a:off x="2646895" y="3961914"/>
             <a:ext cx="0" cy="274927"/>
           </a:xfrm>
           <a:prstGeom prst="line">
@@ -4202,8 +4199,8 @@
         </p:nvCxnSpPr>
         <p:spPr>
           <a:xfrm>
-            <a:off x="2393602" y="3986469"/>
-            <a:ext cx="265163" cy="0"/>
+            <a:off x="2443406" y="4235509"/>
+            <a:ext cx="203489" cy="0"/>
           </a:xfrm>
           <a:prstGeom prst="line">
             <a:avLst/>
@@ -4233,7 +4230,7 @@
         </p:nvCxnSpPr>
         <p:spPr>
           <a:xfrm>
-            <a:off x="2363931" y="3725326"/>
+            <a:off x="2379312" y="3961914"/>
             <a:ext cx="282964" cy="0"/>
           </a:xfrm>
           <a:prstGeom prst="line">
@@ -4265,7 +4262,7 @@
         <p:spPr>
           <a:xfrm>
             <a:off x="2881427" y="1234501"/>
-            <a:ext cx="968" cy="2611477"/>
+            <a:ext cx="968" cy="2846153"/>
           </a:xfrm>
           <a:prstGeom prst="line">
             <a:avLst/>
@@ -4329,7 +4326,7 @@
         </p:nvCxnSpPr>
         <p:spPr>
           <a:xfrm flipV="1">
-            <a:off x="2646895" y="3844066"/>
+            <a:off x="2645927" y="4080654"/>
             <a:ext cx="235500" cy="1912"/>
           </a:xfrm>
           <a:prstGeom prst="line">

</xml_diff>

<commit_message>
#4 updated schema diagram
</commit_message>
<xml_diff>
--- a/Metanome_DbSchema.pptx
+++ b/Metanome_DbSchema.pptx
@@ -304,7 +304,7 @@
           <a:p>
             <a:fld id="{115771A5-7D48-B749-BB03-920CA0774638}" type="datetimeFigureOut">
               <a:rPr lang="de-DE" smtClean="0"/>
-              <a:t>10.02.2014</a:t>
+              <a:t>20.04.2014</a:t>
             </a:fld>
             <a:endParaRPr lang="de-DE"/>
           </a:p>
@@ -474,7 +474,7 @@
           <a:p>
             <a:fld id="{115771A5-7D48-B749-BB03-920CA0774638}" type="datetimeFigureOut">
               <a:rPr lang="de-DE" smtClean="0"/>
-              <a:t>10.02.2014</a:t>
+              <a:t>20.04.2014</a:t>
             </a:fld>
             <a:endParaRPr lang="de-DE"/>
           </a:p>
@@ -654,7 +654,7 @@
           <a:p>
             <a:fld id="{115771A5-7D48-B749-BB03-920CA0774638}" type="datetimeFigureOut">
               <a:rPr lang="de-DE" smtClean="0"/>
-              <a:t>10.02.2014</a:t>
+              <a:t>20.04.2014</a:t>
             </a:fld>
             <a:endParaRPr lang="de-DE"/>
           </a:p>
@@ -824,7 +824,7 @@
           <a:p>
             <a:fld id="{115771A5-7D48-B749-BB03-920CA0774638}" type="datetimeFigureOut">
               <a:rPr lang="de-DE" smtClean="0"/>
-              <a:t>10.02.2014</a:t>
+              <a:t>20.04.2014</a:t>
             </a:fld>
             <a:endParaRPr lang="de-DE"/>
           </a:p>
@@ -1070,7 +1070,7 @@
           <a:p>
             <a:fld id="{115771A5-7D48-B749-BB03-920CA0774638}" type="datetimeFigureOut">
               <a:rPr lang="de-DE" smtClean="0"/>
-              <a:t>10.02.2014</a:t>
+              <a:t>20.04.2014</a:t>
             </a:fld>
             <a:endParaRPr lang="de-DE"/>
           </a:p>
@@ -1358,7 +1358,7 @@
           <a:p>
             <a:fld id="{115771A5-7D48-B749-BB03-920CA0774638}" type="datetimeFigureOut">
               <a:rPr lang="de-DE" smtClean="0"/>
-              <a:t>10.02.2014</a:t>
+              <a:t>20.04.2014</a:t>
             </a:fld>
             <a:endParaRPr lang="de-DE"/>
           </a:p>
@@ -1780,7 +1780,7 @@
           <a:p>
             <a:fld id="{115771A5-7D48-B749-BB03-920CA0774638}" type="datetimeFigureOut">
               <a:rPr lang="de-DE" smtClean="0"/>
-              <a:t>10.02.2014</a:t>
+              <a:t>20.04.2014</a:t>
             </a:fld>
             <a:endParaRPr lang="de-DE"/>
           </a:p>
@@ -1898,7 +1898,7 @@
           <a:p>
             <a:fld id="{115771A5-7D48-B749-BB03-920CA0774638}" type="datetimeFigureOut">
               <a:rPr lang="de-DE" smtClean="0"/>
-              <a:t>10.02.2014</a:t>
+              <a:t>20.04.2014</a:t>
             </a:fld>
             <a:endParaRPr lang="de-DE"/>
           </a:p>
@@ -1993,7 +1993,7 @@
           <a:p>
             <a:fld id="{115771A5-7D48-B749-BB03-920CA0774638}" type="datetimeFigureOut">
               <a:rPr lang="de-DE" smtClean="0"/>
-              <a:t>10.02.2014</a:t>
+              <a:t>20.04.2014</a:t>
             </a:fld>
             <a:endParaRPr lang="de-DE"/>
           </a:p>
@@ -2270,7 +2270,7 @@
           <a:p>
             <a:fld id="{115771A5-7D48-B749-BB03-920CA0774638}" type="datetimeFigureOut">
               <a:rPr lang="de-DE" smtClean="0"/>
-              <a:t>10.02.2014</a:t>
+              <a:t>20.04.2014</a:t>
             </a:fld>
             <a:endParaRPr lang="de-DE"/>
           </a:p>
@@ -2523,7 +2523,7 @@
           <a:p>
             <a:fld id="{115771A5-7D48-B749-BB03-920CA0774638}" type="datetimeFigureOut">
               <a:rPr lang="de-DE" smtClean="0"/>
-              <a:t>10.02.2014</a:t>
+              <a:t>20.04.2014</a:t>
             </a:fld>
             <a:endParaRPr lang="de-DE"/>
           </a:p>
@@ -2736,7 +2736,7 @@
           <a:p>
             <a:fld id="{115771A5-7D48-B749-BB03-920CA0774638}" type="datetimeFigureOut">
               <a:rPr lang="de-DE" smtClean="0"/>
-              <a:t>10.02.2014</a:t>
+              <a:t>20.04.2014</a:t>
             </a:fld>
             <a:endParaRPr lang="de-DE"/>
           </a:p>
@@ -3174,7 +3174,6 @@
               <a:rPr lang="de-DE" sz="1600" noProof="1" smtClean="0"/>
               <a:t>description</a:t>
             </a:r>
-            <a:endParaRPr lang="de-DE" sz="1600" noProof="1" smtClean="0"/>
           </a:p>
           <a:p>
             <a:r>
@@ -3260,7 +3259,6 @@
               <a:rPr lang="de-DE" sz="1600" noProof="1" smtClean="0"/>
               <a:t>end</a:t>
             </a:r>
-            <a:endParaRPr lang="de-DE" sz="1600" noProof="1" smtClean="0"/>
           </a:p>
           <a:p>
             <a:r>
@@ -3279,7 +3277,6 @@
               <a:rPr lang="de-DE" sz="1600" noProof="1" smtClean="0"/>
               <a:t>description</a:t>
             </a:r>
-            <a:endParaRPr lang="de-DE" sz="1600" noProof="1" smtClean="0"/>
           </a:p>
         </p:txBody>
       </p:sp>
@@ -3401,7 +3398,7 @@
         <p:spPr>
           <a:xfrm>
             <a:off x="6526334" y="5019176"/>
-            <a:ext cx="1744823" cy="1354217"/>
+            <a:ext cx="1972260" cy="1354217"/>
           </a:xfrm>
           <a:prstGeom prst="rect">
             <a:avLst/>
@@ -3434,10 +3431,9 @@
           </a:p>
           <a:p>
             <a:r>
-              <a:rPr lang="de-DE" sz="1600" u="sng" noProof="1"/>
-              <a:t>dbConnectionId</a:t>
-            </a:r>
-            <a:endParaRPr lang="de-DE" sz="1600" u="sng" noProof="1" smtClean="0"/>
+              <a:rPr lang="de-DE" sz="1600" u="sng" noProof="1" smtClean="0"/>
+              <a:t>id</a:t>
+            </a:r>
           </a:p>
           <a:p>
             <a:r>
@@ -3469,7 +3465,7 @@
         <p:spPr>
           <a:xfrm>
             <a:off x="6526334" y="3535402"/>
-            <a:ext cx="1744823" cy="1107996"/>
+            <a:ext cx="1972260" cy="1107996"/>
           </a:xfrm>
           <a:prstGeom prst="rect">
             <a:avLst/>
@@ -3509,15 +3505,14 @@
           <a:p>
             <a:r>
               <a:rPr lang="de-DE" sz="1600" noProof="1" smtClean="0"/>
-              <a:t>name</a:t>
+              <a:t>tableName</a:t>
             </a:r>
           </a:p>
           <a:p>
             <a:r>
               <a:rPr lang="de-DE" sz="1600" noProof="1" smtClean="0"/>
-              <a:t>dbConnectionId</a:t>
-            </a:r>
-            <a:endParaRPr lang="de-DE" sz="1600" noProof="1" smtClean="0"/>
+              <a:t>databaseConnection</a:t>
+            </a:r>
           </a:p>
         </p:txBody>
       </p:sp>
@@ -3529,8 +3524,8 @@
         </p:nvSpPr>
         <p:spPr>
           <a:xfrm>
-            <a:off x="4128696" y="3535403"/>
-            <a:ext cx="1744823" cy="1846659"/>
+            <a:off x="3686652" y="3535403"/>
+            <a:ext cx="2357481" cy="2585323"/>
           </a:xfrm>
           <a:prstGeom prst="rect">
             <a:avLst/>
@@ -3581,21 +3576,42 @@
           </a:p>
           <a:p>
             <a:r>
+              <a:rPr lang="de-DE" sz="1600" noProof="1"/>
+              <a:t>quotechar</a:t>
+            </a:r>
+            <a:endParaRPr lang="de-DE" sz="1600" noProof="1" smtClean="0"/>
+          </a:p>
+          <a:p>
+            <a:r>
+              <a:rPr lang="de-DE" sz="1600" noProof="1"/>
+              <a:t>escapechar</a:t>
+            </a:r>
+            <a:endParaRPr lang="de-DE" sz="1600" noProof="1" smtClean="0"/>
+          </a:p>
+          <a:p>
+            <a:r>
               <a:rPr lang="de-DE" sz="1600" noProof="1" smtClean="0"/>
-              <a:t>startLine</a:t>
+              <a:t>skipLines</a:t>
             </a:r>
           </a:p>
           <a:p>
             <a:r>
               <a:rPr lang="de-DE" sz="1600" noProof="1" smtClean="0"/>
-              <a:t>escapeChar</a:t>
+              <a:t>strictQuotes</a:t>
             </a:r>
           </a:p>
           <a:p>
             <a:r>
               <a:rPr lang="de-DE" sz="1600" noProof="1" smtClean="0"/>
-              <a:t>...</a:t>
-            </a:r>
+              <a:t>ignoreLeadingWhiteSpace</a:t>
+            </a:r>
+          </a:p>
+          <a:p>
+            <a:r>
+              <a:rPr lang="de-DE" sz="1600" noProof="1"/>
+              <a:t>hasHeader</a:t>
+            </a:r>
+            <a:endParaRPr lang="de-DE" sz="1600" noProof="1" smtClean="0"/>
           </a:p>
         </p:txBody>
       </p:sp>
@@ -3641,8 +3657,8 @@
         </p:nvCxnSpPr>
         <p:spPr>
           <a:xfrm>
-            <a:off x="3845732" y="2825104"/>
-            <a:ext cx="2908039" cy="0"/>
+            <a:off x="3477243" y="2825104"/>
+            <a:ext cx="3276528" cy="0"/>
           </a:xfrm>
           <a:prstGeom prst="straightConnector1">
             <a:avLst/>
@@ -3675,7 +3691,7 @@
         </p:nvCxnSpPr>
         <p:spPr>
           <a:xfrm>
-            <a:off x="3845732" y="2825105"/>
+            <a:off x="3477243" y="2825105"/>
             <a:ext cx="0" cy="1175148"/>
           </a:xfrm>
           <a:prstGeom prst="line">
@@ -3706,7 +3722,7 @@
         </p:nvCxnSpPr>
         <p:spPr>
           <a:xfrm>
-            <a:off x="3845732" y="4000253"/>
+            <a:off x="3465351" y="4000251"/>
             <a:ext cx="282964" cy="0"/>
           </a:xfrm>
           <a:prstGeom prst="line">

</xml_diff>

<commit_message>
#74 #61 added constructor in FileInput.java that assumes standard parser settings extended schema for skipDifferingLines attribute
</commit_message>
<xml_diff>
--- a/Metanome_DbSchema.pptx
+++ b/Metanome_DbSchema.pptx
@@ -304,7 +304,7 @@
           <a:p>
             <a:fld id="{115771A5-7D48-B749-BB03-920CA0774638}" type="datetimeFigureOut">
               <a:rPr lang="de-DE" smtClean="0"/>
-              <a:t>20.04.2014</a:t>
+              <a:t>19.05.2014</a:t>
             </a:fld>
             <a:endParaRPr lang="de-DE"/>
           </a:p>
@@ -474,7 +474,7 @@
           <a:p>
             <a:fld id="{115771A5-7D48-B749-BB03-920CA0774638}" type="datetimeFigureOut">
               <a:rPr lang="de-DE" smtClean="0"/>
-              <a:t>20.04.2014</a:t>
+              <a:t>19.05.2014</a:t>
             </a:fld>
             <a:endParaRPr lang="de-DE"/>
           </a:p>
@@ -654,7 +654,7 @@
           <a:p>
             <a:fld id="{115771A5-7D48-B749-BB03-920CA0774638}" type="datetimeFigureOut">
               <a:rPr lang="de-DE" smtClean="0"/>
-              <a:t>20.04.2014</a:t>
+              <a:t>19.05.2014</a:t>
             </a:fld>
             <a:endParaRPr lang="de-DE"/>
           </a:p>
@@ -824,7 +824,7 @@
           <a:p>
             <a:fld id="{115771A5-7D48-B749-BB03-920CA0774638}" type="datetimeFigureOut">
               <a:rPr lang="de-DE" smtClean="0"/>
-              <a:t>20.04.2014</a:t>
+              <a:t>19.05.2014</a:t>
             </a:fld>
             <a:endParaRPr lang="de-DE"/>
           </a:p>
@@ -1070,7 +1070,7 @@
           <a:p>
             <a:fld id="{115771A5-7D48-B749-BB03-920CA0774638}" type="datetimeFigureOut">
               <a:rPr lang="de-DE" smtClean="0"/>
-              <a:t>20.04.2014</a:t>
+              <a:t>19.05.2014</a:t>
             </a:fld>
             <a:endParaRPr lang="de-DE"/>
           </a:p>
@@ -1358,7 +1358,7 @@
           <a:p>
             <a:fld id="{115771A5-7D48-B749-BB03-920CA0774638}" type="datetimeFigureOut">
               <a:rPr lang="de-DE" smtClean="0"/>
-              <a:t>20.04.2014</a:t>
+              <a:t>19.05.2014</a:t>
             </a:fld>
             <a:endParaRPr lang="de-DE"/>
           </a:p>
@@ -1780,7 +1780,7 @@
           <a:p>
             <a:fld id="{115771A5-7D48-B749-BB03-920CA0774638}" type="datetimeFigureOut">
               <a:rPr lang="de-DE" smtClean="0"/>
-              <a:t>20.04.2014</a:t>
+              <a:t>19.05.2014</a:t>
             </a:fld>
             <a:endParaRPr lang="de-DE"/>
           </a:p>
@@ -1898,7 +1898,7 @@
           <a:p>
             <a:fld id="{115771A5-7D48-B749-BB03-920CA0774638}" type="datetimeFigureOut">
               <a:rPr lang="de-DE" smtClean="0"/>
-              <a:t>20.04.2014</a:t>
+              <a:t>19.05.2014</a:t>
             </a:fld>
             <a:endParaRPr lang="de-DE"/>
           </a:p>
@@ -1993,7 +1993,7 @@
           <a:p>
             <a:fld id="{115771A5-7D48-B749-BB03-920CA0774638}" type="datetimeFigureOut">
               <a:rPr lang="de-DE" smtClean="0"/>
-              <a:t>20.04.2014</a:t>
+              <a:t>19.05.2014</a:t>
             </a:fld>
             <a:endParaRPr lang="de-DE"/>
           </a:p>
@@ -2270,7 +2270,7 @@
           <a:p>
             <a:fld id="{115771A5-7D48-B749-BB03-920CA0774638}" type="datetimeFigureOut">
               <a:rPr lang="de-DE" smtClean="0"/>
-              <a:t>20.04.2014</a:t>
+              <a:t>19.05.2014</a:t>
             </a:fld>
             <a:endParaRPr lang="de-DE"/>
           </a:p>
@@ -2523,7 +2523,7 @@
           <a:p>
             <a:fld id="{115771A5-7D48-B749-BB03-920CA0774638}" type="datetimeFigureOut">
               <a:rPr lang="de-DE" smtClean="0"/>
-              <a:t>20.04.2014</a:t>
+              <a:t>19.05.2014</a:t>
             </a:fld>
             <a:endParaRPr lang="de-DE"/>
           </a:p>
@@ -2736,7 +2736,7 @@
           <a:p>
             <a:fld id="{115771A5-7D48-B749-BB03-920CA0774638}" type="datetimeFigureOut">
               <a:rPr lang="de-DE" smtClean="0"/>
-              <a:t>20.04.2014</a:t>
+              <a:t>19.05.2014</a:t>
             </a:fld>
             <a:endParaRPr lang="de-DE"/>
           </a:p>
@@ -3525,7 +3525,7 @@
         <p:spPr>
           <a:xfrm>
             <a:off x="3686652" y="3535403"/>
-            <a:ext cx="2357481" cy="2585323"/>
+            <a:ext cx="2357481" cy="2831544"/>
           </a:xfrm>
           <a:prstGeom prst="rect">
             <a:avLst/>
@@ -3608,8 +3608,14 @@
           </a:p>
           <a:p>
             <a:r>
-              <a:rPr lang="de-DE" sz="1600" noProof="1"/>
+              <a:rPr lang="de-DE" sz="1600" noProof="1" smtClean="0"/>
               <a:t>hasHeader</a:t>
+            </a:r>
+          </a:p>
+          <a:p>
+            <a:r>
+              <a:rPr lang="de-DE" sz="1600" noProof="1" smtClean="0"/>
+              <a:t>skipDifferingLines</a:t>
             </a:r>
             <a:endParaRPr lang="de-DE" sz="1600" noProof="1" smtClean="0"/>
           </a:p>

</xml_diff>

<commit_message>
#19 #20 added system field in schema documentation
</commit_message>
<xml_diff>
--- a/Metanome_DbSchema.pptx
+++ b/Metanome_DbSchema.pptx
@@ -304,7 +304,7 @@
           <a:p>
             <a:fld id="{115771A5-7D48-B749-BB03-920CA0774638}" type="datetimeFigureOut">
               <a:rPr lang="de-DE" smtClean="0"/>
-              <a:t>19.05.2014</a:t>
+              <a:t>07.07.2014</a:t>
             </a:fld>
             <a:endParaRPr lang="de-DE"/>
           </a:p>
@@ -474,7 +474,7 @@
           <a:p>
             <a:fld id="{115771A5-7D48-B749-BB03-920CA0774638}" type="datetimeFigureOut">
               <a:rPr lang="de-DE" smtClean="0"/>
-              <a:t>19.05.2014</a:t>
+              <a:t>07.07.2014</a:t>
             </a:fld>
             <a:endParaRPr lang="de-DE"/>
           </a:p>
@@ -654,7 +654,7 @@
           <a:p>
             <a:fld id="{115771A5-7D48-B749-BB03-920CA0774638}" type="datetimeFigureOut">
               <a:rPr lang="de-DE" smtClean="0"/>
-              <a:t>19.05.2014</a:t>
+              <a:t>07.07.2014</a:t>
             </a:fld>
             <a:endParaRPr lang="de-DE"/>
           </a:p>
@@ -824,7 +824,7 @@
           <a:p>
             <a:fld id="{115771A5-7D48-B749-BB03-920CA0774638}" type="datetimeFigureOut">
               <a:rPr lang="de-DE" smtClean="0"/>
-              <a:t>19.05.2014</a:t>
+              <a:t>07.07.2014</a:t>
             </a:fld>
             <a:endParaRPr lang="de-DE"/>
           </a:p>
@@ -1070,7 +1070,7 @@
           <a:p>
             <a:fld id="{115771A5-7D48-B749-BB03-920CA0774638}" type="datetimeFigureOut">
               <a:rPr lang="de-DE" smtClean="0"/>
-              <a:t>19.05.2014</a:t>
+              <a:t>07.07.2014</a:t>
             </a:fld>
             <a:endParaRPr lang="de-DE"/>
           </a:p>
@@ -1358,7 +1358,7 @@
           <a:p>
             <a:fld id="{115771A5-7D48-B749-BB03-920CA0774638}" type="datetimeFigureOut">
               <a:rPr lang="de-DE" smtClean="0"/>
-              <a:t>19.05.2014</a:t>
+              <a:t>07.07.2014</a:t>
             </a:fld>
             <a:endParaRPr lang="de-DE"/>
           </a:p>
@@ -1780,7 +1780,7 @@
           <a:p>
             <a:fld id="{115771A5-7D48-B749-BB03-920CA0774638}" type="datetimeFigureOut">
               <a:rPr lang="de-DE" smtClean="0"/>
-              <a:t>19.05.2014</a:t>
+              <a:t>07.07.2014</a:t>
             </a:fld>
             <a:endParaRPr lang="de-DE"/>
           </a:p>
@@ -1898,7 +1898,7 @@
           <a:p>
             <a:fld id="{115771A5-7D48-B749-BB03-920CA0774638}" type="datetimeFigureOut">
               <a:rPr lang="de-DE" smtClean="0"/>
-              <a:t>19.05.2014</a:t>
+              <a:t>07.07.2014</a:t>
             </a:fld>
             <a:endParaRPr lang="de-DE"/>
           </a:p>
@@ -1993,7 +1993,7 @@
           <a:p>
             <a:fld id="{115771A5-7D48-B749-BB03-920CA0774638}" type="datetimeFigureOut">
               <a:rPr lang="de-DE" smtClean="0"/>
-              <a:t>19.05.2014</a:t>
+              <a:t>07.07.2014</a:t>
             </a:fld>
             <a:endParaRPr lang="de-DE"/>
           </a:p>
@@ -2270,7 +2270,7 @@
           <a:p>
             <a:fld id="{115771A5-7D48-B749-BB03-920CA0774638}" type="datetimeFigureOut">
               <a:rPr lang="de-DE" smtClean="0"/>
-              <a:t>19.05.2014</a:t>
+              <a:t>07.07.2014</a:t>
             </a:fld>
             <a:endParaRPr lang="de-DE"/>
           </a:p>
@@ -2523,7 +2523,7 @@
           <a:p>
             <a:fld id="{115771A5-7D48-B749-BB03-920CA0774638}" type="datetimeFigureOut">
               <a:rPr lang="de-DE" smtClean="0"/>
-              <a:t>19.05.2014</a:t>
+              <a:t>07.07.2014</a:t>
             </a:fld>
             <a:endParaRPr lang="de-DE"/>
           </a:p>
@@ -2736,7 +2736,7 @@
           <a:p>
             <a:fld id="{115771A5-7D48-B749-BB03-920CA0774638}" type="datetimeFigureOut">
               <a:rPr lang="de-DE" smtClean="0"/>
-              <a:t>19.05.2014</a:t>
+              <a:t>07.07.2014</a:t>
             </a:fld>
             <a:endParaRPr lang="de-DE"/>
           </a:p>
@@ -3398,7 +3398,7 @@
         <p:spPr>
           <a:xfrm>
             <a:off x="6526334" y="5019176"/>
-            <a:ext cx="1972260" cy="1354217"/>
+            <a:ext cx="1972260" cy="1631216"/>
           </a:xfrm>
           <a:prstGeom prst="rect">
             <a:avLst/>
@@ -3452,7 +3452,13 @@
               <a:rPr lang="de-DE" sz="1600" noProof="1" smtClean="0"/>
               <a:t>password</a:t>
             </a:r>
-            <a:endParaRPr lang="de-DE" noProof="1"/>
+          </a:p>
+          <a:p>
+            <a:r>
+              <a:rPr lang="de-DE" sz="1600" noProof="1"/>
+              <a:t>system</a:t>
+            </a:r>
+            <a:endParaRPr lang="de-DE" sz="1600" noProof="1"/>
           </a:p>
         </p:txBody>
       </p:sp>
@@ -3617,7 +3623,6 @@
               <a:rPr lang="de-DE" sz="1600" noProof="1" smtClean="0"/>
               <a:t>skipDifferingLines</a:t>
             </a:r>
-            <a:endParaRPr lang="de-DE" sz="1600" noProof="1" smtClean="0"/>
           </a:p>
         </p:txBody>
       </p:sp>

</xml_diff>

<commit_message>
#180 Add fields (hasFileInput, hasTableInput, hasRelationalInput, hasDatabaseConnection) to algorithm.
</commit_message>
<xml_diff>
--- a/Metanome_DbSchema.pptx
+++ b/Metanome_DbSchema.pptx
@@ -53,7 +53,7 @@
       </p:grpSpPr>
       <p:sp>
         <p:nvSpPr>
-          <p:cNvPr id="26" name="PlaceHolder 1"/>
+          <p:cNvPr id="23" name="PlaceHolder 1"/>
           <p:cNvSpPr>
             <a:spLocks noGrp="1"/>
           </p:cNvSpPr>
@@ -64,7 +64,7 @@
         <p:spPr>
           <a:xfrm>
             <a:off x="685800" y="2130480"/>
-            <a:ext cx="7772040" cy="1469880"/>
+            <a:ext cx="7771680" cy="1469880"/>
           </a:xfrm>
           <a:prstGeom prst="rect">
             <a:avLst/>
@@ -73,13 +73,14 @@
         <p:txBody>
           <a:bodyPr lIns="0" rIns="0" tIns="0" bIns="0" anchor="ctr"/>
           <a:p>
-            <a:endParaRPr/>
-          </a:p>
-        </p:txBody>
-      </p:sp>
-      <p:sp>
-        <p:nvSpPr>
-          <p:cNvPr id="27" name="PlaceHolder 2"/>
+            <a:pPr algn="ctr"/>
+            <a:endParaRPr/>
+          </a:p>
+        </p:txBody>
+      </p:sp>
+      <p:sp>
+        <p:nvSpPr>
+          <p:cNvPr id="24" name="PlaceHolder 2"/>
           <p:cNvSpPr>
             <a:spLocks noGrp="1"/>
           </p:cNvSpPr>
@@ -105,7 +106,7 @@
       </p:sp>
       <p:sp>
         <p:nvSpPr>
-          <p:cNvPr id="28" name="PlaceHolder 3"/>
+          <p:cNvPr id="25" name="PlaceHolder 3"/>
           <p:cNvSpPr>
             <a:spLocks noGrp="1"/>
           </p:cNvSpPr>
@@ -153,7 +154,7 @@
       </p:grpSpPr>
       <p:sp>
         <p:nvSpPr>
-          <p:cNvPr id="29" name="PlaceHolder 1"/>
+          <p:cNvPr id="26" name="PlaceHolder 1"/>
           <p:cNvSpPr>
             <a:spLocks noGrp="1"/>
           </p:cNvSpPr>
@@ -164,7 +165,7 @@
         <p:spPr>
           <a:xfrm>
             <a:off x="685800" y="2130480"/>
-            <a:ext cx="7772040" cy="1469880"/>
+            <a:ext cx="7771680" cy="1469880"/>
           </a:xfrm>
           <a:prstGeom prst="rect">
             <a:avLst/>
@@ -173,13 +174,14 @@
         <p:txBody>
           <a:bodyPr lIns="0" rIns="0" tIns="0" bIns="0" anchor="ctr"/>
           <a:p>
-            <a:endParaRPr/>
-          </a:p>
-        </p:txBody>
-      </p:sp>
-      <p:sp>
-        <p:nvSpPr>
-          <p:cNvPr id="30" name="PlaceHolder 2"/>
+            <a:pPr algn="ctr"/>
+            <a:endParaRPr/>
+          </a:p>
+        </p:txBody>
+      </p:sp>
+      <p:sp>
+        <p:nvSpPr>
+          <p:cNvPr id="27" name="PlaceHolder 2"/>
           <p:cNvSpPr>
             <a:spLocks noGrp="1"/>
           </p:cNvSpPr>
@@ -205,7 +207,7 @@
       </p:sp>
       <p:sp>
         <p:nvSpPr>
-          <p:cNvPr id="31" name="PlaceHolder 3"/>
+          <p:cNvPr id="28" name="PlaceHolder 3"/>
           <p:cNvSpPr>
             <a:spLocks noGrp="1"/>
           </p:cNvSpPr>
@@ -231,7 +233,7 @@
       </p:sp>
       <p:sp>
         <p:nvSpPr>
-          <p:cNvPr id="32" name="PlaceHolder 4"/>
+          <p:cNvPr id="29" name="PlaceHolder 4"/>
           <p:cNvSpPr>
             <a:spLocks noGrp="1"/>
           </p:cNvSpPr>
@@ -257,7 +259,7 @@
       </p:sp>
       <p:sp>
         <p:nvSpPr>
-          <p:cNvPr id="33" name="PlaceHolder 5"/>
+          <p:cNvPr id="30" name="PlaceHolder 5"/>
           <p:cNvSpPr>
             <a:spLocks noGrp="1"/>
           </p:cNvSpPr>
@@ -305,7 +307,7 @@
       </p:grpSpPr>
       <p:sp>
         <p:nvSpPr>
-          <p:cNvPr id="34" name="PlaceHolder 1"/>
+          <p:cNvPr id="31" name="PlaceHolder 1"/>
           <p:cNvSpPr>
             <a:spLocks noGrp="1"/>
           </p:cNvSpPr>
@@ -316,7 +318,7 @@
         <p:spPr>
           <a:xfrm>
             <a:off x="685800" y="2130480"/>
-            <a:ext cx="7772040" cy="1469880"/>
+            <a:ext cx="7771680" cy="1469880"/>
           </a:xfrm>
           <a:prstGeom prst="rect">
             <a:avLst/>
@@ -325,13 +327,14 @@
         <p:txBody>
           <a:bodyPr lIns="0" rIns="0" tIns="0" bIns="0" anchor="ctr"/>
           <a:p>
-            <a:endParaRPr/>
-          </a:p>
-        </p:txBody>
-      </p:sp>
-      <p:sp>
-        <p:nvSpPr>
-          <p:cNvPr id="35" name="PlaceHolder 2"/>
+            <a:pPr algn="ctr"/>
+            <a:endParaRPr/>
+          </a:p>
+        </p:txBody>
+      </p:sp>
+      <p:sp>
+        <p:nvSpPr>
+          <p:cNvPr id="32" name="PlaceHolder 2"/>
           <p:cNvSpPr>
             <a:spLocks noGrp="1"/>
           </p:cNvSpPr>
@@ -357,7 +360,7 @@
       </p:sp>
       <p:sp>
         <p:nvSpPr>
-          <p:cNvPr id="36" name="PlaceHolder 3"/>
+          <p:cNvPr id="33" name="PlaceHolder 3"/>
           <p:cNvSpPr>
             <a:spLocks noGrp="1"/>
           </p:cNvSpPr>
@@ -383,7 +386,7 @@
       </p:sp>
       <p:pic>
         <p:nvPicPr>
-          <p:cNvPr id="37" name="" descr=""/>
+          <p:cNvPr id="34" name="" descr=""/>
           <p:cNvPicPr/>
           <p:nvPr/>
         </p:nvPicPr>
@@ -408,7 +411,7 @@
       </p:pic>
       <p:pic>
         <p:nvPicPr>
-          <p:cNvPr id="38" name="" descr=""/>
+          <p:cNvPr id="35" name="" descr=""/>
           <p:cNvPicPr/>
           <p:nvPr/>
         </p:nvPicPr>
@@ -455,7 +458,7 @@
       </p:grpSpPr>
       <p:sp>
         <p:nvSpPr>
-          <p:cNvPr id="5" name="PlaceHolder 1"/>
+          <p:cNvPr id="2" name="PlaceHolder 1"/>
           <p:cNvSpPr>
             <a:spLocks noGrp="1"/>
           </p:cNvSpPr>
@@ -466,7 +469,7 @@
         <p:spPr>
           <a:xfrm>
             <a:off x="685800" y="2130480"/>
-            <a:ext cx="7772040" cy="1469880"/>
+            <a:ext cx="7771680" cy="1469880"/>
           </a:xfrm>
           <a:prstGeom prst="rect">
             <a:avLst/>
@@ -475,13 +478,14 @@
         <p:txBody>
           <a:bodyPr lIns="0" rIns="0" tIns="0" bIns="0" anchor="ctr"/>
           <a:p>
-            <a:endParaRPr/>
-          </a:p>
-        </p:txBody>
-      </p:sp>
-      <p:sp>
-        <p:nvSpPr>
-          <p:cNvPr id="6" name="PlaceHolder 2"/>
+            <a:pPr algn="ctr"/>
+            <a:endParaRPr/>
+          </a:p>
+        </p:txBody>
+      </p:sp>
+      <p:sp>
+        <p:nvSpPr>
+          <p:cNvPr id="3" name="PlaceHolder 2"/>
           <p:cNvSpPr>
             <a:spLocks noGrp="1"/>
           </p:cNvSpPr>
@@ -530,7 +534,7 @@
       </p:grpSpPr>
       <p:sp>
         <p:nvSpPr>
-          <p:cNvPr id="7" name="PlaceHolder 1"/>
+          <p:cNvPr id="4" name="PlaceHolder 1"/>
           <p:cNvSpPr>
             <a:spLocks noGrp="1"/>
           </p:cNvSpPr>
@@ -541,7 +545,7 @@
         <p:spPr>
           <a:xfrm>
             <a:off x="685800" y="2130480"/>
-            <a:ext cx="7772040" cy="1469880"/>
+            <a:ext cx="7771680" cy="1469880"/>
           </a:xfrm>
           <a:prstGeom prst="rect">
             <a:avLst/>
@@ -550,13 +554,14 @@
         <p:txBody>
           <a:bodyPr lIns="0" rIns="0" tIns="0" bIns="0" anchor="ctr"/>
           <a:p>
-            <a:endParaRPr/>
-          </a:p>
-        </p:txBody>
-      </p:sp>
-      <p:sp>
-        <p:nvSpPr>
-          <p:cNvPr id="8" name="PlaceHolder 2"/>
+            <a:pPr algn="ctr"/>
+            <a:endParaRPr/>
+          </a:p>
+        </p:txBody>
+      </p:sp>
+      <p:sp>
+        <p:nvSpPr>
+          <p:cNvPr id="5" name="PlaceHolder 2"/>
           <p:cNvSpPr>
             <a:spLocks noGrp="1"/>
           </p:cNvSpPr>
@@ -604,7 +609,7 @@
       </p:grpSpPr>
       <p:sp>
         <p:nvSpPr>
-          <p:cNvPr id="9" name="PlaceHolder 1"/>
+          <p:cNvPr id="6" name="PlaceHolder 1"/>
           <p:cNvSpPr>
             <a:spLocks noGrp="1"/>
           </p:cNvSpPr>
@@ -615,7 +620,7 @@
         <p:spPr>
           <a:xfrm>
             <a:off x="685800" y="2130480"/>
-            <a:ext cx="7772040" cy="1469880"/>
+            <a:ext cx="7771680" cy="1469880"/>
           </a:xfrm>
           <a:prstGeom prst="rect">
             <a:avLst/>
@@ -624,13 +629,14 @@
         <p:txBody>
           <a:bodyPr lIns="0" rIns="0" tIns="0" bIns="0" anchor="ctr"/>
           <a:p>
-            <a:endParaRPr/>
-          </a:p>
-        </p:txBody>
-      </p:sp>
-      <p:sp>
-        <p:nvSpPr>
-          <p:cNvPr id="10" name="PlaceHolder 2"/>
+            <a:pPr algn="ctr"/>
+            <a:endParaRPr/>
+          </a:p>
+        </p:txBody>
+      </p:sp>
+      <p:sp>
+        <p:nvSpPr>
+          <p:cNvPr id="7" name="PlaceHolder 2"/>
           <p:cNvSpPr>
             <a:spLocks noGrp="1"/>
           </p:cNvSpPr>
@@ -656,7 +662,7 @@
       </p:sp>
       <p:sp>
         <p:nvSpPr>
-          <p:cNvPr id="11" name="PlaceHolder 3"/>
+          <p:cNvPr id="8" name="PlaceHolder 3"/>
           <p:cNvSpPr>
             <a:spLocks noGrp="1"/>
           </p:cNvSpPr>
@@ -704,7 +710,7 @@
       </p:grpSpPr>
       <p:sp>
         <p:nvSpPr>
-          <p:cNvPr id="12" name="PlaceHolder 1"/>
+          <p:cNvPr id="9" name="PlaceHolder 1"/>
           <p:cNvSpPr>
             <a:spLocks noGrp="1"/>
           </p:cNvSpPr>
@@ -715,7 +721,7 @@
         <p:spPr>
           <a:xfrm>
             <a:off x="685800" y="2130480"/>
-            <a:ext cx="7772040" cy="1469880"/>
+            <a:ext cx="7771680" cy="1469880"/>
           </a:xfrm>
           <a:prstGeom prst="rect">
             <a:avLst/>
@@ -724,6 +730,7 @@
         <p:txBody>
           <a:bodyPr lIns="0" rIns="0" tIns="0" bIns="0" anchor="ctr"/>
           <a:p>
+            <a:pPr algn="ctr"/>
             <a:endParaRPr/>
           </a:p>
         </p:txBody>
@@ -752,7 +759,7 @@
       </p:grpSpPr>
       <p:sp>
         <p:nvSpPr>
-          <p:cNvPr id="13" name="PlaceHolder 1"/>
+          <p:cNvPr id="10" name="PlaceHolder 1"/>
           <p:cNvSpPr>
             <a:spLocks noGrp="1"/>
           </p:cNvSpPr>
@@ -763,7 +770,7 @@
         <p:spPr>
           <a:xfrm>
             <a:off x="685800" y="2130480"/>
-            <a:ext cx="7772040" cy="6813360"/>
+            <a:ext cx="7771680" cy="6813360"/>
           </a:xfrm>
           <a:prstGeom prst="rect">
             <a:avLst/>
@@ -801,7 +808,7 @@
       </p:grpSpPr>
       <p:sp>
         <p:nvSpPr>
-          <p:cNvPr id="14" name="PlaceHolder 1"/>
+          <p:cNvPr id="11" name="PlaceHolder 1"/>
           <p:cNvSpPr>
             <a:spLocks noGrp="1"/>
           </p:cNvSpPr>
@@ -812,7 +819,7 @@
         <p:spPr>
           <a:xfrm>
             <a:off x="685800" y="2130480"/>
-            <a:ext cx="7772040" cy="1469880"/>
+            <a:ext cx="7771680" cy="1469880"/>
           </a:xfrm>
           <a:prstGeom prst="rect">
             <a:avLst/>
@@ -821,13 +828,14 @@
         <p:txBody>
           <a:bodyPr lIns="0" rIns="0" tIns="0" bIns="0" anchor="ctr"/>
           <a:p>
-            <a:endParaRPr/>
-          </a:p>
-        </p:txBody>
-      </p:sp>
-      <p:sp>
-        <p:nvSpPr>
-          <p:cNvPr id="15" name="PlaceHolder 2"/>
+            <a:pPr algn="ctr"/>
+            <a:endParaRPr/>
+          </a:p>
+        </p:txBody>
+      </p:sp>
+      <p:sp>
+        <p:nvSpPr>
+          <p:cNvPr id="12" name="PlaceHolder 2"/>
           <p:cNvSpPr>
             <a:spLocks noGrp="1"/>
           </p:cNvSpPr>
@@ -853,7 +861,7 @@
       </p:sp>
       <p:sp>
         <p:nvSpPr>
-          <p:cNvPr id="16" name="PlaceHolder 3"/>
+          <p:cNvPr id="13" name="PlaceHolder 3"/>
           <p:cNvSpPr>
             <a:spLocks noGrp="1"/>
           </p:cNvSpPr>
@@ -879,7 +887,7 @@
       </p:sp>
       <p:sp>
         <p:nvSpPr>
-          <p:cNvPr id="17" name="PlaceHolder 4"/>
+          <p:cNvPr id="14" name="PlaceHolder 4"/>
           <p:cNvSpPr>
             <a:spLocks noGrp="1"/>
           </p:cNvSpPr>
@@ -927,7 +935,7 @@
       </p:grpSpPr>
       <p:sp>
         <p:nvSpPr>
-          <p:cNvPr id="18" name="PlaceHolder 1"/>
+          <p:cNvPr id="15" name="PlaceHolder 1"/>
           <p:cNvSpPr>
             <a:spLocks noGrp="1"/>
           </p:cNvSpPr>
@@ -938,7 +946,7 @@
         <p:spPr>
           <a:xfrm>
             <a:off x="685800" y="2130480"/>
-            <a:ext cx="7772040" cy="1469880"/>
+            <a:ext cx="7771680" cy="1469880"/>
           </a:xfrm>
           <a:prstGeom prst="rect">
             <a:avLst/>
@@ -947,13 +955,14 @@
         <p:txBody>
           <a:bodyPr lIns="0" rIns="0" tIns="0" bIns="0" anchor="ctr"/>
           <a:p>
-            <a:endParaRPr/>
-          </a:p>
-        </p:txBody>
-      </p:sp>
-      <p:sp>
-        <p:nvSpPr>
-          <p:cNvPr id="19" name="PlaceHolder 2"/>
+            <a:pPr algn="ctr"/>
+            <a:endParaRPr/>
+          </a:p>
+        </p:txBody>
+      </p:sp>
+      <p:sp>
+        <p:nvSpPr>
+          <p:cNvPr id="16" name="PlaceHolder 2"/>
           <p:cNvSpPr>
             <a:spLocks noGrp="1"/>
           </p:cNvSpPr>
@@ -979,7 +988,7 @@
       </p:sp>
       <p:sp>
         <p:nvSpPr>
-          <p:cNvPr id="20" name="PlaceHolder 3"/>
+          <p:cNvPr id="17" name="PlaceHolder 3"/>
           <p:cNvSpPr>
             <a:spLocks noGrp="1"/>
           </p:cNvSpPr>
@@ -1005,7 +1014,7 @@
       </p:sp>
       <p:sp>
         <p:nvSpPr>
-          <p:cNvPr id="21" name="PlaceHolder 4"/>
+          <p:cNvPr id="18" name="PlaceHolder 4"/>
           <p:cNvSpPr>
             <a:spLocks noGrp="1"/>
           </p:cNvSpPr>
@@ -1053,7 +1062,7 @@
       </p:grpSpPr>
       <p:sp>
         <p:nvSpPr>
-          <p:cNvPr id="22" name="PlaceHolder 1"/>
+          <p:cNvPr id="19" name="PlaceHolder 1"/>
           <p:cNvSpPr>
             <a:spLocks noGrp="1"/>
           </p:cNvSpPr>
@@ -1064,7 +1073,7 @@
         <p:spPr>
           <a:xfrm>
             <a:off x="685800" y="2130480"/>
-            <a:ext cx="7772040" cy="1469880"/>
+            <a:ext cx="7771680" cy="1469880"/>
           </a:xfrm>
           <a:prstGeom prst="rect">
             <a:avLst/>
@@ -1073,13 +1082,14 @@
         <p:txBody>
           <a:bodyPr lIns="0" rIns="0" tIns="0" bIns="0" anchor="ctr"/>
           <a:p>
-            <a:endParaRPr/>
-          </a:p>
-        </p:txBody>
-      </p:sp>
-      <p:sp>
-        <p:nvSpPr>
-          <p:cNvPr id="23" name="PlaceHolder 2"/>
+            <a:pPr algn="ctr"/>
+            <a:endParaRPr/>
+          </a:p>
+        </p:txBody>
+      </p:sp>
+      <p:sp>
+        <p:nvSpPr>
+          <p:cNvPr id="20" name="PlaceHolder 2"/>
           <p:cNvSpPr>
             <a:spLocks noGrp="1"/>
           </p:cNvSpPr>
@@ -1105,7 +1115,7 @@
       </p:sp>
       <p:sp>
         <p:nvSpPr>
-          <p:cNvPr id="24" name="PlaceHolder 3"/>
+          <p:cNvPr id="21" name="PlaceHolder 3"/>
           <p:cNvSpPr>
             <a:spLocks noGrp="1"/>
           </p:cNvSpPr>
@@ -1131,7 +1141,7 @@
       </p:sp>
       <p:sp>
         <p:nvSpPr>
-          <p:cNvPr id="25" name="PlaceHolder 4"/>
+          <p:cNvPr id="22" name="PlaceHolder 4"/>
           <p:cNvSpPr>
             <a:spLocks noGrp="1"/>
           </p:cNvSpPr>
@@ -1197,28 +1207,20 @@
         <p:spPr>
           <a:xfrm>
             <a:off x="685800" y="2130480"/>
-            <a:ext cx="7772040" cy="1469520"/>
-          </a:xfrm>
-          <a:prstGeom prst="rect">
-            <a:avLst/>
-          </a:prstGeom>
-        </p:spPr>
-        <p:txBody>
-          <a:bodyPr anchor="ctr"/>
-          <a:p>
-            <a:pPr algn="ctr">
-              <a:lnSpc>
-                <a:spcPct val="100000"/>
-              </a:lnSpc>
-            </a:pPr>
-            <a:r>
-              <a:rPr lang="de-DE" sz="4400">
-                <a:solidFill>
-                  <a:srgbClr val="000000"/>
-                </a:solidFill>
-                <a:latin typeface="Calibri"/>
-              </a:rPr>
-              <a:t>Click to edit the title text formatMastertitelformat bearbeiten</a:t>
+            <a:ext cx="7771680" cy="1469520"/>
+          </a:xfrm>
+          <a:prstGeom prst="rect">
+            <a:avLst/>
+          </a:prstGeom>
+        </p:spPr>
+        <p:txBody>
+          <a:bodyPr lIns="0" rIns="0" tIns="0" bIns="0" anchor="ctr"/>
+          <a:p>
+            <a:r>
+              <a:rPr lang="de-DE">
+                <a:latin typeface="Arial"/>
+              </a:rPr>
+              <a:t>Click to edit the title text format</a:t>
             </a:r>
             <a:endParaRPr/>
           </a:p>
@@ -1227,112 +1229,6 @@
       <p:sp>
         <p:nvSpPr>
           <p:cNvPr id="1" name="PlaceHolder 2"/>
-          <p:cNvSpPr>
-            <a:spLocks noGrp="1"/>
-          </p:cNvSpPr>
-          <p:nvPr>
-            <p:ph type="dt"/>
-          </p:nvPr>
-        </p:nvSpPr>
-        <p:spPr>
-          <a:xfrm>
-            <a:off x="457200" y="6356520"/>
-            <a:ext cx="2133360" cy="364680"/>
-          </a:xfrm>
-          <a:prstGeom prst="rect">
-            <a:avLst/>
-          </a:prstGeom>
-        </p:spPr>
-        <p:txBody>
-          <a:bodyPr anchor="ctr"/>
-          <a:p>
-            <a:pPr>
-              <a:lnSpc>
-                <a:spcPct val="100000"/>
-              </a:lnSpc>
-            </a:pPr>
-            <a:r>
-              <a:rPr lang="de-DE" sz="1200">
-                <a:solidFill>
-                  <a:srgbClr val="8b8b8b"/>
-                </a:solidFill>
-                <a:latin typeface="Calibri"/>
-              </a:rPr>
-              <a:t>12.09.14</a:t>
-            </a:r>
-            <a:endParaRPr/>
-          </a:p>
-        </p:txBody>
-      </p:sp>
-      <p:sp>
-        <p:nvSpPr>
-          <p:cNvPr id="2" name="PlaceHolder 3"/>
-          <p:cNvSpPr>
-            <a:spLocks noGrp="1"/>
-          </p:cNvSpPr>
-          <p:nvPr>
-            <p:ph type="ftr"/>
-          </p:nvPr>
-        </p:nvSpPr>
-        <p:spPr>
-          <a:xfrm>
-            <a:off x="3124080" y="6356520"/>
-            <a:ext cx="2895120" cy="364680"/>
-          </a:xfrm>
-          <a:prstGeom prst="rect">
-            <a:avLst/>
-          </a:prstGeom>
-        </p:spPr>
-        <p:txBody>
-          <a:bodyPr anchor="ctr"/>
-          <a:p>
-            <a:endParaRPr/>
-          </a:p>
-        </p:txBody>
-      </p:sp>
-      <p:sp>
-        <p:nvSpPr>
-          <p:cNvPr id="3" name="PlaceHolder 4"/>
-          <p:cNvSpPr>
-            <a:spLocks noGrp="1"/>
-          </p:cNvSpPr>
-          <p:nvPr>
-            <p:ph type="sldNum"/>
-          </p:nvPr>
-        </p:nvSpPr>
-        <p:spPr>
-          <a:xfrm>
-            <a:off x="6553080" y="6356520"/>
-            <a:ext cx="2133360" cy="364680"/>
-          </a:xfrm>
-          <a:prstGeom prst="rect">
-            <a:avLst/>
-          </a:prstGeom>
-        </p:spPr>
-        <p:txBody>
-          <a:bodyPr anchor="ctr"/>
-          <a:p>
-            <a:pPr algn="r">
-              <a:lnSpc>
-                <a:spcPct val="100000"/>
-              </a:lnSpc>
-            </a:pPr>
-            <a:fld id="{7B917F04-2D9D-44F2-A3B3-6B9ECDC4CFF2}" type="slidenum">
-              <a:rPr lang="de-DE" sz="1200">
-                <a:solidFill>
-                  <a:srgbClr val="8b8b8b"/>
-                </a:solidFill>
-                <a:latin typeface="Calibri"/>
-              </a:rPr>
-              <a:t>&lt;number&gt;</a:t>
-            </a:fld>
-            <a:endParaRPr/>
-          </a:p>
-        </p:txBody>
-      </p:sp>
-      <p:sp>
-        <p:nvSpPr>
-          <p:cNvPr id="4" name="PlaceHolder 5"/>
           <p:cNvSpPr>
             <a:spLocks noGrp="1"/>
           </p:cNvSpPr>
@@ -1359,7 +1255,7 @@
             </a:pPr>
             <a:r>
               <a:rPr lang="de-DE" sz="3200">
-                <a:latin typeface="Calibri"/>
+                <a:latin typeface="Arial"/>
               </a:rPr>
               <a:t>Click to edit the outline text format</a:t>
             </a:r>
@@ -1372,8 +1268,8 @@
               <a:buChar char=""/>
             </a:pPr>
             <a:r>
-              <a:rPr lang="de-DE" sz="2400">
-                <a:latin typeface="Calibri"/>
+              <a:rPr lang="de-DE" sz="2800">
+                <a:latin typeface="Arial"/>
               </a:rPr>
               <a:t>Second Outline Level</a:t>
             </a:r>
@@ -1386,8 +1282,8 @@
               <a:buChar char=""/>
             </a:pPr>
             <a:r>
-              <a:rPr lang="de-DE" sz="2000">
-                <a:latin typeface="Calibri"/>
+              <a:rPr lang="de-DE" sz="2400">
+                <a:latin typeface="Arial"/>
               </a:rPr>
               <a:t>Third Outline Level</a:t>
             </a:r>
@@ -1401,7 +1297,7 @@
             </a:pPr>
             <a:r>
               <a:rPr lang="de-DE" sz="2000">
-                <a:latin typeface="Calibri"/>
+                <a:latin typeface="Arial"/>
               </a:rPr>
               <a:t>Fourth Outline Level</a:t>
             </a:r>
@@ -1415,7 +1311,7 @@
             </a:pPr>
             <a:r>
               <a:rPr lang="de-DE" sz="2000">
-                <a:latin typeface="Calibri"/>
+                <a:latin typeface="Arial"/>
               </a:rPr>
               <a:t>Fifth Outline Level</a:t>
             </a:r>
@@ -1429,7 +1325,7 @@
             </a:pPr>
             <a:r>
               <a:rPr lang="de-DE" sz="2000">
-                <a:latin typeface="Calibri"/>
+                <a:latin typeface="Arial"/>
               </a:rPr>
               <a:t>Sixth Outline Level</a:t>
             </a:r>
@@ -1443,7 +1339,7 @@
             </a:pPr>
             <a:r>
               <a:rPr lang="de-DE" sz="2000">
-                <a:latin typeface="Calibri"/>
+                <a:latin typeface="Arial"/>
               </a:rPr>
               <a:t>Seventh Outline Level</a:t>
             </a:r>
@@ -1490,14 +1386,14 @@
       </p:grpSpPr>
       <p:sp>
         <p:nvSpPr>
-          <p:cNvPr id="39" name="CustomShape 1"/>
+          <p:cNvPr id="36" name="CustomShape 1"/>
           <p:cNvSpPr/>
           <p:nvPr/>
         </p:nvSpPr>
         <p:spPr>
           <a:xfrm>
             <a:off x="640800" y="627120"/>
-            <a:ext cx="1744560" cy="2311560"/>
+            <a:ext cx="1744200" cy="3836880"/>
           </a:xfrm>
           <a:prstGeom prst="rect">
             <a:avLst/>
@@ -1667,18 +1563,86 @@
             </a:r>
             <a:endParaRPr/>
           </a:p>
-        </p:txBody>
-      </p:sp>
-      <p:sp>
-        <p:nvSpPr>
-          <p:cNvPr id="40" name="CustomShape 2"/>
+          <a:p>
+            <a:pPr>
+              <a:lnSpc>
+                <a:spcPct val="100000"/>
+              </a:lnSpc>
+            </a:pPr>
+            <a:r>
+              <a:rPr lang="de-DE" sz="1600">
+                <a:solidFill>
+                  <a:srgbClr val="000000"/>
+                </a:solidFill>
+                <a:latin typeface="Calibri"/>
+              </a:rPr>
+              <a:t>hasDatabaseConnection</a:t>
+            </a:r>
+            <a:endParaRPr/>
+          </a:p>
+          <a:p>
+            <a:pPr>
+              <a:lnSpc>
+                <a:spcPct val="100000"/>
+              </a:lnSpc>
+            </a:pPr>
+            <a:r>
+              <a:rPr lang="de-DE" sz="1600">
+                <a:solidFill>
+                  <a:srgbClr val="000000"/>
+                </a:solidFill>
+                <a:latin typeface="Calibri"/>
+              </a:rPr>
+              <a:t>hasRelationInput</a:t>
+            </a:r>
+            <a:endParaRPr/>
+          </a:p>
+          <a:p>
+            <a:pPr>
+              <a:lnSpc>
+                <a:spcPct val="100000"/>
+              </a:lnSpc>
+            </a:pPr>
+            <a:r>
+              <a:rPr lang="de-DE" sz="1600">
+                <a:solidFill>
+                  <a:srgbClr val="000000"/>
+                </a:solidFill>
+                <a:latin typeface="Calibri"/>
+              </a:rPr>
+              <a:t>hasFileInput</a:t>
+            </a:r>
+            <a:endParaRPr/>
+          </a:p>
+          <a:p>
+            <a:pPr>
+              <a:lnSpc>
+                <a:spcPct val="100000"/>
+              </a:lnSpc>
+            </a:pPr>
+            <a:r>
+              <a:rPr lang="de-DE" sz="1600">
+                <a:solidFill>
+                  <a:srgbClr val="000000"/>
+                </a:solidFill>
+                <a:latin typeface="Calibri"/>
+              </a:rPr>
+              <a:t>hasTableInput</a:t>
+            </a:r>
+            <a:endParaRPr/>
+          </a:p>
+        </p:txBody>
+      </p:sp>
+      <p:sp>
+        <p:nvSpPr>
+          <p:cNvPr id="37" name="CustomShape 2"/>
           <p:cNvSpPr/>
           <p:nvPr/>
         </p:nvSpPr>
         <p:spPr>
           <a:xfrm>
             <a:off x="3191040" y="617400"/>
-            <a:ext cx="2185560" cy="2067480"/>
+            <a:ext cx="2185200" cy="2067120"/>
           </a:xfrm>
           <a:prstGeom prst="rect">
             <a:avLst/>
@@ -1818,14 +1782,14 @@
       </p:sp>
       <p:sp>
         <p:nvSpPr>
-          <p:cNvPr id="41" name="CustomShape 3"/>
+          <p:cNvPr id="38" name="CustomShape 3"/>
           <p:cNvSpPr/>
           <p:nvPr/>
         </p:nvSpPr>
         <p:spPr>
           <a:xfrm>
             <a:off x="6075360" y="627120"/>
-            <a:ext cx="1744560" cy="1368360"/>
+            <a:ext cx="1744200" cy="1368000"/>
           </a:xfrm>
           <a:prstGeom prst="rect">
             <a:avLst/>
@@ -1914,14 +1878,14 @@
       </p:sp>
       <p:sp>
         <p:nvSpPr>
-          <p:cNvPr id="42" name="CustomShape 4"/>
+          <p:cNvPr id="39" name="CustomShape 4"/>
           <p:cNvSpPr/>
           <p:nvPr/>
         </p:nvSpPr>
         <p:spPr>
           <a:xfrm>
             <a:off x="6753600" y="2348280"/>
-            <a:ext cx="1744560" cy="608040"/>
+            <a:ext cx="1744200" cy="607680"/>
           </a:xfrm>
           <a:prstGeom prst="rect">
             <a:avLst/>
@@ -1976,14 +1940,14 @@
       </p:sp>
       <p:sp>
         <p:nvSpPr>
-          <p:cNvPr id="43" name="CustomShape 5"/>
+          <p:cNvPr id="40" name="CustomShape 5"/>
           <p:cNvSpPr/>
           <p:nvPr/>
         </p:nvSpPr>
         <p:spPr>
           <a:xfrm>
             <a:off x="6526440" y="5019120"/>
-            <a:ext cx="1972080" cy="2098440"/>
+            <a:ext cx="1971720" cy="2098080"/>
           </a:xfrm>
           <a:prstGeom prst="rect">
             <a:avLst/>
@@ -2123,14 +2087,14 @@
       </p:sp>
       <p:sp>
         <p:nvSpPr>
-          <p:cNvPr id="44" name="CustomShape 6"/>
+          <p:cNvPr id="41" name="CustomShape 6"/>
           <p:cNvSpPr/>
           <p:nvPr/>
         </p:nvSpPr>
         <p:spPr>
           <a:xfrm>
             <a:off x="6523920" y="3312000"/>
-            <a:ext cx="1972080" cy="1580760"/>
+            <a:ext cx="1971720" cy="1580400"/>
           </a:xfrm>
           <a:prstGeom prst="rect">
             <a:avLst/>
@@ -2236,14 +2200,14 @@
       </p:sp>
       <p:sp>
         <p:nvSpPr>
-          <p:cNvPr id="45" name="CustomShape 7"/>
+          <p:cNvPr id="42" name="CustomShape 7"/>
           <p:cNvSpPr/>
           <p:nvPr/>
         </p:nvSpPr>
         <p:spPr>
           <a:xfrm>
             <a:off x="3686760" y="3535560"/>
-            <a:ext cx="2357280" cy="3284280"/>
+            <a:ext cx="2356920" cy="3283920"/>
           </a:xfrm>
           <a:prstGeom prst="rect">
             <a:avLst/>
@@ -2468,14 +2432,14 @@
       </p:sp>
       <p:sp>
         <p:nvSpPr>
-          <p:cNvPr id="46" name="CustomShape 8"/>
+          <p:cNvPr id="43" name="CustomShape 8"/>
           <p:cNvSpPr/>
           <p:nvPr/>
         </p:nvSpPr>
         <p:spPr>
           <a:xfrm flipH="1">
             <a:off x="1518480" y="1080360"/>
-            <a:ext cx="1671480" cy="360"/>
+            <a:ext cx="1671120" cy="360"/>
           </a:xfrm>
           <a:prstGeom prst="straightConnector1">
             <a:avLst/>
@@ -2492,14 +2456,14 @@
       </p:sp>
       <p:sp>
         <p:nvSpPr>
-          <p:cNvPr id="47" name="CustomShape 9"/>
+          <p:cNvPr id="44" name="CustomShape 9"/>
           <p:cNvSpPr/>
           <p:nvPr/>
         </p:nvSpPr>
         <p:spPr>
           <a:xfrm>
             <a:off x="3477240" y="2825280"/>
-            <a:ext cx="3276000" cy="360"/>
+            <a:ext cx="3275640" cy="360"/>
           </a:xfrm>
           <a:prstGeom prst="straightConnector1">
             <a:avLst/>
@@ -2516,7 +2480,7 @@
       </p:sp>
       <p:sp>
         <p:nvSpPr>
-          <p:cNvPr id="48" name="Line 10"/>
+          <p:cNvPr id="45" name="Line 10"/>
           <p:cNvSpPr/>
           <p:nvPr/>
         </p:nvSpPr>
@@ -2538,7 +2502,7 @@
       </p:sp>
       <p:sp>
         <p:nvSpPr>
-          <p:cNvPr id="49" name="Line 11"/>
+          <p:cNvPr id="46" name="Line 11"/>
           <p:cNvSpPr/>
           <p:nvPr/>
         </p:nvSpPr>
@@ -2560,14 +2524,14 @@
       </p:sp>
       <p:sp>
         <p:nvSpPr>
-          <p:cNvPr id="50" name="CustomShape 12"/>
+          <p:cNvPr id="47" name="CustomShape 12"/>
           <p:cNvSpPr/>
           <p:nvPr/>
         </p:nvSpPr>
         <p:spPr>
           <a:xfrm>
             <a:off x="6134760" y="2928240"/>
-            <a:ext cx="618840" cy="360"/>
+            <a:ext cx="618480" cy="360"/>
           </a:xfrm>
           <a:prstGeom prst="straightConnector1">
             <a:avLst/>
@@ -2584,7 +2548,7 @@
       </p:sp>
       <p:sp>
         <p:nvSpPr>
-          <p:cNvPr id="51" name="Line 13"/>
+          <p:cNvPr id="48" name="Line 13"/>
           <p:cNvSpPr/>
           <p:nvPr/>
         </p:nvSpPr>
@@ -2606,7 +2570,7 @@
       </p:sp>
       <p:sp>
         <p:nvSpPr>
-          <p:cNvPr id="52" name="Line 14"/>
+          <p:cNvPr id="49" name="Line 14"/>
           <p:cNvSpPr/>
           <p:nvPr/>
         </p:nvSpPr>
@@ -2628,14 +2592,14 @@
       </p:sp>
       <p:sp>
         <p:nvSpPr>
-          <p:cNvPr id="53" name="CustomShape 15"/>
+          <p:cNvPr id="50" name="CustomShape 15"/>
           <p:cNvSpPr/>
           <p:nvPr/>
         </p:nvSpPr>
         <p:spPr>
           <a:xfrm>
             <a:off x="5873400" y="2741040"/>
-            <a:ext cx="856080" cy="360"/>
+            <a:ext cx="855720" cy="360"/>
           </a:xfrm>
           <a:prstGeom prst="straightConnector1">
             <a:avLst/>
@@ -2652,7 +2616,7 @@
       </p:sp>
       <p:sp>
         <p:nvSpPr>
-          <p:cNvPr id="54" name="Line 16"/>
+          <p:cNvPr id="51" name="Line 16"/>
           <p:cNvSpPr/>
           <p:nvPr/>
         </p:nvSpPr>
@@ -2674,7 +2638,7 @@
       </p:sp>
       <p:sp>
         <p:nvSpPr>
-          <p:cNvPr id="55" name="Line 17"/>
+          <p:cNvPr id="52" name="Line 17"/>
           <p:cNvSpPr/>
           <p:nvPr/>
         </p:nvSpPr>
@@ -2696,14 +2660,14 @@
       </p:sp>
       <p:sp>
         <p:nvSpPr>
-          <p:cNvPr id="56" name="CustomShape 18"/>
+          <p:cNvPr id="53" name="CustomShape 18"/>
           <p:cNvSpPr/>
           <p:nvPr/>
         </p:nvSpPr>
         <p:spPr>
           <a:xfrm>
             <a:off x="6203880" y="5460120"/>
-            <a:ext cx="367560" cy="11520"/>
+            <a:ext cx="367200" cy="11160"/>
           </a:xfrm>
           <a:prstGeom prst="straightConnector1">
             <a:avLst/>
@@ -2720,7 +2684,7 @@
       </p:sp>
       <p:sp>
         <p:nvSpPr>
-          <p:cNvPr id="57" name="Line 19"/>
+          <p:cNvPr id="54" name="Line 19"/>
           <p:cNvSpPr/>
           <p:nvPr/>
         </p:nvSpPr>
@@ -2742,7 +2706,7 @@
       </p:sp>
       <p:sp>
         <p:nvSpPr>
-          <p:cNvPr id="58" name="Line 20"/>
+          <p:cNvPr id="55" name="Line 20"/>
           <p:cNvSpPr/>
           <p:nvPr/>
         </p:nvSpPr>
@@ -2764,14 +2728,14 @@
       </p:sp>
       <p:sp>
         <p:nvSpPr>
-          <p:cNvPr id="59" name="CustomShape 21"/>
+          <p:cNvPr id="56" name="CustomShape 21"/>
           <p:cNvSpPr/>
           <p:nvPr/>
         </p:nvSpPr>
         <p:spPr>
           <a:xfrm flipH="1">
-            <a:off x="4261320" y="1186920"/>
-            <a:ext cx="1612080" cy="360"/>
+            <a:off x="4260600" y="1186920"/>
+            <a:ext cx="1611720" cy="360"/>
           </a:xfrm>
           <a:prstGeom prst="straightConnector1">
             <a:avLst/>
@@ -2788,7 +2752,7 @@
       </p:sp>
       <p:sp>
         <p:nvSpPr>
-          <p:cNvPr id="60" name="Line 22"/>
+          <p:cNvPr id="57" name="Line 22"/>
           <p:cNvSpPr/>
           <p:nvPr/>
         </p:nvSpPr>
@@ -2810,7 +2774,7 @@
       </p:sp>
       <p:sp>
         <p:nvSpPr>
-          <p:cNvPr id="61" name="Line 23"/>
+          <p:cNvPr id="58" name="Line 23"/>
           <p:cNvSpPr/>
           <p:nvPr/>
         </p:nvSpPr>
@@ -2832,7 +2796,7 @@
       </p:sp>
       <p:sp>
         <p:nvSpPr>
-          <p:cNvPr id="62" name="Line 24"/>
+          <p:cNvPr id="59" name="Line 24"/>
           <p:cNvSpPr/>
           <p:nvPr/>
         </p:nvSpPr>
@@ -2854,14 +2818,14 @@
       </p:sp>
       <p:sp>
         <p:nvSpPr>
-          <p:cNvPr id="63" name="CustomShape 25"/>
+          <p:cNvPr id="60" name="CustomShape 25"/>
           <p:cNvSpPr/>
           <p:nvPr/>
         </p:nvSpPr>
         <p:spPr>
           <a:xfrm>
-            <a:off x="1446120" y="3258360"/>
-            <a:ext cx="1744560" cy="1094760"/>
+            <a:off x="1423800" y="5169600"/>
+            <a:ext cx="1744200" cy="1094400"/>
           </a:xfrm>
           <a:prstGeom prst="rect">
             <a:avLst/>
@@ -2950,13 +2914,13 @@
       </p:sp>
       <p:sp>
         <p:nvSpPr>
-          <p:cNvPr id="64" name="Line 26"/>
+          <p:cNvPr id="61" name="Line 26"/>
           <p:cNvSpPr/>
           <p:nvPr/>
         </p:nvSpPr>
         <p:spPr>
           <a:xfrm>
-            <a:off x="2646720" y="3961800"/>
+            <a:off x="2646720" y="5869800"/>
             <a:ext cx="0" cy="275040"/>
           </a:xfrm>
           <a:prstGeom prst="line">
@@ -2972,13 +2936,13 @@
       </p:sp>
       <p:sp>
         <p:nvSpPr>
-          <p:cNvPr id="65" name="Line 27"/>
+          <p:cNvPr id="62" name="Line 27"/>
           <p:cNvSpPr/>
           <p:nvPr/>
         </p:nvSpPr>
         <p:spPr>
           <a:xfrm>
-            <a:off x="2443320" y="4235400"/>
+            <a:off x="2443320" y="6143400"/>
             <a:ext cx="203400" cy="0"/>
           </a:xfrm>
           <a:prstGeom prst="line">
@@ -2994,13 +2958,13 @@
       </p:sp>
       <p:sp>
         <p:nvSpPr>
-          <p:cNvPr id="66" name="Line 28"/>
+          <p:cNvPr id="63" name="Line 28"/>
           <p:cNvSpPr/>
           <p:nvPr/>
         </p:nvSpPr>
         <p:spPr>
           <a:xfrm>
-            <a:off x="2379240" y="3961800"/>
+            <a:off x="2379240" y="5869800"/>
             <a:ext cx="282960" cy="0"/>
           </a:xfrm>
           <a:prstGeom prst="line">
@@ -3016,14 +2980,14 @@
       </p:sp>
       <p:sp>
         <p:nvSpPr>
-          <p:cNvPr id="67" name="Line 29"/>
+          <p:cNvPr id="64" name="Line 29"/>
           <p:cNvSpPr/>
           <p:nvPr/>
         </p:nvSpPr>
         <p:spPr>
           <a:xfrm>
             <a:off x="2881080" y="1234440"/>
-            <a:ext cx="1080" cy="2846160"/>
+            <a:ext cx="0" cy="4755960"/>
           </a:xfrm>
           <a:prstGeom prst="line">
             <a:avLst/>
@@ -3038,14 +3002,14 @@
       </p:sp>
       <p:sp>
         <p:nvSpPr>
-          <p:cNvPr id="68" name="CustomShape 30"/>
+          <p:cNvPr id="65" name="CustomShape 30"/>
           <p:cNvSpPr/>
           <p:nvPr/>
         </p:nvSpPr>
         <p:spPr>
           <a:xfrm>
             <a:off x="2881440" y="1234440"/>
-            <a:ext cx="406080" cy="360"/>
+            <a:ext cx="405720" cy="360"/>
           </a:xfrm>
           <a:prstGeom prst="straightConnector1">
             <a:avLst/>
@@ -3062,13 +3026,13 @@
       </p:sp>
       <p:sp>
         <p:nvSpPr>
-          <p:cNvPr id="69" name="Line 31"/>
+          <p:cNvPr id="66" name="Line 31"/>
           <p:cNvSpPr/>
           <p:nvPr/>
         </p:nvSpPr>
         <p:spPr>
           <a:xfrm flipV="1">
-            <a:off x="2645640" y="4080600"/>
+            <a:off x="2645640" y="5988600"/>
             <a:ext cx="235440" cy="1800"/>
           </a:xfrm>
           <a:prstGeom prst="line">

</xml_diff>

<commit_message>
#180 Renamed new algorithm fields (hibernate convention)
</commit_message>
<xml_diff>
--- a/Metanome_DbSchema.pptx
+++ b/Metanome_DbSchema.pptx
@@ -64,7 +64,7 @@
         <p:spPr>
           <a:xfrm>
             <a:off x="685800" y="2130480"/>
-            <a:ext cx="7771680" cy="1469880"/>
+            <a:ext cx="7771320" cy="1469880"/>
           </a:xfrm>
           <a:prstGeom prst="rect">
             <a:avLst/>
@@ -91,7 +91,7 @@
         <p:spPr>
           <a:xfrm>
             <a:off x="457200" y="1604520"/>
-            <a:ext cx="8229240" cy="1896840"/>
+            <a:ext cx="8228880" cy="1896840"/>
           </a:xfrm>
           <a:prstGeom prst="rect">
             <a:avLst/>
@@ -117,7 +117,7 @@
         <p:spPr>
           <a:xfrm>
             <a:off x="457200" y="3682080"/>
-            <a:ext cx="8229240" cy="1896840"/>
+            <a:ext cx="8228880" cy="1896840"/>
           </a:xfrm>
           <a:prstGeom prst="rect">
             <a:avLst/>
@@ -165,7 +165,7 @@
         <p:spPr>
           <a:xfrm>
             <a:off x="685800" y="2130480"/>
-            <a:ext cx="7771680" cy="1469880"/>
+            <a:ext cx="7771320" cy="1469880"/>
           </a:xfrm>
           <a:prstGeom prst="rect">
             <a:avLst/>
@@ -192,7 +192,7 @@
         <p:spPr>
           <a:xfrm>
             <a:off x="457200" y="1604520"/>
-            <a:ext cx="4015800" cy="1896840"/>
+            <a:ext cx="4015440" cy="1896840"/>
           </a:xfrm>
           <a:prstGeom prst="rect">
             <a:avLst/>
@@ -217,8 +217,8 @@
         </p:nvSpPr>
         <p:spPr>
           <a:xfrm>
-            <a:off x="4674240" y="1604520"/>
-            <a:ext cx="4015800" cy="1896840"/>
+            <a:off x="4673880" y="1604520"/>
+            <a:ext cx="4015440" cy="1896840"/>
           </a:xfrm>
           <a:prstGeom prst="rect">
             <a:avLst/>
@@ -243,8 +243,8 @@
         </p:nvSpPr>
         <p:spPr>
           <a:xfrm>
-            <a:off x="4674240" y="3682080"/>
-            <a:ext cx="4015800" cy="1896840"/>
+            <a:off x="4673880" y="3682080"/>
+            <a:ext cx="4015440" cy="1896840"/>
           </a:xfrm>
           <a:prstGeom prst="rect">
             <a:avLst/>
@@ -270,7 +270,7 @@
         <p:spPr>
           <a:xfrm>
             <a:off x="457200" y="3682080"/>
-            <a:ext cx="4015800" cy="1896840"/>
+            <a:ext cx="4015440" cy="1896840"/>
           </a:xfrm>
           <a:prstGeom prst="rect">
             <a:avLst/>
@@ -318,7 +318,7 @@
         <p:spPr>
           <a:xfrm>
             <a:off x="685800" y="2130480"/>
-            <a:ext cx="7771680" cy="1469880"/>
+            <a:ext cx="7771320" cy="1469880"/>
           </a:xfrm>
           <a:prstGeom prst="rect">
             <a:avLst/>
@@ -345,7 +345,7 @@
         <p:spPr>
           <a:xfrm>
             <a:off x="457200" y="1604520"/>
-            <a:ext cx="8229240" cy="3977280"/>
+            <a:ext cx="8228880" cy="3976920"/>
           </a:xfrm>
           <a:prstGeom prst="rect">
             <a:avLst/>
@@ -371,7 +371,7 @@
         <p:spPr>
           <a:xfrm>
             <a:off x="457200" y="1604520"/>
-            <a:ext cx="8229240" cy="3977280"/>
+            <a:ext cx="8228880" cy="3976920"/>
           </a:xfrm>
           <a:prstGeom prst="rect">
             <a:avLst/>
@@ -398,8 +398,8 @@
         </p:blipFill>
         <p:spPr>
           <a:xfrm>
-            <a:off x="2079000" y="1604520"/>
-            <a:ext cx="4984920" cy="3977280"/>
+            <a:off x="2079360" y="1604160"/>
+            <a:ext cx="4984200" cy="3976920"/>
           </a:xfrm>
           <a:prstGeom prst="rect">
             <a:avLst/>
@@ -423,8 +423,8 @@
         </p:blipFill>
         <p:spPr>
           <a:xfrm>
-            <a:off x="2079000" y="1604520"/>
-            <a:ext cx="4984920" cy="3977280"/>
+            <a:off x="2079360" y="1604160"/>
+            <a:ext cx="4984200" cy="3976920"/>
           </a:xfrm>
           <a:prstGeom prst="rect">
             <a:avLst/>
@@ -469,7 +469,7 @@
         <p:spPr>
           <a:xfrm>
             <a:off x="685800" y="2130480"/>
-            <a:ext cx="7771680" cy="1469880"/>
+            <a:ext cx="7771320" cy="1469880"/>
           </a:xfrm>
           <a:prstGeom prst="rect">
             <a:avLst/>
@@ -496,7 +496,7 @@
         <p:spPr>
           <a:xfrm>
             <a:off x="457200" y="1604520"/>
-            <a:ext cx="8229240" cy="3977640"/>
+            <a:ext cx="8228880" cy="3977280"/>
           </a:xfrm>
           <a:prstGeom prst="rect">
             <a:avLst/>
@@ -545,7 +545,7 @@
         <p:spPr>
           <a:xfrm>
             <a:off x="685800" y="2130480"/>
-            <a:ext cx="7771680" cy="1469880"/>
+            <a:ext cx="7771320" cy="1469880"/>
           </a:xfrm>
           <a:prstGeom prst="rect">
             <a:avLst/>
@@ -572,7 +572,7 @@
         <p:spPr>
           <a:xfrm>
             <a:off x="457200" y="1604520"/>
-            <a:ext cx="8229240" cy="3977280"/>
+            <a:ext cx="8228880" cy="3976920"/>
           </a:xfrm>
           <a:prstGeom prst="rect">
             <a:avLst/>
@@ -620,7 +620,7 @@
         <p:spPr>
           <a:xfrm>
             <a:off x="685800" y="2130480"/>
-            <a:ext cx="7771680" cy="1469880"/>
+            <a:ext cx="7771320" cy="1469880"/>
           </a:xfrm>
           <a:prstGeom prst="rect">
             <a:avLst/>
@@ -647,7 +647,7 @@
         <p:spPr>
           <a:xfrm>
             <a:off x="457200" y="1604520"/>
-            <a:ext cx="4015800" cy="3977280"/>
+            <a:ext cx="4015440" cy="3976920"/>
           </a:xfrm>
           <a:prstGeom prst="rect">
             <a:avLst/>
@@ -672,8 +672,8 @@
         </p:nvSpPr>
         <p:spPr>
           <a:xfrm>
-            <a:off x="4674240" y="1604520"/>
-            <a:ext cx="4015800" cy="3977280"/>
+            <a:off x="4673880" y="1604520"/>
+            <a:ext cx="4015440" cy="3976920"/>
           </a:xfrm>
           <a:prstGeom prst="rect">
             <a:avLst/>
@@ -721,7 +721,7 @@
         <p:spPr>
           <a:xfrm>
             <a:off x="685800" y="2130480"/>
-            <a:ext cx="7771680" cy="1469880"/>
+            <a:ext cx="7771320" cy="1469880"/>
           </a:xfrm>
           <a:prstGeom prst="rect">
             <a:avLst/>
@@ -770,7 +770,7 @@
         <p:spPr>
           <a:xfrm>
             <a:off x="685800" y="2130480"/>
-            <a:ext cx="7771680" cy="6813360"/>
+            <a:ext cx="7771320" cy="6813360"/>
           </a:xfrm>
           <a:prstGeom prst="rect">
             <a:avLst/>
@@ -819,7 +819,7 @@
         <p:spPr>
           <a:xfrm>
             <a:off x="685800" y="2130480"/>
-            <a:ext cx="7771680" cy="1469880"/>
+            <a:ext cx="7771320" cy="1469880"/>
           </a:xfrm>
           <a:prstGeom prst="rect">
             <a:avLst/>
@@ -846,7 +846,7 @@
         <p:spPr>
           <a:xfrm>
             <a:off x="457200" y="1604520"/>
-            <a:ext cx="4015800" cy="1896840"/>
+            <a:ext cx="4015440" cy="1896840"/>
           </a:xfrm>
           <a:prstGeom prst="rect">
             <a:avLst/>
@@ -872,7 +872,7 @@
         <p:spPr>
           <a:xfrm>
             <a:off x="457200" y="3682080"/>
-            <a:ext cx="4015800" cy="1896840"/>
+            <a:ext cx="4015440" cy="1896840"/>
           </a:xfrm>
           <a:prstGeom prst="rect">
             <a:avLst/>
@@ -897,8 +897,8 @@
         </p:nvSpPr>
         <p:spPr>
           <a:xfrm>
-            <a:off x="4674240" y="1604520"/>
-            <a:ext cx="4015800" cy="3977280"/>
+            <a:off x="4673880" y="1604520"/>
+            <a:ext cx="4015440" cy="3976920"/>
           </a:xfrm>
           <a:prstGeom prst="rect">
             <a:avLst/>
@@ -946,7 +946,7 @@
         <p:spPr>
           <a:xfrm>
             <a:off x="685800" y="2130480"/>
-            <a:ext cx="7771680" cy="1469880"/>
+            <a:ext cx="7771320" cy="1469880"/>
           </a:xfrm>
           <a:prstGeom prst="rect">
             <a:avLst/>
@@ -973,7 +973,7 @@
         <p:spPr>
           <a:xfrm>
             <a:off x="457200" y="1604520"/>
-            <a:ext cx="4015800" cy="3977280"/>
+            <a:ext cx="4015440" cy="3976920"/>
           </a:xfrm>
           <a:prstGeom prst="rect">
             <a:avLst/>
@@ -998,8 +998,8 @@
         </p:nvSpPr>
         <p:spPr>
           <a:xfrm>
-            <a:off x="4674240" y="1604520"/>
-            <a:ext cx="4015800" cy="1896840"/>
+            <a:off x="4673880" y="1604520"/>
+            <a:ext cx="4015440" cy="1896840"/>
           </a:xfrm>
           <a:prstGeom prst="rect">
             <a:avLst/>
@@ -1024,8 +1024,8 @@
         </p:nvSpPr>
         <p:spPr>
           <a:xfrm>
-            <a:off x="4674240" y="3682080"/>
-            <a:ext cx="4015800" cy="1896840"/>
+            <a:off x="4673880" y="3682080"/>
+            <a:ext cx="4015440" cy="1896840"/>
           </a:xfrm>
           <a:prstGeom prst="rect">
             <a:avLst/>
@@ -1073,7 +1073,7 @@
         <p:spPr>
           <a:xfrm>
             <a:off x="685800" y="2130480"/>
-            <a:ext cx="7771680" cy="1469880"/>
+            <a:ext cx="7771320" cy="1469880"/>
           </a:xfrm>
           <a:prstGeom prst="rect">
             <a:avLst/>
@@ -1100,7 +1100,7 @@
         <p:spPr>
           <a:xfrm>
             <a:off x="457200" y="1604520"/>
-            <a:ext cx="4015800" cy="1896840"/>
+            <a:ext cx="4015440" cy="1896840"/>
           </a:xfrm>
           <a:prstGeom prst="rect">
             <a:avLst/>
@@ -1125,8 +1125,8 @@
         </p:nvSpPr>
         <p:spPr>
           <a:xfrm>
-            <a:off x="4674240" y="1604520"/>
-            <a:ext cx="4015800" cy="1896840"/>
+            <a:off x="4673880" y="1604520"/>
+            <a:ext cx="4015440" cy="1896840"/>
           </a:xfrm>
           <a:prstGeom prst="rect">
             <a:avLst/>
@@ -1152,7 +1152,7 @@
         <p:spPr>
           <a:xfrm>
             <a:off x="457200" y="3682080"/>
-            <a:ext cx="8229240" cy="1896840"/>
+            <a:ext cx="8228880" cy="1896840"/>
           </a:xfrm>
           <a:prstGeom prst="rect">
             <a:avLst/>
@@ -1207,7 +1207,7 @@
         <p:spPr>
           <a:xfrm>
             <a:off x="685800" y="2130480"/>
-            <a:ext cx="7771680" cy="1469520"/>
+            <a:ext cx="7771320" cy="1469520"/>
           </a:xfrm>
           <a:prstGeom prst="rect">
             <a:avLst/>
@@ -1239,7 +1239,7 @@
         <p:spPr>
           <a:xfrm>
             <a:off x="457200" y="1604520"/>
-            <a:ext cx="8229240" cy="3977280"/>
+            <a:ext cx="8228880" cy="3976920"/>
           </a:xfrm>
           <a:prstGeom prst="rect">
             <a:avLst/>
@@ -1254,7 +1254,7 @@
               <a:buChar char=""/>
             </a:pPr>
             <a:r>
-              <a:rPr lang="de-DE" sz="3200">
+              <a:rPr lang="de-DE">
                 <a:latin typeface="Arial"/>
               </a:rPr>
               <a:t>Click to edit the outline text format</a:t>
@@ -1268,7 +1268,7 @@
               <a:buChar char=""/>
             </a:pPr>
             <a:r>
-              <a:rPr lang="de-DE" sz="2800">
+              <a:rPr lang="de-DE">
                 <a:latin typeface="Arial"/>
               </a:rPr>
               <a:t>Second Outline Level</a:t>
@@ -1282,7 +1282,7 @@
               <a:buChar char=""/>
             </a:pPr>
             <a:r>
-              <a:rPr lang="de-DE" sz="2400">
+              <a:rPr lang="de-DE">
                 <a:latin typeface="Arial"/>
               </a:rPr>
               <a:t>Third Outline Level</a:t>
@@ -1296,7 +1296,7 @@
               <a:buChar char=""/>
             </a:pPr>
             <a:r>
-              <a:rPr lang="de-DE" sz="2000">
+              <a:rPr lang="de-DE">
                 <a:latin typeface="Arial"/>
               </a:rPr>
               <a:t>Fourth Outline Level</a:t>
@@ -1310,7 +1310,7 @@
               <a:buChar char=""/>
             </a:pPr>
             <a:r>
-              <a:rPr lang="de-DE" sz="2000">
+              <a:rPr lang="de-DE">
                 <a:latin typeface="Arial"/>
               </a:rPr>
               <a:t>Fifth Outline Level</a:t>
@@ -1324,7 +1324,7 @@
               <a:buChar char=""/>
             </a:pPr>
             <a:r>
-              <a:rPr lang="de-DE" sz="2000">
+              <a:rPr lang="de-DE">
                 <a:latin typeface="Arial"/>
               </a:rPr>
               <a:t>Sixth Outline Level</a:t>
@@ -1338,7 +1338,7 @@
               <a:buChar char=""/>
             </a:pPr>
             <a:r>
-              <a:rPr lang="de-DE" sz="2000">
+              <a:rPr lang="de-DE">
                 <a:latin typeface="Arial"/>
               </a:rPr>
               <a:t>Seventh Outline Level</a:t>
@@ -1393,7 +1393,7 @@
         <p:spPr>
           <a:xfrm>
             <a:off x="640800" y="627120"/>
-            <a:ext cx="1744200" cy="3836880"/>
+            <a:ext cx="1743840" cy="3620880"/>
           </a:xfrm>
           <a:prstGeom prst="rect">
             <a:avLst/>
@@ -1576,58 +1576,58 @@
                 </a:solidFill>
                 <a:latin typeface="Calibri"/>
               </a:rPr>
-              <a:t>hasDatabaseConnection</a:t>
-            </a:r>
-            <a:endParaRPr/>
-          </a:p>
-          <a:p>
-            <a:pPr>
-              <a:lnSpc>
-                <a:spcPct val="100000"/>
-              </a:lnSpc>
-            </a:pPr>
-            <a:r>
-              <a:rPr lang="de-DE" sz="1600">
-                <a:solidFill>
-                  <a:srgbClr val="000000"/>
-                </a:solidFill>
-                <a:latin typeface="Calibri"/>
-              </a:rPr>
-              <a:t>hasRelationInput</a:t>
-            </a:r>
-            <a:endParaRPr/>
-          </a:p>
-          <a:p>
-            <a:pPr>
-              <a:lnSpc>
-                <a:spcPct val="100000"/>
-              </a:lnSpc>
-            </a:pPr>
-            <a:r>
-              <a:rPr lang="de-DE" sz="1600">
-                <a:solidFill>
-                  <a:srgbClr val="000000"/>
-                </a:solidFill>
-                <a:latin typeface="Calibri"/>
-              </a:rPr>
-              <a:t>hasFileInput</a:t>
-            </a:r>
-            <a:endParaRPr/>
-          </a:p>
-          <a:p>
-            <a:pPr>
-              <a:lnSpc>
-                <a:spcPct val="100000"/>
-              </a:lnSpc>
-            </a:pPr>
-            <a:r>
-              <a:rPr lang="de-DE" sz="1600">
-                <a:solidFill>
-                  <a:srgbClr val="000000"/>
-                </a:solidFill>
-                <a:latin typeface="Calibri"/>
-              </a:rPr>
-              <a:t>hasTableInput</a:t>
+              <a:t>isDatabaseConnection</a:t>
+            </a:r>
+            <a:endParaRPr/>
+          </a:p>
+          <a:p>
+            <a:pPr>
+              <a:lnSpc>
+                <a:spcPct val="100000"/>
+              </a:lnSpc>
+            </a:pPr>
+            <a:r>
+              <a:rPr lang="de-DE" sz="1600">
+                <a:solidFill>
+                  <a:srgbClr val="000000"/>
+                </a:solidFill>
+                <a:latin typeface="Calibri"/>
+              </a:rPr>
+              <a:t>isRelationInput</a:t>
+            </a:r>
+            <a:endParaRPr/>
+          </a:p>
+          <a:p>
+            <a:pPr>
+              <a:lnSpc>
+                <a:spcPct val="100000"/>
+              </a:lnSpc>
+            </a:pPr>
+            <a:r>
+              <a:rPr lang="de-DE" sz="1600">
+                <a:solidFill>
+                  <a:srgbClr val="000000"/>
+                </a:solidFill>
+                <a:latin typeface="Calibri"/>
+              </a:rPr>
+              <a:t>isFileInput</a:t>
+            </a:r>
+            <a:endParaRPr/>
+          </a:p>
+          <a:p>
+            <a:pPr>
+              <a:lnSpc>
+                <a:spcPct val="100000"/>
+              </a:lnSpc>
+            </a:pPr>
+            <a:r>
+              <a:rPr lang="de-DE" sz="1600">
+                <a:solidFill>
+                  <a:srgbClr val="000000"/>
+                </a:solidFill>
+                <a:latin typeface="Calibri"/>
+              </a:rPr>
+              <a:t>isTableInput</a:t>
             </a:r>
             <a:endParaRPr/>
           </a:p>
@@ -1642,7 +1642,7 @@
         <p:spPr>
           <a:xfrm>
             <a:off x="3191040" y="617400"/>
-            <a:ext cx="2185200" cy="2067120"/>
+            <a:ext cx="2184840" cy="2066760"/>
           </a:xfrm>
           <a:prstGeom prst="rect">
             <a:avLst/>
@@ -1789,7 +1789,7 @@
         <p:spPr>
           <a:xfrm>
             <a:off x="6075360" y="627120"/>
-            <a:ext cx="1744200" cy="1368000"/>
+            <a:ext cx="1743840" cy="1367640"/>
           </a:xfrm>
           <a:prstGeom prst="rect">
             <a:avLst/>
@@ -1885,7 +1885,7 @@
         <p:spPr>
           <a:xfrm>
             <a:off x="6753600" y="2348280"/>
-            <a:ext cx="1744200" cy="607680"/>
+            <a:ext cx="1743840" cy="607320"/>
           </a:xfrm>
           <a:prstGeom prst="rect">
             <a:avLst/>
@@ -1947,7 +1947,7 @@
         <p:spPr>
           <a:xfrm>
             <a:off x="6526440" y="5019120"/>
-            <a:ext cx="1971720" cy="2098080"/>
+            <a:ext cx="1971360" cy="2097720"/>
           </a:xfrm>
           <a:prstGeom prst="rect">
             <a:avLst/>
@@ -2094,7 +2094,7 @@
         <p:spPr>
           <a:xfrm>
             <a:off x="6523920" y="3312000"/>
-            <a:ext cx="1971720" cy="1580400"/>
+            <a:ext cx="1971360" cy="1580040"/>
           </a:xfrm>
           <a:prstGeom prst="rect">
             <a:avLst/>
@@ -2207,7 +2207,7 @@
         <p:spPr>
           <a:xfrm>
             <a:off x="3686760" y="3535560"/>
-            <a:ext cx="2356920" cy="3283920"/>
+            <a:ext cx="2356560" cy="3283560"/>
           </a:xfrm>
           <a:prstGeom prst="rect">
             <a:avLst/>
@@ -2438,8 +2438,8 @@
         </p:nvSpPr>
         <p:spPr>
           <a:xfrm flipH="1">
-            <a:off x="1518480" y="1080360"/>
-            <a:ext cx="1671120" cy="360"/>
+            <a:off x="1517760" y="1080360"/>
+            <a:ext cx="1670760" cy="360"/>
           </a:xfrm>
           <a:prstGeom prst="straightConnector1">
             <a:avLst/>
@@ -2463,7 +2463,7 @@
         <p:spPr>
           <a:xfrm>
             <a:off x="3477240" y="2825280"/>
-            <a:ext cx="3275640" cy="360"/>
+            <a:ext cx="3275280" cy="360"/>
           </a:xfrm>
           <a:prstGeom prst="straightConnector1">
             <a:avLst/>
@@ -2531,7 +2531,7 @@
         <p:spPr>
           <a:xfrm>
             <a:off x="6134760" y="2928240"/>
-            <a:ext cx="618480" cy="360"/>
+            <a:ext cx="618120" cy="360"/>
           </a:xfrm>
           <a:prstGeom prst="straightConnector1">
             <a:avLst/>
@@ -2599,7 +2599,7 @@
         <p:spPr>
           <a:xfrm>
             <a:off x="5873400" y="2741040"/>
-            <a:ext cx="855720" cy="360"/>
+            <a:ext cx="855360" cy="360"/>
           </a:xfrm>
           <a:prstGeom prst="straightConnector1">
             <a:avLst/>
@@ -2667,7 +2667,7 @@
         <p:spPr>
           <a:xfrm>
             <a:off x="6203880" y="5460120"/>
-            <a:ext cx="367200" cy="11160"/>
+            <a:ext cx="366840" cy="10800"/>
           </a:xfrm>
           <a:prstGeom prst="straightConnector1">
             <a:avLst/>
@@ -2735,7 +2735,7 @@
         <p:spPr>
           <a:xfrm flipH="1">
             <a:off x="4260600" y="1186920"/>
-            <a:ext cx="1611720" cy="360"/>
+            <a:ext cx="1611360" cy="360"/>
           </a:xfrm>
           <a:prstGeom prst="straightConnector1">
             <a:avLst/>
@@ -2825,7 +2825,7 @@
         <p:spPr>
           <a:xfrm>
             <a:off x="1423800" y="5169600"/>
-            <a:ext cx="1744200" cy="1094400"/>
+            <a:ext cx="1743840" cy="1094040"/>
           </a:xfrm>
           <a:prstGeom prst="rect">
             <a:avLst/>
@@ -3009,7 +3009,7 @@
         <p:spPr>
           <a:xfrm>
             <a:off x="2881440" y="1234440"/>
-            <a:ext cx="405720" cy="360"/>
+            <a:ext cx="405360" cy="360"/>
           </a:xfrm>
           <a:prstGeom prst="straightConnector1">
             <a:avLst/>

</xml_diff>

<commit_message>
Commit to start build on travis.
</commit_message>
<xml_diff>
--- a/Metanome_DbSchema.pptx
+++ b/Metanome_DbSchema.pptx
@@ -63,8 +63,8 @@
         </p:nvSpPr>
         <p:spPr>
           <a:xfrm>
-            <a:off x="685800" y="2130480"/>
-            <a:ext cx="7771320" cy="1469880"/>
+            <a:off x="457200" y="273600"/>
+            <a:ext cx="8229240" cy="1145160"/>
           </a:xfrm>
           <a:prstGeom prst="rect">
             <a:avLst/>
@@ -91,7 +91,7 @@
         <p:spPr>
           <a:xfrm>
             <a:off x="457200" y="1604520"/>
-            <a:ext cx="8228880" cy="1896840"/>
+            <a:ext cx="8229240" cy="1896840"/>
           </a:xfrm>
           <a:prstGeom prst="rect">
             <a:avLst/>
@@ -117,7 +117,7 @@
         <p:spPr>
           <a:xfrm>
             <a:off x="457200" y="3682080"/>
-            <a:ext cx="8228880" cy="1896840"/>
+            <a:ext cx="8229240" cy="1896840"/>
           </a:xfrm>
           <a:prstGeom prst="rect">
             <a:avLst/>
@@ -164,8 +164,8 @@
         </p:nvSpPr>
         <p:spPr>
           <a:xfrm>
-            <a:off x="685800" y="2130480"/>
-            <a:ext cx="7771320" cy="1469880"/>
+            <a:off x="457200" y="273600"/>
+            <a:ext cx="8229240" cy="1145160"/>
           </a:xfrm>
           <a:prstGeom prst="rect">
             <a:avLst/>
@@ -192,7 +192,7 @@
         <p:spPr>
           <a:xfrm>
             <a:off x="457200" y="1604520"/>
-            <a:ext cx="4015440" cy="1896840"/>
+            <a:ext cx="4015800" cy="1896840"/>
           </a:xfrm>
           <a:prstGeom prst="rect">
             <a:avLst/>
@@ -217,8 +217,8 @@
         </p:nvSpPr>
         <p:spPr>
           <a:xfrm>
-            <a:off x="4673880" y="1604520"/>
-            <a:ext cx="4015440" cy="1896840"/>
+            <a:off x="4674240" y="1604520"/>
+            <a:ext cx="4015800" cy="1896840"/>
           </a:xfrm>
           <a:prstGeom prst="rect">
             <a:avLst/>
@@ -243,8 +243,8 @@
         </p:nvSpPr>
         <p:spPr>
           <a:xfrm>
-            <a:off x="4673880" y="3682080"/>
-            <a:ext cx="4015440" cy="1896840"/>
+            <a:off x="4674240" y="3682080"/>
+            <a:ext cx="4015800" cy="1896840"/>
           </a:xfrm>
           <a:prstGeom prst="rect">
             <a:avLst/>
@@ -270,7 +270,7 @@
         <p:spPr>
           <a:xfrm>
             <a:off x="457200" y="3682080"/>
-            <a:ext cx="4015440" cy="1896840"/>
+            <a:ext cx="4015800" cy="1896840"/>
           </a:xfrm>
           <a:prstGeom prst="rect">
             <a:avLst/>
@@ -317,8 +317,8 @@
         </p:nvSpPr>
         <p:spPr>
           <a:xfrm>
-            <a:off x="685800" y="2130480"/>
-            <a:ext cx="7771320" cy="1469880"/>
+            <a:off x="457200" y="273600"/>
+            <a:ext cx="8229240" cy="1145160"/>
           </a:xfrm>
           <a:prstGeom prst="rect">
             <a:avLst/>
@@ -345,7 +345,7 @@
         <p:spPr>
           <a:xfrm>
             <a:off x="457200" y="1604520"/>
-            <a:ext cx="8228880" cy="3976920"/>
+            <a:ext cx="8229240" cy="3977280"/>
           </a:xfrm>
           <a:prstGeom prst="rect">
             <a:avLst/>
@@ -371,7 +371,7 @@
         <p:spPr>
           <a:xfrm>
             <a:off x="457200" y="1604520"/>
-            <a:ext cx="8228880" cy="3976920"/>
+            <a:ext cx="8229240" cy="3977280"/>
           </a:xfrm>
           <a:prstGeom prst="rect">
             <a:avLst/>
@@ -398,8 +398,8 @@
         </p:blipFill>
         <p:spPr>
           <a:xfrm>
-            <a:off x="2079360" y="1604160"/>
-            <a:ext cx="4984200" cy="3976920"/>
+            <a:off x="2079000" y="1604520"/>
+            <a:ext cx="4984920" cy="3977280"/>
           </a:xfrm>
           <a:prstGeom prst="rect">
             <a:avLst/>
@@ -423,8 +423,8 @@
         </p:blipFill>
         <p:spPr>
           <a:xfrm>
-            <a:off x="2079360" y="1604160"/>
-            <a:ext cx="4984200" cy="3976920"/>
+            <a:off x="2079000" y="1604520"/>
+            <a:ext cx="4984920" cy="3977280"/>
           </a:xfrm>
           <a:prstGeom prst="rect">
             <a:avLst/>
@@ -468,8 +468,8 @@
         </p:nvSpPr>
         <p:spPr>
           <a:xfrm>
-            <a:off x="685800" y="2130480"/>
-            <a:ext cx="7771320" cy="1469880"/>
+            <a:off x="457200" y="273600"/>
+            <a:ext cx="8229240" cy="1145160"/>
           </a:xfrm>
           <a:prstGeom prst="rect">
             <a:avLst/>
@@ -496,7 +496,7 @@
         <p:spPr>
           <a:xfrm>
             <a:off x="457200" y="1604520"/>
-            <a:ext cx="8228880" cy="3977280"/>
+            <a:ext cx="8229240" cy="3977640"/>
           </a:xfrm>
           <a:prstGeom prst="rect">
             <a:avLst/>
@@ -544,8 +544,8 @@
         </p:nvSpPr>
         <p:spPr>
           <a:xfrm>
-            <a:off x="685800" y="2130480"/>
-            <a:ext cx="7771320" cy="1469880"/>
+            <a:off x="457200" y="273600"/>
+            <a:ext cx="8229240" cy="1145160"/>
           </a:xfrm>
           <a:prstGeom prst="rect">
             <a:avLst/>
@@ -572,7 +572,7 @@
         <p:spPr>
           <a:xfrm>
             <a:off x="457200" y="1604520"/>
-            <a:ext cx="8228880" cy="3976920"/>
+            <a:ext cx="8229240" cy="3977280"/>
           </a:xfrm>
           <a:prstGeom prst="rect">
             <a:avLst/>
@@ -619,8 +619,8 @@
         </p:nvSpPr>
         <p:spPr>
           <a:xfrm>
-            <a:off x="685800" y="2130480"/>
-            <a:ext cx="7771320" cy="1469880"/>
+            <a:off x="457200" y="273600"/>
+            <a:ext cx="8229240" cy="1145160"/>
           </a:xfrm>
           <a:prstGeom prst="rect">
             <a:avLst/>
@@ -647,7 +647,7 @@
         <p:spPr>
           <a:xfrm>
             <a:off x="457200" y="1604520"/>
-            <a:ext cx="4015440" cy="3976920"/>
+            <a:ext cx="4015800" cy="3977280"/>
           </a:xfrm>
           <a:prstGeom prst="rect">
             <a:avLst/>
@@ -672,8 +672,8 @@
         </p:nvSpPr>
         <p:spPr>
           <a:xfrm>
-            <a:off x="4673880" y="1604520"/>
-            <a:ext cx="4015440" cy="3976920"/>
+            <a:off x="4674240" y="1604520"/>
+            <a:ext cx="4015800" cy="3977280"/>
           </a:xfrm>
           <a:prstGeom prst="rect">
             <a:avLst/>
@@ -720,8 +720,8 @@
         </p:nvSpPr>
         <p:spPr>
           <a:xfrm>
-            <a:off x="685800" y="2130480"/>
-            <a:ext cx="7771320" cy="1469880"/>
+            <a:off x="457200" y="273600"/>
+            <a:ext cx="8229240" cy="1145160"/>
           </a:xfrm>
           <a:prstGeom prst="rect">
             <a:avLst/>
@@ -769,8 +769,8 @@
         </p:nvSpPr>
         <p:spPr>
           <a:xfrm>
-            <a:off x="685800" y="2130480"/>
-            <a:ext cx="7771320" cy="6813360"/>
+            <a:off x="457200" y="273600"/>
+            <a:ext cx="8229240" cy="5308200"/>
           </a:xfrm>
           <a:prstGeom prst="rect">
             <a:avLst/>
@@ -818,8 +818,8 @@
         </p:nvSpPr>
         <p:spPr>
           <a:xfrm>
-            <a:off x="685800" y="2130480"/>
-            <a:ext cx="7771320" cy="1469880"/>
+            <a:off x="457200" y="273600"/>
+            <a:ext cx="8229240" cy="1145160"/>
           </a:xfrm>
           <a:prstGeom prst="rect">
             <a:avLst/>
@@ -846,7 +846,7 @@
         <p:spPr>
           <a:xfrm>
             <a:off x="457200" y="1604520"/>
-            <a:ext cx="4015440" cy="1896840"/>
+            <a:ext cx="4015800" cy="1896840"/>
           </a:xfrm>
           <a:prstGeom prst="rect">
             <a:avLst/>
@@ -872,7 +872,7 @@
         <p:spPr>
           <a:xfrm>
             <a:off x="457200" y="3682080"/>
-            <a:ext cx="4015440" cy="1896840"/>
+            <a:ext cx="4015800" cy="1896840"/>
           </a:xfrm>
           <a:prstGeom prst="rect">
             <a:avLst/>
@@ -897,8 +897,8 @@
         </p:nvSpPr>
         <p:spPr>
           <a:xfrm>
-            <a:off x="4673880" y="1604520"/>
-            <a:ext cx="4015440" cy="3976920"/>
+            <a:off x="4674240" y="1604520"/>
+            <a:ext cx="4015800" cy="3977280"/>
           </a:xfrm>
           <a:prstGeom prst="rect">
             <a:avLst/>
@@ -945,8 +945,8 @@
         </p:nvSpPr>
         <p:spPr>
           <a:xfrm>
-            <a:off x="685800" y="2130480"/>
-            <a:ext cx="7771320" cy="1469880"/>
+            <a:off x="457200" y="273600"/>
+            <a:ext cx="8229240" cy="1145160"/>
           </a:xfrm>
           <a:prstGeom prst="rect">
             <a:avLst/>
@@ -973,7 +973,7 @@
         <p:spPr>
           <a:xfrm>
             <a:off x="457200" y="1604520"/>
-            <a:ext cx="4015440" cy="3976920"/>
+            <a:ext cx="4015800" cy="3977280"/>
           </a:xfrm>
           <a:prstGeom prst="rect">
             <a:avLst/>
@@ -998,8 +998,8 @@
         </p:nvSpPr>
         <p:spPr>
           <a:xfrm>
-            <a:off x="4673880" y="1604520"/>
-            <a:ext cx="4015440" cy="1896840"/>
+            <a:off x="4674240" y="1604520"/>
+            <a:ext cx="4015800" cy="1896840"/>
           </a:xfrm>
           <a:prstGeom prst="rect">
             <a:avLst/>
@@ -1024,8 +1024,8 @@
         </p:nvSpPr>
         <p:spPr>
           <a:xfrm>
-            <a:off x="4673880" y="3682080"/>
-            <a:ext cx="4015440" cy="1896840"/>
+            <a:off x="4674240" y="3682080"/>
+            <a:ext cx="4015800" cy="1896840"/>
           </a:xfrm>
           <a:prstGeom prst="rect">
             <a:avLst/>
@@ -1072,8 +1072,8 @@
         </p:nvSpPr>
         <p:spPr>
           <a:xfrm>
-            <a:off x="685800" y="2130480"/>
-            <a:ext cx="7771320" cy="1469880"/>
+            <a:off x="457200" y="273600"/>
+            <a:ext cx="8229240" cy="1145160"/>
           </a:xfrm>
           <a:prstGeom prst="rect">
             <a:avLst/>
@@ -1100,7 +1100,7 @@
         <p:spPr>
           <a:xfrm>
             <a:off x="457200" y="1604520"/>
-            <a:ext cx="4015440" cy="1896840"/>
+            <a:ext cx="4015800" cy="1896840"/>
           </a:xfrm>
           <a:prstGeom prst="rect">
             <a:avLst/>
@@ -1125,8 +1125,8 @@
         </p:nvSpPr>
         <p:spPr>
           <a:xfrm>
-            <a:off x="4673880" y="1604520"/>
-            <a:ext cx="4015440" cy="1896840"/>
+            <a:off x="4674240" y="1604520"/>
+            <a:ext cx="4015800" cy="1896840"/>
           </a:xfrm>
           <a:prstGeom prst="rect">
             <a:avLst/>
@@ -1152,7 +1152,7 @@
         <p:spPr>
           <a:xfrm>
             <a:off x="457200" y="3682080"/>
-            <a:ext cx="8228880" cy="1896840"/>
+            <a:ext cx="8229240" cy="1896840"/>
           </a:xfrm>
           <a:prstGeom prst="rect">
             <a:avLst/>
@@ -1206,8 +1206,8 @@
         </p:nvSpPr>
         <p:spPr>
           <a:xfrm>
-            <a:off x="685800" y="2130480"/>
-            <a:ext cx="7771320" cy="1469520"/>
+            <a:off x="457200" y="273600"/>
+            <a:ext cx="8229240" cy="1144800"/>
           </a:xfrm>
           <a:prstGeom prst="rect">
             <a:avLst/>
@@ -1216,8 +1216,9 @@
         <p:txBody>
           <a:bodyPr lIns="0" rIns="0" tIns="0" bIns="0" anchor="ctr"/>
           <a:p>
-            <a:r>
-              <a:rPr lang="de-DE">
+            <a:pPr algn="ctr"/>
+            <a:r>
+              <a:rPr lang="de-DE" sz="4400">
                 <a:latin typeface="Arial"/>
               </a:rPr>
               <a:t>Click to edit the title text format</a:t>
@@ -1239,7 +1240,7 @@
         <p:spPr>
           <a:xfrm>
             <a:off x="457200" y="1604520"/>
-            <a:ext cx="8228880" cy="3976920"/>
+            <a:ext cx="8229240" cy="3977280"/>
           </a:xfrm>
           <a:prstGeom prst="rect">
             <a:avLst/>
@@ -1254,7 +1255,7 @@
               <a:buChar char=""/>
             </a:pPr>
             <a:r>
-              <a:rPr lang="de-DE">
+              <a:rPr lang="de-DE" sz="3200">
                 <a:latin typeface="Arial"/>
               </a:rPr>
               <a:t>Click to edit the outline text format</a:t>
@@ -1268,7 +1269,7 @@
               <a:buChar char=""/>
             </a:pPr>
             <a:r>
-              <a:rPr lang="de-DE">
+              <a:rPr lang="de-DE" sz="2800">
                 <a:latin typeface="Arial"/>
               </a:rPr>
               <a:t>Second Outline Level</a:t>
@@ -1282,7 +1283,7 @@
               <a:buChar char=""/>
             </a:pPr>
             <a:r>
-              <a:rPr lang="de-DE">
+              <a:rPr lang="de-DE" sz="2400">
                 <a:latin typeface="Arial"/>
               </a:rPr>
               <a:t>Third Outline Level</a:t>
@@ -1296,7 +1297,7 @@
               <a:buChar char=""/>
             </a:pPr>
             <a:r>
-              <a:rPr lang="de-DE">
+              <a:rPr lang="de-DE" sz="2000">
                 <a:latin typeface="Arial"/>
               </a:rPr>
               <a:t>Fourth Outline Level</a:t>
@@ -1310,7 +1311,7 @@
               <a:buChar char=""/>
             </a:pPr>
             <a:r>
-              <a:rPr lang="de-DE">
+              <a:rPr lang="de-DE" sz="2000">
                 <a:latin typeface="Arial"/>
               </a:rPr>
               <a:t>Fifth Outline Level</a:t>
@@ -1324,7 +1325,7 @@
               <a:buChar char=""/>
             </a:pPr>
             <a:r>
-              <a:rPr lang="de-DE">
+              <a:rPr lang="de-DE" sz="2000">
                 <a:latin typeface="Arial"/>
               </a:rPr>
               <a:t>Sixth Outline Level</a:t>
@@ -1338,7 +1339,7 @@
               <a:buChar char=""/>
             </a:pPr>
             <a:r>
-              <a:rPr lang="de-DE">
+              <a:rPr lang="de-DE" sz="2000">
                 <a:latin typeface="Arial"/>
               </a:rPr>
               <a:t>Seventh Outline Level</a:t>
@@ -1393,7 +1394,7 @@
         <p:spPr>
           <a:xfrm>
             <a:off x="640800" y="627120"/>
-            <a:ext cx="1743840" cy="3620880"/>
+            <a:ext cx="1743480" cy="3620520"/>
           </a:xfrm>
           <a:prstGeom prst="rect">
             <a:avLst/>
@@ -1642,7 +1643,7 @@
         <p:spPr>
           <a:xfrm>
             <a:off x="3191040" y="617400"/>
-            <a:ext cx="2184840" cy="2066760"/>
+            <a:ext cx="2184480" cy="2066400"/>
           </a:xfrm>
           <a:prstGeom prst="rect">
             <a:avLst/>
@@ -1789,7 +1790,7 @@
         <p:spPr>
           <a:xfrm>
             <a:off x="6075360" y="627120"/>
-            <a:ext cx="1743840" cy="1367640"/>
+            <a:ext cx="1743480" cy="1367280"/>
           </a:xfrm>
           <a:prstGeom prst="rect">
             <a:avLst/>
@@ -1885,7 +1886,7 @@
         <p:spPr>
           <a:xfrm>
             <a:off x="6753600" y="2348280"/>
-            <a:ext cx="1743840" cy="607320"/>
+            <a:ext cx="1743480" cy="606960"/>
           </a:xfrm>
           <a:prstGeom prst="rect">
             <a:avLst/>
@@ -1947,7 +1948,7 @@
         <p:spPr>
           <a:xfrm>
             <a:off x="6526440" y="5019120"/>
-            <a:ext cx="1971360" cy="2097720"/>
+            <a:ext cx="1971000" cy="2097360"/>
           </a:xfrm>
           <a:prstGeom prst="rect">
             <a:avLst/>
@@ -2094,7 +2095,7 @@
         <p:spPr>
           <a:xfrm>
             <a:off x="6523920" y="3312000"/>
-            <a:ext cx="1971360" cy="1580040"/>
+            <a:ext cx="1971000" cy="1579680"/>
           </a:xfrm>
           <a:prstGeom prst="rect">
             <a:avLst/>
@@ -2207,7 +2208,7 @@
         <p:spPr>
           <a:xfrm>
             <a:off x="3686760" y="3535560"/>
-            <a:ext cx="2356560" cy="3283560"/>
+            <a:ext cx="2356200" cy="3283200"/>
           </a:xfrm>
           <a:prstGeom prst="rect">
             <a:avLst/>
@@ -2438,8 +2439,8 @@
         </p:nvSpPr>
         <p:spPr>
           <a:xfrm flipH="1">
-            <a:off x="1517760" y="1080360"/>
-            <a:ext cx="1670760" cy="360"/>
+            <a:off x="1728000" y="1080360"/>
+            <a:ext cx="1460160" cy="360"/>
           </a:xfrm>
           <a:prstGeom prst="straightConnector1">
             <a:avLst/>
@@ -2463,7 +2464,7 @@
         <p:spPr>
           <a:xfrm>
             <a:off x="3477240" y="2825280"/>
-            <a:ext cx="3275280" cy="360"/>
+            <a:ext cx="3274920" cy="360"/>
           </a:xfrm>
           <a:prstGeom prst="straightConnector1">
             <a:avLst/>
@@ -2531,7 +2532,7 @@
         <p:spPr>
           <a:xfrm>
             <a:off x="6134760" y="2928240"/>
-            <a:ext cx="618120" cy="360"/>
+            <a:ext cx="617760" cy="360"/>
           </a:xfrm>
           <a:prstGeom prst="straightConnector1">
             <a:avLst/>
@@ -2599,7 +2600,7 @@
         <p:spPr>
           <a:xfrm>
             <a:off x="5873400" y="2741040"/>
-            <a:ext cx="855360" cy="360"/>
+            <a:ext cx="855000" cy="360"/>
           </a:xfrm>
           <a:prstGeom prst="straightConnector1">
             <a:avLst/>
@@ -2667,7 +2668,7 @@
         <p:spPr>
           <a:xfrm>
             <a:off x="6203880" y="5460120"/>
-            <a:ext cx="366840" cy="10800"/>
+            <a:ext cx="366480" cy="10440"/>
           </a:xfrm>
           <a:prstGeom prst="straightConnector1">
             <a:avLst/>
@@ -2734,8 +2735,8 @@
         </p:nvSpPr>
         <p:spPr>
           <a:xfrm flipH="1">
-            <a:off x="4260600" y="1186920"/>
-            <a:ext cx="1611360" cy="360"/>
+            <a:off x="4259880" y="1186920"/>
+            <a:ext cx="1611000" cy="360"/>
           </a:xfrm>
           <a:prstGeom prst="straightConnector1">
             <a:avLst/>
@@ -2825,7 +2826,7 @@
         <p:spPr>
           <a:xfrm>
             <a:off x="1423800" y="5169600"/>
-            <a:ext cx="1743840" cy="1094040"/>
+            <a:ext cx="1743480" cy="1093680"/>
           </a:xfrm>
           <a:prstGeom prst="rect">
             <a:avLst/>
@@ -3009,7 +3010,7 @@
         <p:spPr>
           <a:xfrm>
             <a:off x="2881440" y="1234440"/>
-            <a:ext cx="405360" cy="360"/>
+            <a:ext cx="309600" cy="360"/>
           </a:xfrm>
           <a:prstGeom prst="straightConnector1">
             <a:avLst/>

</xml_diff>

<commit_message>
#117 Update db-schema pptx: add data types.
</commit_message>
<xml_diff>
--- a/Metanome_DbSchema.pptx
+++ b/Metanome_DbSchema.pptx
@@ -1393,8 +1393,8 @@
         </p:nvSpPr>
         <p:spPr>
           <a:xfrm>
-            <a:off x="640800" y="627120"/>
-            <a:ext cx="1743480" cy="3620520"/>
+            <a:off x="72000" y="72000"/>
+            <a:ext cx="2736000" cy="3600000"/>
           </a:xfrm>
           <a:prstGeom prst="rect">
             <a:avLst/>
@@ -1441,194 +1441,213 @@
                 </a:solidFill>
                 <a:latin typeface="Calibri"/>
               </a:rPr>
-              <a:t>fileName</a:t>
-            </a:r>
-            <a:endParaRPr/>
-          </a:p>
-          <a:p>
-            <a:pPr>
-              <a:lnSpc>
-                <a:spcPct val="100000"/>
-              </a:lnSpc>
-            </a:pPr>
-            <a:r>
-              <a:rPr lang="de-DE" sz="1600">
-                <a:solidFill>
-                  <a:srgbClr val="000000"/>
-                </a:solidFill>
-                <a:latin typeface="Calibri"/>
-              </a:rPr>
-              <a:t>name</a:t>
-            </a:r>
-            <a:endParaRPr/>
-          </a:p>
-          <a:p>
-            <a:pPr>
-              <a:lnSpc>
-                <a:spcPct val="100000"/>
-              </a:lnSpc>
-            </a:pPr>
-            <a:r>
-              <a:rPr lang="de-DE" sz="1600">
-                <a:solidFill>
-                  <a:srgbClr val="000000"/>
-                </a:solidFill>
-                <a:latin typeface="Calibri"/>
-              </a:rPr>
-              <a:t>author</a:t>
-            </a:r>
-            <a:endParaRPr/>
-          </a:p>
-          <a:p>
-            <a:pPr>
-              <a:lnSpc>
-                <a:spcPct val="100000"/>
-              </a:lnSpc>
-            </a:pPr>
-            <a:r>
-              <a:rPr lang="de-DE" sz="1600">
-                <a:solidFill>
-                  <a:srgbClr val="000000"/>
-                </a:solidFill>
-                <a:latin typeface="Calibri"/>
-              </a:rPr>
-              <a:t>description</a:t>
-            </a:r>
-            <a:endParaRPr/>
-          </a:p>
-          <a:p>
-            <a:pPr>
-              <a:lnSpc>
-                <a:spcPct val="100000"/>
-              </a:lnSpc>
-            </a:pPr>
-            <a:r>
-              <a:rPr lang="de-DE" sz="1600">
-                <a:solidFill>
-                  <a:srgbClr val="000000"/>
-                </a:solidFill>
-                <a:latin typeface="Calibri"/>
-              </a:rPr>
-              <a:t>isIND</a:t>
-            </a:r>
-            <a:endParaRPr/>
-          </a:p>
-          <a:p>
-            <a:pPr>
-              <a:lnSpc>
-                <a:spcPct val="100000"/>
-              </a:lnSpc>
-            </a:pPr>
-            <a:r>
-              <a:rPr lang="de-DE" sz="1600">
-                <a:solidFill>
-                  <a:srgbClr val="000000"/>
-                </a:solidFill>
-                <a:latin typeface="Calibri"/>
-              </a:rPr>
-              <a:t>isFD</a:t>
-            </a:r>
-            <a:endParaRPr/>
-          </a:p>
-          <a:p>
-            <a:pPr>
-              <a:lnSpc>
-                <a:spcPct val="100000"/>
-              </a:lnSpc>
-            </a:pPr>
-            <a:r>
-              <a:rPr lang="de-DE" sz="1600">
-                <a:solidFill>
-                  <a:srgbClr val="000000"/>
-                </a:solidFill>
-                <a:latin typeface="Calibri"/>
-              </a:rPr>
-              <a:t>isUCC</a:t>
-            </a:r>
-            <a:endParaRPr/>
-          </a:p>
-          <a:p>
-            <a:pPr>
-              <a:lnSpc>
-                <a:spcPct val="100000"/>
-              </a:lnSpc>
-            </a:pPr>
-            <a:r>
-              <a:rPr lang="de-DE" sz="1600">
-                <a:solidFill>
-                  <a:srgbClr val="000000"/>
-                </a:solidFill>
-                <a:latin typeface="Calibri"/>
-              </a:rPr>
-              <a:t>isBasicStat</a:t>
-            </a:r>
-            <a:endParaRPr/>
-          </a:p>
-          <a:p>
-            <a:pPr>
-              <a:lnSpc>
-                <a:spcPct val="100000"/>
-              </a:lnSpc>
-            </a:pPr>
-            <a:r>
-              <a:rPr lang="de-DE" sz="1600">
-                <a:solidFill>
-                  <a:srgbClr val="000000"/>
-                </a:solidFill>
-                <a:latin typeface="Calibri"/>
-              </a:rPr>
-              <a:t>isDatabaseConnection</a:t>
-            </a:r>
-            <a:endParaRPr/>
-          </a:p>
-          <a:p>
-            <a:pPr>
-              <a:lnSpc>
-                <a:spcPct val="100000"/>
-              </a:lnSpc>
-            </a:pPr>
-            <a:r>
-              <a:rPr lang="de-DE" sz="1600">
-                <a:solidFill>
-                  <a:srgbClr val="000000"/>
-                </a:solidFill>
-                <a:latin typeface="Calibri"/>
-              </a:rPr>
-              <a:t>isRelationInput</a:t>
-            </a:r>
-            <a:endParaRPr/>
-          </a:p>
-          <a:p>
-            <a:pPr>
-              <a:lnSpc>
-                <a:spcPct val="100000"/>
-              </a:lnSpc>
-            </a:pPr>
-            <a:r>
-              <a:rPr lang="de-DE" sz="1600">
-                <a:solidFill>
-                  <a:srgbClr val="000000"/>
-                </a:solidFill>
-                <a:latin typeface="Calibri"/>
-              </a:rPr>
-              <a:t>isFileInput</a:t>
-            </a:r>
-            <a:endParaRPr/>
-          </a:p>
-          <a:p>
-            <a:pPr>
-              <a:lnSpc>
-                <a:spcPct val="100000"/>
-              </a:lnSpc>
-            </a:pPr>
-            <a:r>
-              <a:rPr lang="de-DE" sz="1600">
-                <a:solidFill>
-                  <a:srgbClr val="000000"/>
-                </a:solidFill>
-                <a:latin typeface="Calibri"/>
-              </a:rPr>
-              <a:t>isTableInput</a:t>
+              <a:t>fileName: String</a:t>
+            </a:r>
+            <a:endParaRPr/>
+          </a:p>
+          <a:p>
+            <a:pPr>
+              <a:lnSpc>
+                <a:spcPct val="100000"/>
+              </a:lnSpc>
+            </a:pPr>
+            <a:r>
+              <a:rPr lang="de-DE" sz="1600">
+                <a:solidFill>
+                  <a:srgbClr val="000000"/>
+                </a:solidFill>
+                <a:latin typeface="Calibri"/>
+              </a:rPr>
+              <a:t>name: String</a:t>
+            </a:r>
+            <a:endParaRPr/>
+          </a:p>
+          <a:p>
+            <a:pPr>
+              <a:lnSpc>
+                <a:spcPct val="100000"/>
+              </a:lnSpc>
+            </a:pPr>
+            <a:r>
+              <a:rPr lang="de-DE" sz="1600">
+                <a:solidFill>
+                  <a:srgbClr val="000000"/>
+                </a:solidFill>
+                <a:latin typeface="Calibri"/>
+              </a:rPr>
+              <a:t>author: String</a:t>
+            </a:r>
+            <a:endParaRPr/>
+          </a:p>
+          <a:p>
+            <a:pPr>
+              <a:lnSpc>
+                <a:spcPct val="100000"/>
+              </a:lnSpc>
+            </a:pPr>
+            <a:r>
+              <a:rPr lang="de-DE" sz="1600">
+                <a:solidFill>
+                  <a:srgbClr val="000000"/>
+                </a:solidFill>
+                <a:latin typeface="Calibri"/>
+              </a:rPr>
+              <a:t>description: String</a:t>
+            </a:r>
+            <a:endParaRPr/>
+          </a:p>
+          <a:p>
+            <a:pPr>
+              <a:lnSpc>
+                <a:spcPct val="100000"/>
+              </a:lnSpc>
+            </a:pPr>
+            <a:r>
+              <a:rPr lang="de-DE" sz="1600">
+                <a:solidFill>
+                  <a:srgbClr val="000000"/>
+                </a:solidFill>
+                <a:latin typeface="Calibri"/>
+              </a:rPr>
+              <a:t>isIND: Boolean</a:t>
+            </a:r>
+            <a:endParaRPr/>
+          </a:p>
+          <a:p>
+            <a:pPr>
+              <a:lnSpc>
+                <a:spcPct val="100000"/>
+              </a:lnSpc>
+            </a:pPr>
+            <a:r>
+              <a:rPr lang="de-DE" sz="1600">
+                <a:solidFill>
+                  <a:srgbClr val="000000"/>
+                </a:solidFill>
+                <a:latin typeface="Calibri"/>
+              </a:rPr>
+              <a:t>isFD: Boolean</a:t>
+            </a:r>
+            <a:endParaRPr/>
+          </a:p>
+          <a:p>
+            <a:pPr>
+              <a:lnSpc>
+                <a:spcPct val="100000"/>
+              </a:lnSpc>
+            </a:pPr>
+            <a:r>
+              <a:rPr lang="de-DE" sz="1600">
+                <a:solidFill>
+                  <a:srgbClr val="000000"/>
+                </a:solidFill>
+                <a:latin typeface="Calibri"/>
+              </a:rPr>
+              <a:t>isUCC: Boolean</a:t>
+            </a:r>
+            <a:endParaRPr/>
+          </a:p>
+          <a:p>
+            <a:pPr>
+              <a:lnSpc>
+                <a:spcPct val="100000"/>
+              </a:lnSpc>
+            </a:pPr>
+            <a:r>
+              <a:rPr lang="de-DE" sz="1600">
+                <a:solidFill>
+                  <a:srgbClr val="000000"/>
+                </a:solidFill>
+                <a:latin typeface="Calibri"/>
+              </a:rPr>
+              <a:t>isBasicStat: Boolean</a:t>
+            </a:r>
+            <a:endParaRPr/>
+          </a:p>
+          <a:p>
+            <a:pPr>
+              <a:lnSpc>
+                <a:spcPct val="100000"/>
+              </a:lnSpc>
+            </a:pPr>
+            <a:r>
+              <a:rPr lang="de-DE" sz="1600">
+                <a:solidFill>
+                  <a:srgbClr val="000000"/>
+                </a:solidFill>
+                <a:latin typeface="Calibri"/>
+              </a:rPr>
+              <a:t>isDatabaseConnection:   </a:t>
+            </a:r>
+            <a:r>
+              <a:rPr lang="de-DE" sz="1600">
+                <a:solidFill>
+                  <a:srgbClr val="000000"/>
+                </a:solidFill>
+                <a:latin typeface="Calibri"/>
+              </a:rPr>
+              <a:t>
+</a:t>
+            </a:r>
+            <a:r>
+              <a:rPr lang="de-DE" sz="1600">
+                <a:solidFill>
+                  <a:srgbClr val="000000"/>
+                </a:solidFill>
+                <a:latin typeface="Calibri"/>
+              </a:rPr>
+              <a:t>  Boolean</a:t>
+            </a:r>
+            <a:endParaRPr/>
+          </a:p>
+          <a:p>
+            <a:pPr>
+              <a:lnSpc>
+                <a:spcPct val="100000"/>
+              </a:lnSpc>
+            </a:pPr>
+            <a:r>
+              <a:rPr lang="de-DE" sz="1600">
+                <a:solidFill>
+                  <a:srgbClr val="000000"/>
+                </a:solidFill>
+                <a:latin typeface="Calibri"/>
+              </a:rPr>
+              <a:t>isRelationInput: Boolean</a:t>
+            </a:r>
+            <a:endParaRPr/>
+          </a:p>
+          <a:p>
+            <a:pPr>
+              <a:lnSpc>
+                <a:spcPct val="100000"/>
+              </a:lnSpc>
+            </a:pPr>
+            <a:r>
+              <a:rPr lang="de-DE" sz="1600">
+                <a:solidFill>
+                  <a:srgbClr val="000000"/>
+                </a:solidFill>
+                <a:latin typeface="Calibri"/>
+              </a:rPr>
+              <a:t>isFileInput: Boolean</a:t>
+            </a:r>
+            <a:endParaRPr/>
+          </a:p>
+          <a:p>
+            <a:pPr>
+              <a:lnSpc>
+                <a:spcPct val="100000"/>
+              </a:lnSpc>
+            </a:pPr>
+            <a:r>
+              <a:rPr lang="de-DE" sz="1600">
+                <a:solidFill>
+                  <a:srgbClr val="000000"/>
+                </a:solidFill>
+                <a:latin typeface="Calibri"/>
+              </a:rPr>
+              <a:t>isTableInput: Boolean</a:t>
             </a:r>
             <a:endParaRPr/>
           </a:p>
@@ -1642,8 +1661,8 @@
         </p:nvSpPr>
         <p:spPr>
           <a:xfrm>
-            <a:off x="3191040" y="617400"/>
-            <a:ext cx="2184480" cy="2066400"/>
+            <a:off x="3376440" y="93960"/>
+            <a:ext cx="2496960" cy="2066040"/>
           </a:xfrm>
           <a:prstGeom prst="rect">
             <a:avLst/>
@@ -1707,75 +1726,94 @@
                 </a:solidFill>
                 <a:latin typeface="Calibri"/>
               </a:rPr>
-              <a:t>begin</a:t>
-            </a:r>
-            <a:endParaRPr/>
-          </a:p>
-          <a:p>
-            <a:pPr>
-              <a:lnSpc>
-                <a:spcPct val="100000"/>
-              </a:lnSpc>
-            </a:pPr>
-            <a:r>
-              <a:rPr lang="de-DE" sz="1600">
-                <a:solidFill>
-                  <a:srgbClr val="000000"/>
-                </a:solidFill>
-                <a:latin typeface="Calibri"/>
-              </a:rPr>
-              <a:t>end</a:t>
-            </a:r>
-            <a:endParaRPr/>
-          </a:p>
-          <a:p>
-            <a:pPr>
-              <a:lnSpc>
-                <a:spcPct val="100000"/>
-              </a:lnSpc>
-            </a:pPr>
-            <a:r>
-              <a:rPr lang="de-DE" sz="1600">
-                <a:solidFill>
-                  <a:srgbClr val="000000"/>
-                </a:solidFill>
-                <a:latin typeface="Calibri"/>
-              </a:rPr>
-              <a:t>config</a:t>
-            </a:r>
-            <a:endParaRPr/>
-          </a:p>
-          <a:p>
-            <a:pPr>
-              <a:lnSpc>
-                <a:spcPct val="100000"/>
-              </a:lnSpc>
-            </a:pPr>
-            <a:r>
-              <a:rPr lang="de-DE" sz="1600">
-                <a:solidFill>
-                  <a:srgbClr val="000000"/>
-                </a:solidFill>
-                <a:latin typeface="Calibri"/>
-              </a:rPr>
-              <a:t>hardware_description</a:t>
-            </a:r>
-            <a:endParaRPr/>
-          </a:p>
-          <a:p>
-            <a:pPr>
-              <a:lnSpc>
-                <a:spcPct val="100000"/>
-              </a:lnSpc>
-            </a:pPr>
-            <a:r>
-              <a:rPr lang="de-DE" sz="1600">
-                <a:solidFill>
-                  <a:srgbClr val="000000"/>
-                </a:solidFill>
-                <a:latin typeface="Calibri"/>
-              </a:rPr>
-              <a:t>description</a:t>
+              <a:t>begin: Timestamp</a:t>
+            </a:r>
+            <a:endParaRPr/>
+          </a:p>
+          <a:p>
+            <a:pPr>
+              <a:lnSpc>
+                <a:spcPct val="100000"/>
+              </a:lnSpc>
+            </a:pPr>
+            <a:r>
+              <a:rPr lang="de-DE" sz="1600">
+                <a:solidFill>
+                  <a:srgbClr val="000000"/>
+                </a:solidFill>
+                <a:latin typeface="Calibri"/>
+              </a:rPr>
+              <a:t>end: Timestamp</a:t>
+            </a:r>
+            <a:endParaRPr/>
+          </a:p>
+          <a:p>
+            <a:pPr>
+              <a:lnSpc>
+                <a:spcPct val="100000"/>
+              </a:lnSpc>
+            </a:pPr>
+            <a:r>
+              <a:rPr lang="de-DE" sz="1600">
+                <a:solidFill>
+                  <a:srgbClr val="000000"/>
+                </a:solidFill>
+                <a:latin typeface="Calibri"/>
+              </a:rPr>
+              <a:t>config: String</a:t>
+            </a:r>
+            <a:endParaRPr/>
+          </a:p>
+          <a:p>
+            <a:pPr>
+              <a:lnSpc>
+                <a:spcPct val="100000"/>
+              </a:lnSpc>
+            </a:pPr>
+            <a:r>
+              <a:rPr lang="de-DE" sz="1600">
+                <a:solidFill>
+                  <a:srgbClr val="000000"/>
+                </a:solidFill>
+                <a:latin typeface="Calibri"/>
+              </a:rPr>
+              <a:t>hardware_description:</a:t>
+            </a:r>
+            <a:r>
+              <a:rPr lang="de-DE" sz="1600">
+                <a:solidFill>
+                  <a:srgbClr val="000000"/>
+                </a:solidFill>
+                <a:latin typeface="Calibri"/>
+              </a:rPr>
+              <a:t>
+</a:t>
+            </a:r>
+            <a:r>
+              <a:rPr lang="de-DE" sz="1600">
+                <a:solidFill>
+                  <a:srgbClr val="000000"/>
+                </a:solidFill>
+                <a:latin typeface="Calibri"/>
+              </a:rPr>
+              <a:t>  String</a:t>
+            </a:r>
+            <a:endParaRPr/>
+          </a:p>
+          <a:p>
+            <a:pPr>
+              <a:lnSpc>
+                <a:spcPct val="100000"/>
+              </a:lnSpc>
+            </a:pPr>
+            <a:r>
+              <a:rPr lang="de-DE" sz="1600">
+                <a:solidFill>
+                  <a:srgbClr val="000000"/>
+                </a:solidFill>
+                <a:latin typeface="Calibri"/>
+              </a:rPr>
+              <a:t>description: String</a:t>
             </a:r>
             <a:endParaRPr/>
           </a:p>
@@ -1789,8 +1827,8 @@
         </p:nvSpPr>
         <p:spPr>
           <a:xfrm>
-            <a:off x="6075360" y="627120"/>
-            <a:ext cx="1743480" cy="1367280"/>
+            <a:off x="6507360" y="108000"/>
+            <a:ext cx="2204640" cy="1172880"/>
           </a:xfrm>
           <a:prstGeom prst="rect">
             <a:avLst/>
@@ -1885,8 +1923,8 @@
         </p:nvSpPr>
         <p:spPr>
           <a:xfrm>
-            <a:off x="6753600" y="2348280"/>
-            <a:ext cx="1743480" cy="606960"/>
+            <a:off x="6536880" y="2448000"/>
+            <a:ext cx="1743120" cy="606600"/>
           </a:xfrm>
           <a:prstGeom prst="rect">
             <a:avLst/>
@@ -1933,7 +1971,7 @@
                 </a:solidFill>
                 <a:latin typeface="Calibri"/>
               </a:rPr>
-              <a:t>id</a:t>
+              <a:t>Id: Long</a:t>
             </a:r>
             <a:endParaRPr/>
           </a:p>
@@ -1947,8 +1985,8 @@
         </p:nvSpPr>
         <p:spPr>
           <a:xfrm>
-            <a:off x="6526440" y="5019120"/>
-            <a:ext cx="1971000" cy="2097360"/>
+            <a:off x="72000" y="3888000"/>
+            <a:ext cx="2905560" cy="1892880"/>
           </a:xfrm>
           <a:prstGeom prst="rect">
             <a:avLst/>
@@ -1978,7 +2016,7 @@
                 </a:solidFill>
                 <a:latin typeface="Calibri"/>
               </a:rPr>
-              <a:t>DbConnection</a:t>
+              <a:t>DatabaseConnection</a:t>
             </a:r>
             <a:endParaRPr/>
           </a:p>
@@ -1995,92 +2033,92 @@
                 </a:solidFill>
                 <a:latin typeface="Calibri"/>
               </a:rPr>
-              <a:t>id</a:t>
-            </a:r>
-            <a:endParaRPr/>
-          </a:p>
-          <a:p>
-            <a:pPr>
-              <a:lnSpc>
-                <a:spcPct val="100000"/>
-              </a:lnSpc>
-            </a:pPr>
-            <a:r>
-              <a:rPr lang="de-DE" sz="1600">
-                <a:solidFill>
-                  <a:srgbClr val="000000"/>
-                </a:solidFill>
-                <a:latin typeface="Calibri"/>
-              </a:rPr>
-              <a:t>url</a:t>
-            </a:r>
-            <a:endParaRPr/>
-          </a:p>
-          <a:p>
-            <a:pPr>
-              <a:lnSpc>
-                <a:spcPct val="100000"/>
-              </a:lnSpc>
-            </a:pPr>
-            <a:r>
-              <a:rPr lang="de-DE" sz="1600">
-                <a:solidFill>
-                  <a:srgbClr val="000000"/>
-                </a:solidFill>
-                <a:latin typeface="Calibri"/>
-              </a:rPr>
-              <a:t>username</a:t>
-            </a:r>
-            <a:endParaRPr/>
-          </a:p>
-          <a:p>
-            <a:pPr>
-              <a:lnSpc>
-                <a:spcPct val="100000"/>
-              </a:lnSpc>
-            </a:pPr>
-            <a:r>
-              <a:rPr lang="de-DE" sz="1600">
-                <a:solidFill>
-                  <a:srgbClr val="000000"/>
-                </a:solidFill>
-                <a:latin typeface="Calibri"/>
-              </a:rPr>
-              <a:t>password</a:t>
-            </a:r>
-            <a:endParaRPr/>
-          </a:p>
-          <a:p>
-            <a:pPr>
-              <a:lnSpc>
-                <a:spcPct val="100000"/>
-              </a:lnSpc>
-            </a:pPr>
-            <a:r>
-              <a:rPr lang="de-DE" sz="1600">
-                <a:solidFill>
-                  <a:srgbClr val="000000"/>
-                </a:solidFill>
-                <a:latin typeface="Calibri"/>
-              </a:rPr>
-              <a:t>System</a:t>
-            </a:r>
-            <a:endParaRPr/>
-          </a:p>
-          <a:p>
-            <a:pPr>
-              <a:lnSpc>
-                <a:spcPct val="100000"/>
-              </a:lnSpc>
-            </a:pPr>
-            <a:r>
-              <a:rPr lang="de-DE" sz="1600">
-                <a:solidFill>
-                  <a:srgbClr val="000000"/>
-                </a:solidFill>
-                <a:latin typeface="Calibri"/>
-              </a:rPr>
-              <a:t>comment</a:t>
+              <a:t>id: Long</a:t>
+            </a:r>
+            <a:endParaRPr/>
+          </a:p>
+          <a:p>
+            <a:pPr>
+              <a:lnSpc>
+                <a:spcPct val="100000"/>
+              </a:lnSpc>
+            </a:pPr>
+            <a:r>
+              <a:rPr lang="de-DE" sz="1600">
+                <a:solidFill>
+                  <a:srgbClr val="000000"/>
+                </a:solidFill>
+                <a:latin typeface="Calibri"/>
+              </a:rPr>
+              <a:t>url: String</a:t>
+            </a:r>
+            <a:endParaRPr/>
+          </a:p>
+          <a:p>
+            <a:pPr>
+              <a:lnSpc>
+                <a:spcPct val="100000"/>
+              </a:lnSpc>
+            </a:pPr>
+            <a:r>
+              <a:rPr lang="de-DE" sz="1600">
+                <a:solidFill>
+                  <a:srgbClr val="000000"/>
+                </a:solidFill>
+                <a:latin typeface="Calibri"/>
+              </a:rPr>
+              <a:t>username: String</a:t>
+            </a:r>
+            <a:endParaRPr/>
+          </a:p>
+          <a:p>
+            <a:pPr>
+              <a:lnSpc>
+                <a:spcPct val="100000"/>
+              </a:lnSpc>
+            </a:pPr>
+            <a:r>
+              <a:rPr lang="de-DE" sz="1600">
+                <a:solidFill>
+                  <a:srgbClr val="000000"/>
+                </a:solidFill>
+                <a:latin typeface="Calibri"/>
+              </a:rPr>
+              <a:t>password: String</a:t>
+            </a:r>
+            <a:endParaRPr/>
+          </a:p>
+          <a:p>
+            <a:pPr>
+              <a:lnSpc>
+                <a:spcPct val="100000"/>
+              </a:lnSpc>
+            </a:pPr>
+            <a:r>
+              <a:rPr lang="de-DE" sz="1600">
+                <a:solidFill>
+                  <a:srgbClr val="000000"/>
+                </a:solidFill>
+                <a:latin typeface="Calibri"/>
+              </a:rPr>
+              <a:t>system: String</a:t>
+            </a:r>
+            <a:endParaRPr/>
+          </a:p>
+          <a:p>
+            <a:pPr>
+              <a:lnSpc>
+                <a:spcPct val="100000"/>
+              </a:lnSpc>
+            </a:pPr>
+            <a:r>
+              <a:rPr lang="de-DE" sz="1600">
+                <a:solidFill>
+                  <a:srgbClr val="000000"/>
+                </a:solidFill>
+                <a:latin typeface="Calibri"/>
+              </a:rPr>
+              <a:t>comment: String</a:t>
             </a:r>
             <a:endParaRPr/>
           </a:p>
@@ -2094,8 +2132,8 @@
         </p:nvSpPr>
         <p:spPr>
           <a:xfrm>
-            <a:off x="6523920" y="3312000"/>
-            <a:ext cx="1971000" cy="1579680"/>
+            <a:off x="3312000" y="3888000"/>
+            <a:ext cx="2404080" cy="1440000"/>
           </a:xfrm>
           <a:prstGeom prst="rect">
             <a:avLst/>
@@ -2159,41 +2197,41 @@
                 </a:solidFill>
                 <a:latin typeface="Calibri"/>
               </a:rPr>
-              <a:t>tableName</a:t>
-            </a:r>
-            <a:endParaRPr/>
-          </a:p>
-          <a:p>
-            <a:pPr>
-              <a:lnSpc>
-                <a:spcPct val="100000"/>
-              </a:lnSpc>
-            </a:pPr>
-            <a:r>
-              <a:rPr lang="de-DE" sz="1600">
-                <a:solidFill>
-                  <a:srgbClr val="000000"/>
-                </a:solidFill>
-                <a:latin typeface="Calibri"/>
-              </a:rPr>
-              <a:t>DatabaseConnection</a:t>
-            </a:r>
-            <a:endParaRPr/>
-          </a:p>
-          <a:p>
-            <a:pPr>
-              <a:lnSpc>
-                <a:spcPct val="100000"/>
-              </a:lnSpc>
-            </a:pPr>
-            <a:r>
-              <a:rPr lang="de-DE" sz="1600">
-                <a:solidFill>
-                  <a:srgbClr val="000000"/>
-                </a:solidFill>
-                <a:latin typeface="Calibri"/>
-              </a:rPr>
-              <a:t>comment</a:t>
+              <a:t>tableName: String</a:t>
+            </a:r>
+            <a:endParaRPr/>
+          </a:p>
+          <a:p>
+            <a:pPr>
+              <a:lnSpc>
+                <a:spcPct val="100000"/>
+              </a:lnSpc>
+            </a:pPr>
+            <a:r>
+              <a:rPr lang="de-DE" sz="1600">
+                <a:solidFill>
+                  <a:srgbClr val="000000"/>
+                </a:solidFill>
+                <a:latin typeface="Calibri"/>
+              </a:rPr>
+              <a:t>databaseConnection</a:t>
+            </a:r>
+            <a:endParaRPr/>
+          </a:p>
+          <a:p>
+            <a:pPr>
+              <a:lnSpc>
+                <a:spcPct val="100000"/>
+              </a:lnSpc>
+            </a:pPr>
+            <a:r>
+              <a:rPr lang="de-DE" sz="1600">
+                <a:solidFill>
+                  <a:srgbClr val="000000"/>
+                </a:solidFill>
+                <a:latin typeface="Calibri"/>
+              </a:rPr>
+              <a:t>comment: String</a:t>
             </a:r>
             <a:endParaRPr/>
           </a:p>
@@ -2207,8 +2245,8 @@
         </p:nvSpPr>
         <p:spPr>
           <a:xfrm>
-            <a:off x="3686760" y="3535560"/>
-            <a:ext cx="2356200" cy="3283200"/>
+            <a:off x="6120000" y="3420000"/>
+            <a:ext cx="2952000" cy="3384000"/>
           </a:xfrm>
           <a:prstGeom prst="rect">
             <a:avLst/>
@@ -2272,160 +2310,197 @@
                 </a:solidFill>
                 <a:latin typeface="Calibri"/>
               </a:rPr>
-              <a:t>fileName</a:t>
-            </a:r>
-            <a:endParaRPr/>
-          </a:p>
-          <a:p>
-            <a:pPr>
-              <a:lnSpc>
-                <a:spcPct val="100000"/>
-              </a:lnSpc>
-            </a:pPr>
-            <a:r>
-              <a:rPr lang="de-DE" sz="1600">
-                <a:solidFill>
-                  <a:srgbClr val="000000"/>
-                </a:solidFill>
-                <a:latin typeface="Calibri"/>
-              </a:rPr>
-              <a:t>separator</a:t>
-            </a:r>
-            <a:endParaRPr/>
-          </a:p>
-          <a:p>
-            <a:pPr>
-              <a:lnSpc>
-                <a:spcPct val="100000"/>
-              </a:lnSpc>
-            </a:pPr>
-            <a:r>
-              <a:rPr lang="de-DE" sz="1600">
-                <a:solidFill>
-                  <a:srgbClr val="000000"/>
-                </a:solidFill>
-                <a:latin typeface="Calibri"/>
-              </a:rPr>
-              <a:t>quotechar</a:t>
-            </a:r>
-            <a:endParaRPr/>
-          </a:p>
-          <a:p>
-            <a:pPr>
-              <a:lnSpc>
-                <a:spcPct val="100000"/>
-              </a:lnSpc>
-            </a:pPr>
-            <a:r>
-              <a:rPr lang="de-DE" sz="1600">
-                <a:solidFill>
-                  <a:srgbClr val="000000"/>
-                </a:solidFill>
-                <a:latin typeface="Calibri"/>
-              </a:rPr>
-              <a:t>escapechar</a:t>
-            </a:r>
-            <a:endParaRPr/>
-          </a:p>
-          <a:p>
-            <a:pPr>
-              <a:lnSpc>
-                <a:spcPct val="100000"/>
-              </a:lnSpc>
-            </a:pPr>
-            <a:r>
-              <a:rPr lang="de-DE" sz="1600">
-                <a:solidFill>
-                  <a:srgbClr val="000000"/>
-                </a:solidFill>
-                <a:latin typeface="Calibri"/>
-              </a:rPr>
-              <a:t>skipLines</a:t>
-            </a:r>
-            <a:endParaRPr/>
-          </a:p>
-          <a:p>
-            <a:pPr>
-              <a:lnSpc>
-                <a:spcPct val="100000"/>
-              </a:lnSpc>
-            </a:pPr>
-            <a:r>
-              <a:rPr lang="de-DE" sz="1600">
-                <a:solidFill>
-                  <a:srgbClr val="000000"/>
-                </a:solidFill>
-                <a:latin typeface="Calibri"/>
-              </a:rPr>
-              <a:t>strictQuotes</a:t>
-            </a:r>
-            <a:endParaRPr/>
-          </a:p>
-          <a:p>
-            <a:pPr>
-              <a:lnSpc>
-                <a:spcPct val="100000"/>
-              </a:lnSpc>
-            </a:pPr>
-            <a:r>
-              <a:rPr lang="de-DE" sz="1600">
-                <a:solidFill>
-                  <a:srgbClr val="000000"/>
-                </a:solidFill>
-                <a:latin typeface="Calibri"/>
-              </a:rPr>
-              <a:t>ignoreLeadingWhiteSpace</a:t>
-            </a:r>
-            <a:endParaRPr/>
-          </a:p>
-          <a:p>
-            <a:pPr>
-              <a:lnSpc>
-                <a:spcPct val="100000"/>
-              </a:lnSpc>
-            </a:pPr>
-            <a:r>
-              <a:rPr lang="de-DE" sz="1600">
-                <a:solidFill>
-                  <a:srgbClr val="000000"/>
-                </a:solidFill>
-                <a:latin typeface="Calibri"/>
-              </a:rPr>
-              <a:t>hasHeader</a:t>
-            </a:r>
-            <a:endParaRPr/>
-          </a:p>
-          <a:p>
-            <a:pPr>
-              <a:lnSpc>
-                <a:spcPct val="100000"/>
-              </a:lnSpc>
-            </a:pPr>
-            <a:r>
-              <a:rPr lang="de-DE" sz="1600">
-                <a:solidFill>
-                  <a:srgbClr val="000000"/>
-                </a:solidFill>
-                <a:latin typeface="Calibri"/>
-              </a:rPr>
-              <a:t>skipDifferingLines</a:t>
-            </a:r>
-            <a:endParaRPr/>
-          </a:p>
-          <a:p>
-            <a:pPr>
-              <a:lnSpc>
-                <a:spcPct val="100000"/>
-              </a:lnSpc>
-            </a:pPr>
-            <a:r>
-              <a:rPr lang="de-DE" sz="1600">
-                <a:solidFill>
-                  <a:srgbClr val="000000"/>
-                </a:solidFill>
-                <a:latin typeface="Calibri"/>
-              </a:rPr>
-              <a:t>comment</a:t>
+              <a:t>fileName: String</a:t>
+            </a:r>
+            <a:endParaRPr/>
+          </a:p>
+          <a:p>
+            <a:pPr>
+              <a:lnSpc>
+                <a:spcPct val="100000"/>
+              </a:lnSpc>
+            </a:pPr>
+            <a:r>
+              <a:rPr lang="de-DE" sz="1600">
+                <a:solidFill>
+                  <a:srgbClr val="000000"/>
+                </a:solidFill>
+                <a:latin typeface="Calibri"/>
+              </a:rPr>
+              <a:t>separator: Character</a:t>
+            </a:r>
+            <a:endParaRPr/>
+          </a:p>
+          <a:p>
+            <a:pPr>
+              <a:lnSpc>
+                <a:spcPct val="100000"/>
+              </a:lnSpc>
+            </a:pPr>
+            <a:r>
+              <a:rPr lang="de-DE" sz="1600">
+                <a:solidFill>
+                  <a:srgbClr val="000000"/>
+                </a:solidFill>
+                <a:latin typeface="Calibri"/>
+              </a:rPr>
+              <a:t>quotechar: </a:t>
+            </a:r>
+            <a:r>
+              <a:rPr lang="de-DE" sz="1600">
+                <a:solidFill>
+                  <a:srgbClr val="000000"/>
+                </a:solidFill>
+                <a:latin typeface="Calibri"/>
+              </a:rPr>
+              <a:t>Character</a:t>
+            </a:r>
+            <a:endParaRPr/>
+          </a:p>
+          <a:p>
+            <a:pPr>
+              <a:lnSpc>
+                <a:spcPct val="100000"/>
+              </a:lnSpc>
+            </a:pPr>
+            <a:r>
+              <a:rPr lang="de-DE" sz="1600">
+                <a:solidFill>
+                  <a:srgbClr val="000000"/>
+                </a:solidFill>
+                <a:latin typeface="Calibri"/>
+              </a:rPr>
+              <a:t>escapechar: </a:t>
+            </a:r>
+            <a:r>
+              <a:rPr lang="de-DE" sz="1600">
+                <a:solidFill>
+                  <a:srgbClr val="000000"/>
+                </a:solidFill>
+                <a:latin typeface="Calibri"/>
+              </a:rPr>
+              <a:t>Character</a:t>
+            </a:r>
+            <a:endParaRPr/>
+          </a:p>
+          <a:p>
+            <a:pPr>
+              <a:lnSpc>
+                <a:spcPct val="100000"/>
+              </a:lnSpc>
+            </a:pPr>
+            <a:r>
+              <a:rPr lang="de-DE" sz="1600">
+                <a:solidFill>
+                  <a:srgbClr val="000000"/>
+                </a:solidFill>
+                <a:latin typeface="Calibri"/>
+              </a:rPr>
+              <a:t>skipLines: Integer</a:t>
+            </a:r>
+            <a:endParaRPr/>
+          </a:p>
+          <a:p>
+            <a:pPr>
+              <a:lnSpc>
+                <a:spcPct val="100000"/>
+              </a:lnSpc>
+            </a:pPr>
+            <a:r>
+              <a:rPr lang="de-DE" sz="1600">
+                <a:solidFill>
+                  <a:srgbClr val="000000"/>
+                </a:solidFill>
+                <a:latin typeface="Calibri"/>
+              </a:rPr>
+              <a:t>strictQuotes: Boolean</a:t>
+            </a:r>
+            <a:endParaRPr/>
+          </a:p>
+          <a:p>
+            <a:pPr>
+              <a:lnSpc>
+                <a:spcPct val="100000"/>
+              </a:lnSpc>
+            </a:pPr>
+            <a:r>
+              <a:rPr lang="de-DE" sz="1600">
+                <a:solidFill>
+                  <a:srgbClr val="000000"/>
+                </a:solidFill>
+                <a:latin typeface="Calibri"/>
+              </a:rPr>
+              <a:t>ignoreLeadingWhiteSpace:</a:t>
+            </a:r>
+            <a:r>
+              <a:rPr lang="de-DE" sz="1600">
+                <a:solidFill>
+                  <a:srgbClr val="000000"/>
+                </a:solidFill>
+                <a:latin typeface="Calibri"/>
+              </a:rPr>
+              <a:t>
+</a:t>
+            </a:r>
+            <a:r>
+              <a:rPr lang="de-DE" sz="1600">
+                <a:solidFill>
+                  <a:srgbClr val="000000"/>
+                </a:solidFill>
+                <a:latin typeface="Calibri"/>
+              </a:rPr>
+              <a:t>  Boolean</a:t>
+            </a:r>
+            <a:endParaRPr/>
+          </a:p>
+          <a:p>
+            <a:pPr>
+              <a:lnSpc>
+                <a:spcPct val="100000"/>
+              </a:lnSpc>
+            </a:pPr>
+            <a:r>
+              <a:rPr lang="de-DE" sz="1600">
+                <a:solidFill>
+                  <a:srgbClr val="000000"/>
+                </a:solidFill>
+                <a:latin typeface="Calibri"/>
+              </a:rPr>
+              <a:t>hasHeader: Boolean</a:t>
+            </a:r>
+            <a:endParaRPr/>
+          </a:p>
+          <a:p>
+            <a:pPr>
+              <a:lnSpc>
+                <a:spcPct val="100000"/>
+              </a:lnSpc>
+            </a:pPr>
+            <a:r>
+              <a:rPr lang="de-DE" sz="1600">
+                <a:solidFill>
+                  <a:srgbClr val="000000"/>
+                </a:solidFill>
+                <a:latin typeface="Calibri"/>
+              </a:rPr>
+              <a:t>skipDifferingLines: Boolean</a:t>
+            </a:r>
+            <a:endParaRPr/>
+          </a:p>
+          <a:p>
+            <a:pPr>
+              <a:lnSpc>
+                <a:spcPct val="100000"/>
+              </a:lnSpc>
+            </a:pPr>
+            <a:r>
+              <a:rPr lang="de-DE" sz="1600">
+                <a:solidFill>
+                  <a:srgbClr val="000000"/>
+                </a:solidFill>
+                <a:latin typeface="Calibri"/>
+              </a:rPr>
+              <a:t>comment: String</a:t>
             </a:r>
             <a:endParaRPr/>
           </a:p>
@@ -2439,8 +2514,8 @@
         </p:nvSpPr>
         <p:spPr>
           <a:xfrm flipH="1">
-            <a:off x="1728000" y="1080360"/>
-            <a:ext cx="1460160" cy="360"/>
+            <a:off x="2808000" y="576000"/>
+            <a:ext cx="648000" cy="360"/>
           </a:xfrm>
           <a:prstGeom prst="straightConnector1">
             <a:avLst/>
@@ -2463,8 +2538,8 @@
         </p:nvSpPr>
         <p:spPr>
           <a:xfrm>
-            <a:off x="3477240" y="2825280"/>
-            <a:ext cx="3274920" cy="360"/>
+            <a:off x="5544000" y="2807640"/>
+            <a:ext cx="992880" cy="360"/>
           </a:xfrm>
           <a:prstGeom prst="straightConnector1">
             <a:avLst/>
@@ -2481,58 +2556,14 @@
       </p:sp>
       <p:sp>
         <p:nvSpPr>
-          <p:cNvPr id="45" name="Line 10"/>
+          <p:cNvPr id="45" name="CustomShape 10"/>
           <p:cNvSpPr/>
           <p:nvPr/>
         </p:nvSpPr>
         <p:spPr>
           <a:xfrm>
-            <a:off x="3477240" y="2824920"/>
-            <a:ext cx="0" cy="1175040"/>
-          </a:xfrm>
-          <a:prstGeom prst="line">
-            <a:avLst/>
-          </a:prstGeom>
-          <a:ln w="25560">
-            <a:solidFill>
-              <a:srgbClr val="4f81bd"/>
-            </a:solidFill>
-            <a:round/>
-          </a:ln>
-        </p:spPr>
-      </p:sp>
-      <p:sp>
-        <p:nvSpPr>
-          <p:cNvPr id="46" name="Line 11"/>
-          <p:cNvSpPr/>
-          <p:nvPr/>
-        </p:nvSpPr>
-        <p:spPr>
-          <a:xfrm>
-            <a:off x="3465000" y="3999960"/>
-            <a:ext cx="282960" cy="0"/>
-          </a:xfrm>
-          <a:prstGeom prst="line">
-            <a:avLst/>
-          </a:prstGeom>
-          <a:ln w="25560">
-            <a:solidFill>
-              <a:srgbClr val="4f81bd"/>
-            </a:solidFill>
-            <a:round/>
-          </a:ln>
-        </p:spPr>
-      </p:sp>
-      <p:sp>
-        <p:nvSpPr>
-          <p:cNvPr id="47" name="CustomShape 12"/>
-          <p:cNvSpPr/>
-          <p:nvPr/>
-        </p:nvSpPr>
-        <p:spPr>
-          <a:xfrm>
-            <a:off x="6134760" y="2928240"/>
-            <a:ext cx="617760" cy="360"/>
+            <a:off x="5904000" y="2952000"/>
+            <a:ext cx="632880" cy="360"/>
           </a:xfrm>
           <a:prstGeom prst="straightConnector1">
             <a:avLst/>
@@ -2549,14 +2580,14 @@
       </p:sp>
       <p:sp>
         <p:nvSpPr>
-          <p:cNvPr id="48" name="Line 13"/>
+          <p:cNvPr id="46" name="Line 11"/>
           <p:cNvSpPr/>
           <p:nvPr/>
         </p:nvSpPr>
         <p:spPr>
           <a:xfrm>
-            <a:off x="6134400" y="2928240"/>
-            <a:ext cx="0" cy="1071720"/>
+            <a:off x="5904000" y="2952000"/>
+            <a:ext cx="0" cy="927720"/>
           </a:xfrm>
           <a:prstGeom prst="line">
             <a:avLst/>
@@ -2571,14 +2602,14 @@
       </p:sp>
       <p:sp>
         <p:nvSpPr>
-          <p:cNvPr id="49" name="Line 14"/>
+          <p:cNvPr id="47" name="Line 12"/>
           <p:cNvSpPr/>
           <p:nvPr/>
         </p:nvSpPr>
         <p:spPr>
           <a:xfrm>
-            <a:off x="6134400" y="3999960"/>
-            <a:ext cx="437400" cy="0"/>
+            <a:off x="5904000" y="3888000"/>
+            <a:ext cx="293400" cy="0"/>
           </a:xfrm>
           <a:prstGeom prst="line">
             <a:avLst/>
@@ -2593,14 +2624,14 @@
       </p:sp>
       <p:sp>
         <p:nvSpPr>
-          <p:cNvPr id="50" name="CustomShape 15"/>
+          <p:cNvPr id="48" name="CustomShape 13"/>
           <p:cNvSpPr/>
           <p:nvPr/>
         </p:nvSpPr>
         <p:spPr>
           <a:xfrm>
-            <a:off x="5873400" y="2741040"/>
-            <a:ext cx="855000" cy="360"/>
+            <a:off x="6264000" y="2591640"/>
+            <a:ext cx="272880" cy="360"/>
           </a:xfrm>
           <a:prstGeom prst="straightConnector1">
             <a:avLst/>
@@ -2617,14 +2648,14 @@
       </p:sp>
       <p:sp>
         <p:nvSpPr>
-          <p:cNvPr id="51" name="Line 16"/>
+          <p:cNvPr id="49" name="Line 14"/>
           <p:cNvSpPr/>
           <p:nvPr/>
         </p:nvSpPr>
         <p:spPr>
-          <a:xfrm>
-            <a:off x="5873400" y="1565640"/>
-            <a:ext cx="0" cy="1175040"/>
+          <a:xfrm flipH="1">
+            <a:off x="6264000" y="1080000"/>
+            <a:ext cx="5040" cy="1512000"/>
           </a:xfrm>
           <a:prstGeom prst="line">
             <a:avLst/>
@@ -2639,13 +2670,13 @@
       </p:sp>
       <p:sp>
         <p:nvSpPr>
-          <p:cNvPr id="52" name="Line 17"/>
+          <p:cNvPr id="50" name="Line 15"/>
           <p:cNvSpPr/>
           <p:nvPr/>
         </p:nvSpPr>
         <p:spPr>
           <a:xfrm>
-            <a:off x="5873400" y="1576440"/>
+            <a:off x="6269040" y="1080000"/>
             <a:ext cx="282960" cy="0"/>
           </a:xfrm>
           <a:prstGeom prst="line">
@@ -2661,14 +2692,14 @@
       </p:sp>
       <p:sp>
         <p:nvSpPr>
-          <p:cNvPr id="53" name="CustomShape 18"/>
+          <p:cNvPr id="51" name="CustomShape 16"/>
           <p:cNvSpPr/>
           <p:nvPr/>
         </p:nvSpPr>
         <p:spPr>
-          <a:xfrm>
-            <a:off x="6203880" y="5460120"/>
-            <a:ext cx="366480" cy="10440"/>
+          <a:xfrm flipH="1">
+            <a:off x="4536000" y="575640"/>
+            <a:ext cx="2016000" cy="360"/>
           </a:xfrm>
           <a:prstGeom prst="straightConnector1">
             <a:avLst/>
@@ -2685,148 +2716,14 @@
       </p:sp>
       <p:sp>
         <p:nvSpPr>
-          <p:cNvPr id="54" name="Line 19"/>
+          <p:cNvPr id="52" name="CustomShape 17"/>
           <p:cNvSpPr/>
           <p:nvPr/>
         </p:nvSpPr>
         <p:spPr>
           <a:xfrm>
-            <a:off x="6203880" y="4534200"/>
-            <a:ext cx="0" cy="937800"/>
-          </a:xfrm>
-          <a:prstGeom prst="line">
-            <a:avLst/>
-          </a:prstGeom>
-          <a:ln w="25560">
-            <a:solidFill>
-              <a:srgbClr val="4f81bd"/>
-            </a:solidFill>
-            <a:round/>
-          </a:ln>
-        </p:spPr>
-      </p:sp>
-      <p:sp>
-        <p:nvSpPr>
-          <p:cNvPr id="55" name="Line 20"/>
-          <p:cNvSpPr/>
-          <p:nvPr/>
-        </p:nvSpPr>
-        <p:spPr>
-          <a:xfrm>
-            <a:off x="6203880" y="4534200"/>
-            <a:ext cx="367920" cy="0"/>
-          </a:xfrm>
-          <a:prstGeom prst="line">
-            <a:avLst/>
-          </a:prstGeom>
-          <a:ln w="25560">
-            <a:solidFill>
-              <a:srgbClr val="4f81bd"/>
-            </a:solidFill>
-            <a:round/>
-          </a:ln>
-        </p:spPr>
-      </p:sp>
-      <p:sp>
-        <p:nvSpPr>
-          <p:cNvPr id="56" name="CustomShape 21"/>
-          <p:cNvSpPr/>
-          <p:nvPr/>
-        </p:nvSpPr>
-        <p:spPr>
-          <a:xfrm flipH="1">
-            <a:off x="4259880" y="1186920"/>
-            <a:ext cx="1611000" cy="360"/>
-          </a:xfrm>
-          <a:prstGeom prst="straightConnector1">
-            <a:avLst/>
-          </a:prstGeom>
-          <a:noFill/>
-          <a:ln w="25560">
-            <a:solidFill>
-              <a:srgbClr val="4f81bd"/>
-            </a:solidFill>
-            <a:round/>
-            <a:tailEnd len="med" type="arrow" w="med"/>
-          </a:ln>
-        </p:spPr>
-      </p:sp>
-      <p:sp>
-        <p:nvSpPr>
-          <p:cNvPr id="57" name="Line 22"/>
-          <p:cNvSpPr/>
-          <p:nvPr/>
-        </p:nvSpPr>
-        <p:spPr>
-          <a:xfrm>
-            <a:off x="5873400" y="1056240"/>
-            <a:ext cx="0" cy="261000"/>
-          </a:xfrm>
-          <a:prstGeom prst="line">
-            <a:avLst/>
-          </a:prstGeom>
-          <a:ln w="25560">
-            <a:solidFill>
-              <a:srgbClr val="4f81bd"/>
-            </a:solidFill>
-            <a:round/>
-          </a:ln>
-        </p:spPr>
-      </p:sp>
-      <p:sp>
-        <p:nvSpPr>
-          <p:cNvPr id="58" name="Line 23"/>
-          <p:cNvSpPr/>
-          <p:nvPr/>
-        </p:nvSpPr>
-        <p:spPr>
-          <a:xfrm>
-            <a:off x="5879160" y="1317240"/>
-            <a:ext cx="265320" cy="0"/>
-          </a:xfrm>
-          <a:prstGeom prst="line">
-            <a:avLst/>
-          </a:prstGeom>
-          <a:ln w="25560">
-            <a:solidFill>
-              <a:srgbClr val="4f81bd"/>
-            </a:solidFill>
-            <a:round/>
-          </a:ln>
-        </p:spPr>
-      </p:sp>
-      <p:sp>
-        <p:nvSpPr>
-          <p:cNvPr id="59" name="Line 24"/>
-          <p:cNvSpPr/>
-          <p:nvPr/>
-        </p:nvSpPr>
-        <p:spPr>
-          <a:xfrm>
-            <a:off x="5873400" y="1068120"/>
-            <a:ext cx="282960" cy="0"/>
-          </a:xfrm>
-          <a:prstGeom prst="line">
-            <a:avLst/>
-          </a:prstGeom>
-          <a:ln w="25560">
-            <a:solidFill>
-              <a:srgbClr val="4f81bd"/>
-            </a:solidFill>
-            <a:round/>
-          </a:ln>
-        </p:spPr>
-      </p:sp>
-      <p:sp>
-        <p:nvSpPr>
-          <p:cNvPr id="60" name="CustomShape 25"/>
-          <p:cNvSpPr/>
-          <p:nvPr/>
-        </p:nvSpPr>
-        <p:spPr>
-          <a:xfrm>
-            <a:off x="1423800" y="5169600"/>
-            <a:ext cx="1743480" cy="1093680"/>
+            <a:off x="3384000" y="2290680"/>
+            <a:ext cx="1944000" cy="877320"/>
           </a:xfrm>
           <a:prstGeom prst="rect">
             <a:avLst/>
@@ -2873,56 +2770,39 @@
                 </a:solidFill>
                 <a:latin typeface="Calibri"/>
               </a:rPr>
-              <a:t>fileName</a:t>
-            </a:r>
-            <a:endParaRPr/>
-          </a:p>
-          <a:p>
-            <a:pPr>
-              <a:lnSpc>
-                <a:spcPct val="100000"/>
-              </a:lnSpc>
-            </a:pPr>
-            <a:r>
-              <a:rPr lang="de-DE" sz="1600">
-                <a:solidFill>
-                  <a:srgbClr val="000000"/>
-                </a:solidFill>
-                <a:latin typeface="Calibri"/>
-              </a:rPr>
-              <a:t>algorithm</a:t>
-            </a:r>
-            <a:endParaRPr/>
-          </a:p>
-          <a:p>
-            <a:pPr>
-              <a:lnSpc>
-                <a:spcPct val="100000"/>
-              </a:lnSpc>
-            </a:pPr>
-            <a:r>
-              <a:rPr lang="de-DE" sz="1600">
-                <a:solidFill>
-                  <a:srgbClr val="000000"/>
-                </a:solidFill>
-                <a:latin typeface="Calibri"/>
-              </a:rPr>
-              <a:t>timestamp</a:t>
-            </a:r>
-            <a:endParaRPr/>
-          </a:p>
-        </p:txBody>
-      </p:sp>
-      <p:sp>
-        <p:nvSpPr>
-          <p:cNvPr id="61" name="Line 26"/>
+              <a:t>fileName: String</a:t>
+            </a:r>
+            <a:endParaRPr/>
+          </a:p>
+          <a:p>
+            <a:pPr>
+              <a:lnSpc>
+                <a:spcPct val="100000"/>
+              </a:lnSpc>
+            </a:pPr>
+            <a:r>
+              <a:rPr lang="de-DE" sz="1600">
+                <a:solidFill>
+                  <a:srgbClr val="000000"/>
+                </a:solidFill>
+                <a:latin typeface="Calibri"/>
+              </a:rPr>
+              <a:t>execution</a:t>
+            </a:r>
+            <a:endParaRPr/>
+          </a:p>
+        </p:txBody>
+      </p:sp>
+      <p:sp>
+        <p:nvSpPr>
+          <p:cNvPr id="53" name="Line 18"/>
           <p:cNvSpPr/>
           <p:nvPr/>
         </p:nvSpPr>
         <p:spPr>
           <a:xfrm>
-            <a:off x="2646720" y="5869800"/>
-            <a:ext cx="0" cy="275040"/>
+            <a:off x="3024000" y="792000"/>
+            <a:ext cx="0" cy="2232000"/>
           </a:xfrm>
           <a:prstGeom prst="line">
             <a:avLst/>
@@ -2937,80 +2817,14 @@
       </p:sp>
       <p:sp>
         <p:nvSpPr>
-          <p:cNvPr id="62" name="Line 27"/>
+          <p:cNvPr id="54" name="CustomShape 19"/>
           <p:cNvSpPr/>
           <p:nvPr/>
         </p:nvSpPr>
         <p:spPr>
           <a:xfrm>
-            <a:off x="2443320" y="6143400"/>
-            <a:ext cx="203400" cy="0"/>
-          </a:xfrm>
-          <a:prstGeom prst="line">
-            <a:avLst/>
-          </a:prstGeom>
-          <a:ln w="25560">
-            <a:solidFill>
-              <a:srgbClr val="4f81bd"/>
-            </a:solidFill>
-            <a:round/>
-          </a:ln>
-        </p:spPr>
-      </p:sp>
-      <p:sp>
-        <p:nvSpPr>
-          <p:cNvPr id="63" name="Line 28"/>
-          <p:cNvSpPr/>
-          <p:nvPr/>
-        </p:nvSpPr>
-        <p:spPr>
-          <a:xfrm>
-            <a:off x="2379240" y="5869800"/>
-            <a:ext cx="282960" cy="0"/>
-          </a:xfrm>
-          <a:prstGeom prst="line">
-            <a:avLst/>
-          </a:prstGeom>
-          <a:ln w="25560">
-            <a:solidFill>
-              <a:srgbClr val="4f81bd"/>
-            </a:solidFill>
-            <a:round/>
-          </a:ln>
-        </p:spPr>
-      </p:sp>
-      <p:sp>
-        <p:nvSpPr>
-          <p:cNvPr id="64" name="Line 29"/>
-          <p:cNvSpPr/>
-          <p:nvPr/>
-        </p:nvSpPr>
-        <p:spPr>
-          <a:xfrm>
-            <a:off x="2881080" y="1234440"/>
-            <a:ext cx="0" cy="4755960"/>
-          </a:xfrm>
-          <a:prstGeom prst="line">
-            <a:avLst/>
-          </a:prstGeom>
-          <a:ln w="25560">
-            <a:solidFill>
-              <a:srgbClr val="4f81bd"/>
-            </a:solidFill>
-            <a:round/>
-          </a:ln>
-        </p:spPr>
-      </p:sp>
-      <p:sp>
-        <p:nvSpPr>
-          <p:cNvPr id="65" name="CustomShape 30"/>
-          <p:cNvSpPr/>
-          <p:nvPr/>
-        </p:nvSpPr>
-        <p:spPr>
-          <a:xfrm>
-            <a:off x="2881440" y="1234440"/>
-            <a:ext cx="309600" cy="360"/>
+            <a:off x="3024000" y="791640"/>
+            <a:ext cx="352440" cy="360"/>
           </a:xfrm>
           <a:prstGeom prst="straightConnector1">
             <a:avLst/>
@@ -3027,14 +2841,14 @@
       </p:sp>
       <p:sp>
         <p:nvSpPr>
-          <p:cNvPr id="66" name="Line 31"/>
+          <p:cNvPr id="55" name="Line 20"/>
           <p:cNvSpPr/>
           <p:nvPr/>
         </p:nvSpPr>
         <p:spPr>
-          <a:xfrm flipV="1">
-            <a:off x="2645640" y="5988600"/>
-            <a:ext cx="235440" cy="1800"/>
+          <a:xfrm>
+            <a:off x="3024000" y="3024000"/>
+            <a:ext cx="432000" cy="0"/>
           </a:xfrm>
           <a:prstGeom prst="line">
             <a:avLst/>
@@ -3044,6 +2858,98 @@
               <a:srgbClr val="4f81bd"/>
             </a:solidFill>
             <a:round/>
+          </a:ln>
+        </p:spPr>
+      </p:sp>
+      <p:sp>
+        <p:nvSpPr>
+          <p:cNvPr id="56" name="Line 21"/>
+          <p:cNvSpPr/>
+          <p:nvPr/>
+        </p:nvSpPr>
+        <p:spPr>
+          <a:xfrm>
+            <a:off x="5544000" y="2808000"/>
+            <a:ext cx="0" cy="1584000"/>
+          </a:xfrm>
+          <a:prstGeom prst="line">
+            <a:avLst/>
+          </a:prstGeom>
+          <a:ln w="25560">
+            <a:solidFill>
+              <a:srgbClr val="4f81bd"/>
+            </a:solidFill>
+            <a:round/>
+          </a:ln>
+        </p:spPr>
+      </p:sp>
+      <p:sp>
+        <p:nvSpPr>
+          <p:cNvPr id="57" name="Line 22"/>
+          <p:cNvSpPr/>
+          <p:nvPr/>
+        </p:nvSpPr>
+        <p:spPr>
+          <a:xfrm>
+            <a:off x="3666600" y="4392000"/>
+            <a:ext cx="1877400" cy="0"/>
+          </a:xfrm>
+          <a:prstGeom prst="line">
+            <a:avLst/>
+          </a:prstGeom>
+          <a:ln w="25560">
+            <a:solidFill>
+              <a:srgbClr val="4f81bd"/>
+            </a:solidFill>
+            <a:round/>
+          </a:ln>
+        </p:spPr>
+      </p:sp>
+      <p:sp>
+        <p:nvSpPr>
+          <p:cNvPr id="58" name="CustomShape 23"/>
+          <p:cNvSpPr/>
+          <p:nvPr/>
+        </p:nvSpPr>
+        <p:spPr>
+          <a:xfrm flipH="1">
+            <a:off x="2988000" y="4824000"/>
+            <a:ext cx="396000" cy="360"/>
+          </a:xfrm>
+          <a:prstGeom prst="straightConnector1">
+            <a:avLst/>
+          </a:prstGeom>
+          <a:noFill/>
+          <a:ln w="25560">
+            <a:solidFill>
+              <a:srgbClr val="4f81bd"/>
+            </a:solidFill>
+            <a:round/>
+            <a:tailEnd len="med" type="arrow" w="med"/>
+          </a:ln>
+        </p:spPr>
+      </p:sp>
+      <p:sp>
+        <p:nvSpPr>
+          <p:cNvPr id="59" name="CustomShape 24"/>
+          <p:cNvSpPr/>
+          <p:nvPr/>
+        </p:nvSpPr>
+        <p:spPr>
+          <a:xfrm flipH="1">
+            <a:off x="5328000" y="792000"/>
+            <a:ext cx="1224000" cy="360"/>
+          </a:xfrm>
+          <a:prstGeom prst="straightConnector1">
+            <a:avLst/>
+          </a:prstGeom>
+          <a:noFill/>
+          <a:ln w="25560">
+            <a:solidFill>
+              <a:srgbClr val="4f81bd"/>
+            </a:solidFill>
+            <a:round/>
+            <a:tailEnd len="med" type="arrow" w="med"/>
           </a:ln>
         </p:spPr>
       </p:sp>

</xml_diff>

<commit_message>
#275 #61 Store results of an execution.
</commit_message>
<xml_diff>
--- a/Metanome_DbSchema.pptx
+++ b/Metanome_DbSchema.pptx
@@ -73,6 +73,7 @@
         <p:txBody>
           <a:bodyPr lIns="0" rIns="0" tIns="0" bIns="0" anchor="ctr"/>
           <a:p>
+            <a:pPr algn="ctr"/>
             <a:endParaRPr/>
           </a:p>
         </p:txBody>
@@ -173,6 +174,7 @@
         <p:txBody>
           <a:bodyPr lIns="0" rIns="0" tIns="0" bIns="0" anchor="ctr"/>
           <a:p>
+            <a:pPr algn="ctr"/>
             <a:endParaRPr/>
           </a:p>
         </p:txBody>
@@ -325,6 +327,7 @@
         <p:txBody>
           <a:bodyPr lIns="0" rIns="0" tIns="0" bIns="0" anchor="ctr"/>
           <a:p>
+            <a:pPr algn="ctr"/>
             <a:endParaRPr/>
           </a:p>
         </p:txBody>
@@ -475,6 +478,7 @@
         <p:txBody>
           <a:bodyPr lIns="0" rIns="0" tIns="0" bIns="0" anchor="ctr"/>
           <a:p>
+            <a:pPr algn="ctr"/>
             <a:endParaRPr/>
           </a:p>
         </p:txBody>
@@ -550,6 +554,7 @@
         <p:txBody>
           <a:bodyPr lIns="0" rIns="0" tIns="0" bIns="0" anchor="ctr"/>
           <a:p>
+            <a:pPr algn="ctr"/>
             <a:endParaRPr/>
           </a:p>
         </p:txBody>
@@ -624,6 +629,7 @@
         <p:txBody>
           <a:bodyPr lIns="0" rIns="0" tIns="0" bIns="0" anchor="ctr"/>
           <a:p>
+            <a:pPr algn="ctr"/>
             <a:endParaRPr/>
           </a:p>
         </p:txBody>
@@ -724,6 +730,7 @@
         <p:txBody>
           <a:bodyPr lIns="0" rIns="0" tIns="0" bIns="0" anchor="ctr"/>
           <a:p>
+            <a:pPr algn="ctr"/>
             <a:endParaRPr/>
           </a:p>
         </p:txBody>
@@ -821,6 +828,7 @@
         <p:txBody>
           <a:bodyPr lIns="0" rIns="0" tIns="0" bIns="0" anchor="ctr"/>
           <a:p>
+            <a:pPr algn="ctr"/>
             <a:endParaRPr/>
           </a:p>
         </p:txBody>
@@ -947,6 +955,7 @@
         <p:txBody>
           <a:bodyPr lIns="0" rIns="0" tIns="0" bIns="0" anchor="ctr"/>
           <a:p>
+            <a:pPr algn="ctr"/>
             <a:endParaRPr/>
           </a:p>
         </p:txBody>
@@ -1073,6 +1082,7 @@
         <p:txBody>
           <a:bodyPr lIns="0" rIns="0" tIns="0" bIns="0" anchor="ctr"/>
           <a:p>
+            <a:pPr algn="ctr"/>
             <a:endParaRPr/>
           </a:p>
         </p:txBody>
@@ -1206,8 +1216,9 @@
         <p:txBody>
           <a:bodyPr lIns="0" rIns="0" tIns="0" bIns="0" anchor="ctr"/>
           <a:p>
-            <a:r>
-              <a:rPr lang="de-DE" sz="1400">
+            <a:pPr algn="ctr"/>
+            <a:r>
+              <a:rPr lang="de-DE" sz="4400">
                 <a:latin typeface="Arial"/>
               </a:rPr>
               <a:t>Click to edit the title text format</a:t>
@@ -1244,7 +1255,7 @@
               <a:buChar char=""/>
             </a:pPr>
             <a:r>
-              <a:rPr lang="de-DE" sz="1400">
+              <a:rPr lang="de-DE" sz="3200">
                 <a:latin typeface="Arial"/>
               </a:rPr>
               <a:t>Click to edit the outline text format</a:t>
@@ -1258,7 +1269,7 @@
               <a:buChar char=""/>
             </a:pPr>
             <a:r>
-              <a:rPr lang="de-DE" sz="1400">
+              <a:rPr lang="de-DE" sz="2800">
                 <a:latin typeface="Arial"/>
               </a:rPr>
               <a:t>Second Outline Level</a:t>
@@ -1272,7 +1283,7 @@
               <a:buChar char=""/>
             </a:pPr>
             <a:r>
-              <a:rPr lang="de-DE" sz="1400">
+              <a:rPr lang="de-DE" sz="2400">
                 <a:latin typeface="Arial"/>
               </a:rPr>
               <a:t>Third Outline Level</a:t>
@@ -1286,7 +1297,7 @@
               <a:buChar char=""/>
             </a:pPr>
             <a:r>
-              <a:rPr lang="de-DE" sz="1400">
+              <a:rPr lang="de-DE" sz="2000">
                 <a:latin typeface="Arial"/>
               </a:rPr>
               <a:t>Fourth Outline Level</a:t>
@@ -1383,7 +1394,7 @@
         <p:spPr>
           <a:xfrm>
             <a:off x="216000" y="144000"/>
-            <a:ext cx="2160000" cy="4176000"/>
+            <a:ext cx="2159640" cy="4175640"/>
           </a:xfrm>
           <a:prstGeom prst="rect">
             <a:avLst/>
@@ -1650,26 +1661,33 @@
               </a:rPr>
               <a:t>relationalInput:   </a:t>
             </a:r>
-            <a:r>
-              <a:rPr lang="de-DE" sz="1400">
-                <a:solidFill>
-                  <a:srgbClr val="000000"/>
-                </a:solidFill>
-                <a:latin typeface="Calibri"/>
-                <a:ea typeface="Calibri"/>
-              </a:rPr>
-              <a:t>
-</a:t>
-            </a:r>
-            <a:r>
-              <a:rPr lang="de-DE" sz="1400">
-                <a:solidFill>
-                  <a:srgbClr val="000000"/>
-                </a:solidFill>
-                <a:latin typeface="Calibri"/>
-                <a:ea typeface="Calibri"/>
-              </a:rPr>
-              <a:t>  Boolean</a:t>
+            <a:endParaRPr/>
+          </a:p>
+          <a:p>
+            <a:pPr>
+              <a:lnSpc>
+                <a:spcPct val="100000"/>
+              </a:lnSpc>
+            </a:pPr>
+            <a:r>
+              <a:rPr lang="de-DE" sz="1400">
+                <a:solidFill>
+                  <a:srgbClr val="000000"/>
+                </a:solidFill>
+                <a:latin typeface="Calibri"/>
+                <a:ea typeface="Calibri"/>
+              </a:rPr>
+              <a:t>  </a:t>
+            </a:r>
+            <a:r>
+              <a:rPr lang="de-DE" sz="1400">
+                <a:solidFill>
+                  <a:srgbClr val="000000"/>
+                </a:solidFill>
+                <a:latin typeface="Calibri"/>
+                <a:ea typeface="Calibri"/>
+              </a:rPr>
+              <a:t>Boolean</a:t>
             </a:r>
             <a:endParaRPr/>
           </a:p>
@@ -1738,7 +1756,7 @@
         <p:spPr>
           <a:xfrm>
             <a:off x="3520440" y="165960"/>
-            <a:ext cx="2167560" cy="2498040"/>
+            <a:ext cx="2167200" cy="2642040"/>
           </a:xfrm>
           <a:prstGeom prst="rect">
             <a:avLst/>
@@ -1859,6 +1877,24 @@
                 <a:latin typeface="Calibri"/>
                 <a:ea typeface="Calibri"/>
               </a:rPr>
+              <a:t>elapsedNanos: long</a:t>
+            </a:r>
+            <a:endParaRPr/>
+          </a:p>
+          <a:p>
+            <a:pPr>
+              <a:lnSpc>
+                <a:spcPct val="100000"/>
+              </a:lnSpc>
+            </a:pPr>
+            <a:r>
+              <a:rPr lang="de-DE" sz="1400">
+                <a:solidFill>
+                  <a:srgbClr val="000000"/>
+                </a:solidFill>
+                <a:latin typeface="Calibri"/>
+                <a:ea typeface="Calibri"/>
+              </a:rPr>
               <a:t>results: Result</a:t>
             </a:r>
             <a:endParaRPr/>
@@ -1897,26 +1933,33 @@
               </a:rPr>
               <a:t>hardware_description:</a:t>
             </a:r>
-            <a:r>
-              <a:rPr lang="de-DE" sz="1400">
-                <a:solidFill>
-                  <a:srgbClr val="000000"/>
-                </a:solidFill>
-                <a:latin typeface="Calibri"/>
-                <a:ea typeface="Calibri"/>
-              </a:rPr>
-              <a:t>
-</a:t>
-            </a:r>
-            <a:r>
-              <a:rPr lang="de-DE" sz="1400">
-                <a:solidFill>
-                  <a:srgbClr val="000000"/>
-                </a:solidFill>
-                <a:latin typeface="Calibri"/>
-                <a:ea typeface="Calibri"/>
-              </a:rPr>
-              <a:t>  String</a:t>
+            <a:endParaRPr/>
+          </a:p>
+          <a:p>
+            <a:pPr>
+              <a:lnSpc>
+                <a:spcPct val="100000"/>
+              </a:lnSpc>
+            </a:pPr>
+            <a:r>
+              <a:rPr lang="de-DE" sz="1400">
+                <a:solidFill>
+                  <a:srgbClr val="000000"/>
+                </a:solidFill>
+                <a:latin typeface="Calibri"/>
+                <a:ea typeface="Calibri"/>
+              </a:rPr>
+              <a:t>  </a:t>
+            </a:r>
+            <a:r>
+              <a:rPr lang="de-DE" sz="1400">
+                <a:solidFill>
+                  <a:srgbClr val="000000"/>
+                </a:solidFill>
+                <a:latin typeface="Calibri"/>
+                <a:ea typeface="Calibri"/>
+              </a:rPr>
+              <a:t>String</a:t>
             </a:r>
             <a:endParaRPr/>
           </a:p>
@@ -1966,8 +2009,8 @@
         </p:nvSpPr>
         <p:spPr>
           <a:xfrm>
-            <a:off x="3744000" y="3096000"/>
-            <a:ext cx="1728000" cy="756000"/>
+            <a:off x="3744000" y="3240000"/>
+            <a:ext cx="1727640" cy="755640"/>
           </a:xfrm>
           <a:prstGeom prst="rect">
             <a:avLst/>
@@ -2049,7 +2092,7 @@
         <p:spPr>
           <a:xfrm>
             <a:off x="4032000" y="4392000"/>
-            <a:ext cx="1224000" cy="606240"/>
+            <a:ext cx="1223640" cy="605880"/>
           </a:xfrm>
           <a:prstGeom prst="rect">
             <a:avLst/>
@@ -2113,7 +2156,7 @@
         <p:spPr>
           <a:xfrm>
             <a:off x="216000" y="5256000"/>
-            <a:ext cx="2304000" cy="1460520"/>
+            <a:ext cx="2303640" cy="1460160"/>
           </a:xfrm>
           <a:prstGeom prst="rect">
             <a:avLst/>
@@ -2249,7 +2292,7 @@
         <p:spPr>
           <a:xfrm>
             <a:off x="3528000" y="5544000"/>
-            <a:ext cx="2304000" cy="1152000"/>
+            <a:ext cx="2303640" cy="1151640"/>
           </a:xfrm>
           <a:prstGeom prst="rect">
             <a:avLst/>
@@ -2318,26 +2361,33 @@
               </a:rPr>
               <a:t>databaseConnection:</a:t>
             </a:r>
-            <a:r>
-              <a:rPr lang="de-DE" sz="1400">
-                <a:solidFill>
-                  <a:srgbClr val="000000"/>
-                </a:solidFill>
-                <a:latin typeface="Calibri"/>
-                <a:ea typeface="Calibri"/>
-              </a:rPr>
-              <a:t>
-</a:t>
-            </a:r>
-            <a:r>
-              <a:rPr lang="de-DE" sz="1400">
-                <a:solidFill>
-                  <a:srgbClr val="000000"/>
-                </a:solidFill>
-                <a:latin typeface="Calibri"/>
-                <a:ea typeface="Calibri"/>
-              </a:rPr>
-              <a:t>  DatabaseConnection</a:t>
+            <a:endParaRPr/>
+          </a:p>
+          <a:p>
+            <a:pPr>
+              <a:lnSpc>
+                <a:spcPct val="100000"/>
+              </a:lnSpc>
+            </a:pPr>
+            <a:r>
+              <a:rPr lang="de-DE" sz="1400">
+                <a:solidFill>
+                  <a:srgbClr val="000000"/>
+                </a:solidFill>
+                <a:latin typeface="Calibri"/>
+                <a:ea typeface="Calibri"/>
+              </a:rPr>
+              <a:t>  </a:t>
+            </a:r>
+            <a:r>
+              <a:rPr lang="de-DE" sz="1400">
+                <a:solidFill>
+                  <a:srgbClr val="000000"/>
+                </a:solidFill>
+                <a:latin typeface="Calibri"/>
+                <a:ea typeface="Calibri"/>
+              </a:rPr>
+              <a:t>DatabaseConnection</a:t>
             </a:r>
             <a:endParaRPr/>
           </a:p>
@@ -2370,7 +2420,7 @@
         <p:spPr>
           <a:xfrm>
             <a:off x="6264000" y="4068000"/>
-            <a:ext cx="2664000" cy="2628000"/>
+            <a:ext cx="2663640" cy="2627640"/>
           </a:xfrm>
           <a:prstGeom prst="rect">
             <a:avLst/>
@@ -2529,26 +2579,33 @@
               </a:rPr>
               <a:t>ignoreLeadingWhiteSpace:</a:t>
             </a:r>
-            <a:r>
-              <a:rPr lang="de-DE" sz="1400">
-                <a:solidFill>
-                  <a:srgbClr val="000000"/>
-                </a:solidFill>
-                <a:latin typeface="Calibri"/>
-                <a:ea typeface="Calibri"/>
-              </a:rPr>
-              <a:t>
-</a:t>
-            </a:r>
-            <a:r>
-              <a:rPr lang="de-DE" sz="1400">
-                <a:solidFill>
-                  <a:srgbClr val="000000"/>
-                </a:solidFill>
-                <a:latin typeface="Calibri"/>
-                <a:ea typeface="Calibri"/>
-              </a:rPr>
-              <a:t>  Boolean</a:t>
+            <a:endParaRPr/>
+          </a:p>
+          <a:p>
+            <a:pPr>
+              <a:lnSpc>
+                <a:spcPct val="100000"/>
+              </a:lnSpc>
+            </a:pPr>
+            <a:r>
+              <a:rPr lang="de-DE" sz="1400">
+                <a:solidFill>
+                  <a:srgbClr val="000000"/>
+                </a:solidFill>
+                <a:latin typeface="Calibri"/>
+                <a:ea typeface="Calibri"/>
+              </a:rPr>
+              <a:t>  </a:t>
+            </a:r>
+            <a:r>
+              <a:rPr lang="de-DE" sz="1400">
+                <a:solidFill>
+                  <a:srgbClr val="000000"/>
+                </a:solidFill>
+                <a:latin typeface="Calibri"/>
+                <a:ea typeface="Calibri"/>
+              </a:rPr>
+              <a:t>Boolean</a:t>
             </a:r>
             <a:endParaRPr/>
           </a:p>
@@ -2617,7 +2674,7 @@
         <p:spPr>
           <a:xfrm>
             <a:off x="6912000" y="144000"/>
-            <a:ext cx="1943640" cy="2244960"/>
+            <a:ext cx="1943280" cy="2244600"/>
           </a:xfrm>
           <a:prstGeom prst="rect">
             <a:avLst/>
@@ -2704,26 +2761,33 @@
               </a:rPr>
               <a:t>execution:  </a:t>
             </a:r>
-            <a:r>
-              <a:rPr lang="de-DE" sz="1400">
-                <a:solidFill>
-                  <a:srgbClr val="000000"/>
-                </a:solidFill>
-                <a:latin typeface="Calibri"/>
-                <a:ea typeface="Calibri"/>
-              </a:rPr>
-              <a:t>
-</a:t>
-            </a:r>
-            <a:r>
-              <a:rPr lang="de-DE" sz="1400">
-                <a:solidFill>
-                  <a:srgbClr val="000000"/>
-                </a:solidFill>
-                <a:latin typeface="Calibri"/>
-                <a:ea typeface="Calibri"/>
-              </a:rPr>
-              <a:t>  Execution</a:t>
+            <a:endParaRPr/>
+          </a:p>
+          <a:p>
+            <a:pPr>
+              <a:lnSpc>
+                <a:spcPct val="100000"/>
+              </a:lnSpc>
+            </a:pPr>
+            <a:r>
+              <a:rPr lang="de-DE" sz="1400">
+                <a:solidFill>
+                  <a:srgbClr val="000000"/>
+                </a:solidFill>
+                <a:latin typeface="Calibri"/>
+                <a:ea typeface="Calibri"/>
+              </a:rPr>
+              <a:t>  </a:t>
+            </a:r>
+            <a:r>
+              <a:rPr lang="de-DE" sz="1400">
+                <a:solidFill>
+                  <a:srgbClr val="000000"/>
+                </a:solidFill>
+                <a:latin typeface="Calibri"/>
+                <a:ea typeface="Calibri"/>
+              </a:rPr>
+              <a:t>Execution</a:t>
             </a:r>
             <a:endParaRPr/>
           </a:p>
@@ -2828,7 +2892,7 @@
         <p:spPr>
           <a:xfrm>
             <a:off x="5250960" y="4751640"/>
-            <a:ext cx="1013040" cy="360"/>
+            <a:ext cx="1012680" cy="360"/>
           </a:xfrm>
           <a:prstGeom prst="straightConnector1">
             <a:avLst/>
@@ -2851,8 +2915,8 @@
         </p:nvSpPr>
         <p:spPr>
           <a:xfrm rot="5400000">
-            <a:off x="4342680" y="5263200"/>
-            <a:ext cx="530280" cy="360"/>
+            <a:off x="4342680" y="5262840"/>
+            <a:ext cx="529920" cy="360"/>
           </a:xfrm>
           <a:prstGeom prst="straightConnector1">
             <a:avLst/>
@@ -2875,8 +2939,8 @@
         </p:nvSpPr>
         <p:spPr>
           <a:xfrm rot="5400000">
-            <a:off x="1534680" y="5062680"/>
-            <a:ext cx="386280" cy="360"/>
+            <a:off x="1534680" y="5062320"/>
+            <a:ext cx="385920" cy="360"/>
           </a:xfrm>
           <a:prstGeom prst="straightConnector1">
             <a:avLst/>
@@ -2899,7 +2963,7 @@
         <p:spPr>
           <a:xfrm>
             <a:off x="1722960" y="4869360"/>
-            <a:ext cx="2309040" cy="360"/>
+            <a:ext cx="2308680" cy="360"/>
           </a:xfrm>
           <a:prstGeom prst="straightConnector1">
             <a:avLst/>
@@ -2923,7 +2987,7 @@
         <p:spPr>
           <a:xfrm>
             <a:off x="2520000" y="6120000"/>
-            <a:ext cx="1080000" cy="360"/>
+            <a:ext cx="1079640" cy="360"/>
           </a:xfrm>
           <a:prstGeom prst="straightConnector1">
             <a:avLst/>
@@ -2947,7 +3011,7 @@
         <p:spPr>
           <a:xfrm>
             <a:off x="2376000" y="791640"/>
-            <a:ext cx="1224000" cy="360"/>
+            <a:ext cx="1223640" cy="360"/>
           </a:xfrm>
           <a:prstGeom prst="straightConnector1">
             <a:avLst/>
@@ -2971,7 +3035,7 @@
         <p:spPr>
           <a:xfrm>
             <a:off x="2160000" y="1583640"/>
-            <a:ext cx="1360440" cy="360"/>
+            <a:ext cx="1360080" cy="360"/>
           </a:xfrm>
           <a:prstGeom prst="straightConnector1">
             <a:avLst/>
@@ -2995,7 +3059,7 @@
         <p:spPr>
           <a:xfrm>
             <a:off x="5688000" y="1007640"/>
-            <a:ext cx="1296000" cy="360"/>
+            <a:ext cx="1295640" cy="360"/>
           </a:xfrm>
           <a:prstGeom prst="straightConnector1">
             <a:avLst/>
@@ -3019,7 +3083,7 @@
         <p:spPr>
           <a:xfrm>
             <a:off x="4896000" y="1368000"/>
-            <a:ext cx="2008440" cy="360"/>
+            <a:ext cx="2008080" cy="360"/>
           </a:xfrm>
           <a:prstGeom prst="straightConnector1">
             <a:avLst/>
@@ -3042,8 +3106,8 @@
         </p:nvSpPr>
         <p:spPr>
           <a:xfrm rot="5400000">
-            <a:off x="4342680" y="4116960"/>
-            <a:ext cx="530280" cy="360"/>
+            <a:off x="4414680" y="4188600"/>
+            <a:ext cx="386280" cy="360"/>
           </a:xfrm>
           <a:prstGeom prst="straightConnector1">
             <a:avLst/>
@@ -3066,8 +3130,8 @@
         </p:nvSpPr>
         <p:spPr>
           <a:xfrm rot="16200000">
-            <a:off x="4284000" y="2843280"/>
-            <a:ext cx="503280" cy="720"/>
+            <a:off x="4319640" y="3023280"/>
+            <a:ext cx="431280" cy="360"/>
           </a:xfrm>
           <a:prstGeom prst="straightConnector1">
             <a:avLst/>

</xml_diff>